<commit_message>
Adicionando Formulário de Seleção de Equipamentos
</commit_message>
<xml_diff>
--- a/Icons/icons.pptx
+++ b/Icons/icons.pptx
@@ -15,6 +15,22 @@
     <p:sldId id="262" r:id="rId9"/>
     <p:sldId id="263" r:id="rId10"/>
     <p:sldId id="265" r:id="rId11"/>
+    <p:sldId id="266" r:id="rId12"/>
+    <p:sldId id="277" r:id="rId13"/>
+    <p:sldId id="278" r:id="rId14"/>
+    <p:sldId id="279" r:id="rId15"/>
+    <p:sldId id="280" r:id="rId16"/>
+    <p:sldId id="281" r:id="rId17"/>
+    <p:sldId id="282" r:id="rId18"/>
+    <p:sldId id="283" r:id="rId19"/>
+    <p:sldId id="284" r:id="rId20"/>
+    <p:sldId id="285" r:id="rId21"/>
+    <p:sldId id="286" r:id="rId22"/>
+    <p:sldId id="287" r:id="rId23"/>
+    <p:sldId id="288" r:id="rId24"/>
+    <p:sldId id="290" r:id="rId25"/>
+    <p:sldId id="291" r:id="rId26"/>
+    <p:sldId id="292" r:id="rId27"/>
   </p:sldIdLst>
   <p:sldSz cx="7199313" cy="7199313"/>
   <p:notesSz cx="6858000" cy="9144000"/>
@@ -3285,6 +3301,3258 @@
 </p:sld>
 </file>
 
+<file path=ppt/slides/slide11.xml><?xml version="1.0" encoding="utf-8"?>
+<p:sld xmlns:a="http://schemas.openxmlformats.org/drawingml/2006/main" xmlns:r="http://schemas.openxmlformats.org/officeDocument/2006/relationships" xmlns:p="http://schemas.openxmlformats.org/presentationml/2006/main">
+  <p:cSld>
+    <p:spTree>
+      <p:nvGrpSpPr>
+        <p:cNvPr id="1" name=""/>
+        <p:cNvGrpSpPr/>
+        <p:nvPr/>
+      </p:nvGrpSpPr>
+      <p:grpSpPr>
+        <a:xfrm>
+          <a:off x="0" y="0"/>
+          <a:ext cx="0" cy="0"/>
+          <a:chOff x="0" y="0"/>
+          <a:chExt cx="0" cy="0"/>
+        </a:xfrm>
+      </p:grpSpPr>
+      <p:sp>
+        <p:nvSpPr>
+          <p:cNvPr id="4" name="Retângulo 3">
+            <a:extLst>
+              <a:ext uri="{FF2B5EF4-FFF2-40B4-BE49-F238E27FC236}">
+                <a16:creationId xmlns:a16="http://schemas.microsoft.com/office/drawing/2014/main" id="{73521BF0-0376-2073-7FDD-6DD8B0C9B5B6}"/>
+              </a:ext>
+            </a:extLst>
+          </p:cNvPr>
+          <p:cNvSpPr/>
+          <p:nvPr/>
+        </p:nvSpPr>
+        <p:spPr>
+          <a:xfrm>
+            <a:off x="0" y="1"/>
+            <a:ext cx="7199313" cy="7199312"/>
+          </a:xfrm>
+          <a:prstGeom prst="rect">
+            <a:avLst/>
+          </a:prstGeom>
+          <a:solidFill>
+            <a:srgbClr val="0095BA"/>
+          </a:solidFill>
+        </p:spPr>
+        <p:style>
+          <a:lnRef idx="2">
+            <a:schemeClr val="accent1">
+              <a:shade val="50000"/>
+            </a:schemeClr>
+          </a:lnRef>
+          <a:fillRef idx="1">
+            <a:schemeClr val="accent1"/>
+          </a:fillRef>
+          <a:effectRef idx="0">
+            <a:schemeClr val="accent1"/>
+          </a:effectRef>
+          <a:fontRef idx="minor">
+            <a:schemeClr val="lt1"/>
+          </a:fontRef>
+        </p:style>
+        <p:txBody>
+          <a:bodyPr rtlCol="0" anchor="ctr"/>
+          <a:lstStyle/>
+          <a:p>
+            <a:pPr algn="ctr"/>
+            <a:endParaRPr lang="pt-BR" dirty="0"/>
+          </a:p>
+        </p:txBody>
+      </p:sp>
+      <p:pic>
+        <p:nvPicPr>
+          <p:cNvPr id="12" name="Gráfico 11" descr="Adicionar com preenchimento sólido">
+            <a:extLst>
+              <a:ext uri="{FF2B5EF4-FFF2-40B4-BE49-F238E27FC236}">
+                <a16:creationId xmlns:a16="http://schemas.microsoft.com/office/drawing/2014/main" id="{06C3E47E-7254-FBD9-D33F-EBD7A9611FC4}"/>
+              </a:ext>
+            </a:extLst>
+          </p:cNvPr>
+          <p:cNvPicPr>
+            <a:picLocks noChangeAspect="1"/>
+          </p:cNvPicPr>
+          <p:nvPr/>
+        </p:nvPicPr>
+        <p:blipFill>
+          <a:blip r:embed="rId2">
+            <a:extLst>
+              <a:ext uri="{28A0092B-C50C-407E-A947-70E740481C1C}">
+                <a14:useLocalDpi xmlns:a14="http://schemas.microsoft.com/office/drawing/2010/main" val="0"/>
+              </a:ext>
+              <a:ext uri="{96DAC541-7B7A-43D3-8B79-37D633B846F1}">
+                <asvg:svgBlip xmlns:asvg="http://schemas.microsoft.com/office/drawing/2016/SVG/main" r:embed="rId3"/>
+              </a:ext>
+            </a:extLst>
+          </a:blip>
+          <a:stretch>
+            <a:fillRect/>
+          </a:stretch>
+        </p:blipFill>
+        <p:spPr>
+          <a:xfrm>
+            <a:off x="4977535" y="4977534"/>
+            <a:ext cx="2221778" cy="2221778"/>
+          </a:xfrm>
+          <a:prstGeom prst="rect">
+            <a:avLst/>
+          </a:prstGeom>
+        </p:spPr>
+      </p:pic>
+      <p:sp>
+        <p:nvSpPr>
+          <p:cNvPr id="3" name="Semicírculo 2">
+            <a:extLst>
+              <a:ext uri="{FF2B5EF4-FFF2-40B4-BE49-F238E27FC236}">
+                <a16:creationId xmlns:a16="http://schemas.microsoft.com/office/drawing/2014/main" id="{634815C2-79BF-27EF-1DDB-F4D1C04F9B3D}"/>
+              </a:ext>
+            </a:extLst>
+          </p:cNvPr>
+          <p:cNvSpPr/>
+          <p:nvPr/>
+        </p:nvSpPr>
+        <p:spPr>
+          <a:xfrm rot="16200000">
+            <a:off x="3479700" y="1018075"/>
+            <a:ext cx="1979238" cy="1991302"/>
+          </a:xfrm>
+          <a:prstGeom prst="blockArc">
+            <a:avLst>
+              <a:gd name="adj1" fmla="val 10800000"/>
+              <a:gd name="adj2" fmla="val 86715"/>
+              <a:gd name="adj3" fmla="val 0"/>
+            </a:avLst>
+          </a:prstGeom>
+          <a:noFill/>
+          <a:ln w="381000">
+            <a:solidFill>
+              <a:srgbClr val="CF1259"/>
+            </a:solidFill>
+          </a:ln>
+        </p:spPr>
+        <p:style>
+          <a:lnRef idx="2">
+            <a:schemeClr val="accent1">
+              <a:shade val="50000"/>
+            </a:schemeClr>
+          </a:lnRef>
+          <a:fillRef idx="1">
+            <a:schemeClr val="accent1"/>
+          </a:fillRef>
+          <a:effectRef idx="0">
+            <a:schemeClr val="accent1"/>
+          </a:effectRef>
+          <a:fontRef idx="minor">
+            <a:schemeClr val="lt1"/>
+          </a:fontRef>
+        </p:style>
+        <p:txBody>
+          <a:bodyPr rtlCol="0" anchor="ctr"/>
+          <a:lstStyle/>
+          <a:p>
+            <a:pPr algn="ctr"/>
+            <a:endParaRPr lang="pt-BR"/>
+          </a:p>
+        </p:txBody>
+      </p:sp>
+      <p:sp>
+        <p:nvSpPr>
+          <p:cNvPr id="6" name="Semicírculo 5">
+            <a:extLst>
+              <a:ext uri="{FF2B5EF4-FFF2-40B4-BE49-F238E27FC236}">
+                <a16:creationId xmlns:a16="http://schemas.microsoft.com/office/drawing/2014/main" id="{6A577E45-EDDB-3D13-B265-533092CF2A63}"/>
+              </a:ext>
+            </a:extLst>
+          </p:cNvPr>
+          <p:cNvSpPr/>
+          <p:nvPr/>
+        </p:nvSpPr>
+        <p:spPr>
+          <a:xfrm rot="16200000">
+            <a:off x="3479700" y="2997313"/>
+            <a:ext cx="1979238" cy="1991302"/>
+          </a:xfrm>
+          <a:prstGeom prst="blockArc">
+            <a:avLst>
+              <a:gd name="adj1" fmla="val 10800000"/>
+              <a:gd name="adj2" fmla="val 86715"/>
+              <a:gd name="adj3" fmla="val 0"/>
+            </a:avLst>
+          </a:prstGeom>
+          <a:noFill/>
+          <a:ln w="381000">
+            <a:solidFill>
+              <a:srgbClr val="CF1259"/>
+            </a:solidFill>
+          </a:ln>
+        </p:spPr>
+        <p:style>
+          <a:lnRef idx="2">
+            <a:schemeClr val="accent1">
+              <a:shade val="50000"/>
+            </a:schemeClr>
+          </a:lnRef>
+          <a:fillRef idx="1">
+            <a:schemeClr val="accent1"/>
+          </a:fillRef>
+          <a:effectRef idx="0">
+            <a:schemeClr val="accent1"/>
+          </a:effectRef>
+          <a:fontRef idx="minor">
+            <a:schemeClr val="lt1"/>
+          </a:fontRef>
+        </p:style>
+        <p:txBody>
+          <a:bodyPr rtlCol="0" anchor="ctr"/>
+          <a:lstStyle/>
+          <a:p>
+            <a:pPr algn="ctr"/>
+            <a:endParaRPr lang="pt-BR"/>
+          </a:p>
+        </p:txBody>
+      </p:sp>
+      <p:sp>
+        <p:nvSpPr>
+          <p:cNvPr id="7" name="Semicírculo 6">
+            <a:extLst>
+              <a:ext uri="{FF2B5EF4-FFF2-40B4-BE49-F238E27FC236}">
+                <a16:creationId xmlns:a16="http://schemas.microsoft.com/office/drawing/2014/main" id="{2AF87D12-168B-2855-4917-78F84072337C}"/>
+              </a:ext>
+            </a:extLst>
+          </p:cNvPr>
+          <p:cNvSpPr/>
+          <p:nvPr/>
+        </p:nvSpPr>
+        <p:spPr>
+          <a:xfrm rot="5400000" flipH="1">
+            <a:off x="1132003" y="929897"/>
+            <a:ext cx="1979238" cy="1991302"/>
+          </a:xfrm>
+          <a:prstGeom prst="blockArc">
+            <a:avLst>
+              <a:gd name="adj1" fmla="val 10800000"/>
+              <a:gd name="adj2" fmla="val 86715"/>
+              <a:gd name="adj3" fmla="val 0"/>
+            </a:avLst>
+          </a:prstGeom>
+          <a:noFill/>
+          <a:ln w="381000">
+            <a:solidFill>
+              <a:srgbClr val="CF1259"/>
+            </a:solidFill>
+          </a:ln>
+        </p:spPr>
+        <p:style>
+          <a:lnRef idx="2">
+            <a:schemeClr val="accent1">
+              <a:shade val="50000"/>
+            </a:schemeClr>
+          </a:lnRef>
+          <a:fillRef idx="1">
+            <a:schemeClr val="accent1"/>
+          </a:fillRef>
+          <a:effectRef idx="0">
+            <a:schemeClr val="accent1"/>
+          </a:effectRef>
+          <a:fontRef idx="minor">
+            <a:schemeClr val="lt1"/>
+          </a:fontRef>
+        </p:style>
+        <p:txBody>
+          <a:bodyPr rtlCol="0" anchor="ctr"/>
+          <a:lstStyle/>
+          <a:p>
+            <a:pPr algn="ctr"/>
+            <a:endParaRPr lang="pt-BR"/>
+          </a:p>
+        </p:txBody>
+      </p:sp>
+      <p:sp>
+        <p:nvSpPr>
+          <p:cNvPr id="8" name="Semicírculo 7">
+            <a:extLst>
+              <a:ext uri="{FF2B5EF4-FFF2-40B4-BE49-F238E27FC236}">
+                <a16:creationId xmlns:a16="http://schemas.microsoft.com/office/drawing/2014/main" id="{1968A6F0-DCE1-BBB0-A637-7B750448D69B}"/>
+              </a:ext>
+            </a:extLst>
+          </p:cNvPr>
+          <p:cNvSpPr/>
+          <p:nvPr/>
+        </p:nvSpPr>
+        <p:spPr>
+          <a:xfrm rot="5400000" flipH="1">
+            <a:off x="1132003" y="2909135"/>
+            <a:ext cx="1979238" cy="1991302"/>
+          </a:xfrm>
+          <a:prstGeom prst="blockArc">
+            <a:avLst>
+              <a:gd name="adj1" fmla="val 10800000"/>
+              <a:gd name="adj2" fmla="val 86715"/>
+              <a:gd name="adj3" fmla="val 0"/>
+            </a:avLst>
+          </a:prstGeom>
+          <a:noFill/>
+          <a:ln w="381000">
+            <a:solidFill>
+              <a:srgbClr val="CF1259"/>
+            </a:solidFill>
+          </a:ln>
+        </p:spPr>
+        <p:style>
+          <a:lnRef idx="2">
+            <a:schemeClr val="accent1">
+              <a:shade val="50000"/>
+            </a:schemeClr>
+          </a:lnRef>
+          <a:fillRef idx="1">
+            <a:schemeClr val="accent1"/>
+          </a:fillRef>
+          <a:effectRef idx="0">
+            <a:schemeClr val="accent1"/>
+          </a:effectRef>
+          <a:fontRef idx="minor">
+            <a:schemeClr val="lt1"/>
+          </a:fontRef>
+        </p:style>
+        <p:txBody>
+          <a:bodyPr rtlCol="0" anchor="ctr"/>
+          <a:lstStyle/>
+          <a:p>
+            <a:pPr algn="ctr"/>
+            <a:endParaRPr lang="pt-BR"/>
+          </a:p>
+        </p:txBody>
+      </p:sp>
+      <p:cxnSp>
+        <p:nvCxnSpPr>
+          <p:cNvPr id="10" name="Conector reto 9">
+            <a:extLst>
+              <a:ext uri="{FF2B5EF4-FFF2-40B4-BE49-F238E27FC236}">
+                <a16:creationId xmlns:a16="http://schemas.microsoft.com/office/drawing/2014/main" id="{38E1857C-CED3-905A-FB7D-8274C1516971}"/>
+              </a:ext>
+            </a:extLst>
+          </p:cNvPr>
+          <p:cNvCxnSpPr>
+            <a:cxnSpLocks/>
+            <a:stCxn id="6" idx="1"/>
+          </p:cNvCxnSpPr>
+          <p:nvPr/>
+        </p:nvCxnSpPr>
+        <p:spPr>
+          <a:xfrm flipV="1">
+            <a:off x="4494279" y="3003344"/>
+            <a:ext cx="1579063" cy="312"/>
+          </a:xfrm>
+          <a:prstGeom prst="line">
+            <a:avLst/>
+          </a:prstGeom>
+          <a:ln w="381000">
+            <a:solidFill>
+              <a:srgbClr val="CF1259"/>
+            </a:solidFill>
+          </a:ln>
+        </p:spPr>
+        <p:style>
+          <a:lnRef idx="1">
+            <a:schemeClr val="accent1"/>
+          </a:lnRef>
+          <a:fillRef idx="0">
+            <a:schemeClr val="accent1"/>
+          </a:fillRef>
+          <a:effectRef idx="0">
+            <a:schemeClr val="accent1"/>
+          </a:effectRef>
+          <a:fontRef idx="minor">
+            <a:schemeClr val="tx1"/>
+          </a:fontRef>
+        </p:style>
+      </p:cxnSp>
+      <p:cxnSp>
+        <p:nvCxnSpPr>
+          <p:cNvPr id="11" name="Conector reto 10">
+            <a:extLst>
+              <a:ext uri="{FF2B5EF4-FFF2-40B4-BE49-F238E27FC236}">
+                <a16:creationId xmlns:a16="http://schemas.microsoft.com/office/drawing/2014/main" id="{FDC6EC66-1F5B-37A4-2CCF-BE4751FC5E2E}"/>
+              </a:ext>
+            </a:extLst>
+          </p:cNvPr>
+          <p:cNvCxnSpPr/>
+          <p:nvPr/>
+        </p:nvCxnSpPr>
+        <p:spPr>
+          <a:xfrm flipV="1">
+            <a:off x="690202" y="2914855"/>
+            <a:ext cx="1579063" cy="312"/>
+          </a:xfrm>
+          <a:prstGeom prst="line">
+            <a:avLst/>
+          </a:prstGeom>
+          <a:ln w="381000">
+            <a:solidFill>
+              <a:srgbClr val="CF1259"/>
+            </a:solidFill>
+          </a:ln>
+        </p:spPr>
+        <p:style>
+          <a:lnRef idx="1">
+            <a:schemeClr val="accent1"/>
+          </a:lnRef>
+          <a:fillRef idx="0">
+            <a:schemeClr val="accent1"/>
+          </a:fillRef>
+          <a:effectRef idx="0">
+            <a:schemeClr val="accent1"/>
+          </a:effectRef>
+          <a:fontRef idx="minor">
+            <a:schemeClr val="tx1"/>
+          </a:fontRef>
+        </p:style>
+      </p:cxnSp>
+    </p:spTree>
+    <p:extLst>
+      <p:ext uri="{BB962C8B-B14F-4D97-AF65-F5344CB8AC3E}">
+        <p14:creationId xmlns:p14="http://schemas.microsoft.com/office/powerpoint/2010/main" val="706348488"/>
+      </p:ext>
+    </p:extLst>
+  </p:cSld>
+  <p:clrMapOvr>
+    <a:masterClrMapping/>
+  </p:clrMapOvr>
+</p:sld>
+</file>
+
+<file path=ppt/slides/slide12.xml><?xml version="1.0" encoding="utf-8"?>
+<p:sld xmlns:a="http://schemas.openxmlformats.org/drawingml/2006/main" xmlns:r="http://schemas.openxmlformats.org/officeDocument/2006/relationships" xmlns:p="http://schemas.openxmlformats.org/presentationml/2006/main">
+  <p:cSld>
+    <p:spTree>
+      <p:nvGrpSpPr>
+        <p:cNvPr id="1" name=""/>
+        <p:cNvGrpSpPr/>
+        <p:nvPr/>
+      </p:nvGrpSpPr>
+      <p:grpSpPr>
+        <a:xfrm>
+          <a:off x="0" y="0"/>
+          <a:ext cx="0" cy="0"/>
+          <a:chOff x="0" y="0"/>
+          <a:chExt cx="0" cy="0"/>
+        </a:xfrm>
+      </p:grpSpPr>
+      <p:sp>
+        <p:nvSpPr>
+          <p:cNvPr id="4" name="Retângulo 3">
+            <a:extLst>
+              <a:ext uri="{FF2B5EF4-FFF2-40B4-BE49-F238E27FC236}">
+                <a16:creationId xmlns:a16="http://schemas.microsoft.com/office/drawing/2014/main" id="{73521BF0-0376-2073-7FDD-6DD8B0C9B5B6}"/>
+              </a:ext>
+            </a:extLst>
+          </p:cNvPr>
+          <p:cNvSpPr/>
+          <p:nvPr/>
+        </p:nvSpPr>
+        <p:spPr>
+          <a:xfrm>
+            <a:off x="0" y="1"/>
+            <a:ext cx="7199313" cy="7199312"/>
+          </a:xfrm>
+          <a:prstGeom prst="rect">
+            <a:avLst/>
+          </a:prstGeom>
+          <a:solidFill>
+            <a:srgbClr val="0095BA"/>
+          </a:solidFill>
+          <a:ln>
+            <a:noFill/>
+          </a:ln>
+        </p:spPr>
+        <p:style>
+          <a:lnRef idx="2">
+            <a:schemeClr val="accent1">
+              <a:shade val="50000"/>
+            </a:schemeClr>
+          </a:lnRef>
+          <a:fillRef idx="1">
+            <a:schemeClr val="accent1"/>
+          </a:fillRef>
+          <a:effectRef idx="0">
+            <a:schemeClr val="accent1"/>
+          </a:effectRef>
+          <a:fontRef idx="minor">
+            <a:schemeClr val="lt1"/>
+          </a:fontRef>
+        </p:style>
+        <p:txBody>
+          <a:bodyPr rtlCol="0" anchor="ctr"/>
+          <a:lstStyle/>
+          <a:p>
+            <a:pPr algn="ctr"/>
+            <a:endParaRPr lang="pt-BR" dirty="0"/>
+          </a:p>
+        </p:txBody>
+      </p:sp>
+      <p:pic>
+        <p:nvPicPr>
+          <p:cNvPr id="12" name="Gráfico 11" descr="Adicionar com preenchimento sólido">
+            <a:extLst>
+              <a:ext uri="{FF2B5EF4-FFF2-40B4-BE49-F238E27FC236}">
+                <a16:creationId xmlns:a16="http://schemas.microsoft.com/office/drawing/2014/main" id="{06C3E47E-7254-FBD9-D33F-EBD7A9611FC4}"/>
+              </a:ext>
+            </a:extLst>
+          </p:cNvPr>
+          <p:cNvPicPr>
+            <a:picLocks noChangeAspect="1"/>
+          </p:cNvPicPr>
+          <p:nvPr/>
+        </p:nvPicPr>
+        <p:blipFill>
+          <a:blip r:embed="rId2">
+            <a:extLst>
+              <a:ext uri="{28A0092B-C50C-407E-A947-70E740481C1C}">
+                <a14:useLocalDpi xmlns:a14="http://schemas.microsoft.com/office/drawing/2010/main" val="0"/>
+              </a:ext>
+              <a:ext uri="{96DAC541-7B7A-43D3-8B79-37D633B846F1}">
+                <asvg:svgBlip xmlns:asvg="http://schemas.microsoft.com/office/drawing/2016/SVG/main" r:embed="rId3"/>
+              </a:ext>
+            </a:extLst>
+          </a:blip>
+          <a:stretch>
+            <a:fillRect/>
+          </a:stretch>
+        </p:blipFill>
+        <p:spPr>
+          <a:xfrm>
+            <a:off x="4977535" y="4977534"/>
+            <a:ext cx="2221778" cy="2221778"/>
+          </a:xfrm>
+          <a:prstGeom prst="rect">
+            <a:avLst/>
+          </a:prstGeom>
+        </p:spPr>
+      </p:pic>
+      <p:cxnSp>
+        <p:nvCxnSpPr>
+          <p:cNvPr id="5" name="Conector reto 4">
+            <a:extLst>
+              <a:ext uri="{FF2B5EF4-FFF2-40B4-BE49-F238E27FC236}">
+                <a16:creationId xmlns:a16="http://schemas.microsoft.com/office/drawing/2014/main" id="{4D05363C-7AA0-4773-9366-D00436A2811A}"/>
+              </a:ext>
+            </a:extLst>
+          </p:cNvPr>
+          <p:cNvCxnSpPr>
+            <a:cxnSpLocks/>
+          </p:cNvCxnSpPr>
+          <p:nvPr/>
+        </p:nvCxnSpPr>
+        <p:spPr>
+          <a:xfrm>
+            <a:off x="581891" y="3200400"/>
+            <a:ext cx="5846618" cy="0"/>
+          </a:xfrm>
+          <a:prstGeom prst="line">
+            <a:avLst/>
+          </a:prstGeom>
+          <a:ln w="381000">
+            <a:solidFill>
+              <a:srgbClr val="CF1259"/>
+            </a:solidFill>
+          </a:ln>
+        </p:spPr>
+        <p:style>
+          <a:lnRef idx="1">
+            <a:schemeClr val="accent1"/>
+          </a:lnRef>
+          <a:fillRef idx="0">
+            <a:schemeClr val="accent1"/>
+          </a:fillRef>
+          <a:effectRef idx="0">
+            <a:schemeClr val="accent1"/>
+          </a:effectRef>
+          <a:fontRef idx="minor">
+            <a:schemeClr val="tx1"/>
+          </a:fontRef>
+        </p:style>
+      </p:cxnSp>
+      <p:sp>
+        <p:nvSpPr>
+          <p:cNvPr id="37" name="Semicírculo 36">
+            <a:extLst>
+              <a:ext uri="{FF2B5EF4-FFF2-40B4-BE49-F238E27FC236}">
+                <a16:creationId xmlns:a16="http://schemas.microsoft.com/office/drawing/2014/main" id="{43C977D9-81B0-D2D4-E9E7-773692A17329}"/>
+              </a:ext>
+            </a:extLst>
+          </p:cNvPr>
+          <p:cNvSpPr/>
+          <p:nvPr/>
+        </p:nvSpPr>
+        <p:spPr>
+          <a:xfrm>
+            <a:off x="1604361" y="1995141"/>
+            <a:ext cx="1826716" cy="1761318"/>
+          </a:xfrm>
+          <a:prstGeom prst="blockArc">
+            <a:avLst>
+              <a:gd name="adj1" fmla="val 10800000"/>
+              <a:gd name="adj2" fmla="val 13763"/>
+              <a:gd name="adj3" fmla="val 0"/>
+            </a:avLst>
+          </a:prstGeom>
+          <a:ln w="381000">
+            <a:solidFill>
+              <a:srgbClr val="CF1259"/>
+            </a:solidFill>
+          </a:ln>
+        </p:spPr>
+        <p:style>
+          <a:lnRef idx="2">
+            <a:schemeClr val="accent1">
+              <a:shade val="50000"/>
+            </a:schemeClr>
+          </a:lnRef>
+          <a:fillRef idx="1">
+            <a:schemeClr val="accent1"/>
+          </a:fillRef>
+          <a:effectRef idx="0">
+            <a:schemeClr val="accent1"/>
+          </a:effectRef>
+          <a:fontRef idx="minor">
+            <a:schemeClr val="lt1"/>
+          </a:fontRef>
+        </p:style>
+        <p:txBody>
+          <a:bodyPr rtlCol="0" anchor="ctr"/>
+          <a:lstStyle/>
+          <a:p>
+            <a:pPr algn="ctr"/>
+            <a:endParaRPr lang="pt-BR">
+              <a:solidFill>
+                <a:schemeClr val="tx1"/>
+              </a:solidFill>
+            </a:endParaRPr>
+          </a:p>
+        </p:txBody>
+      </p:sp>
+      <p:cxnSp>
+        <p:nvCxnSpPr>
+          <p:cNvPr id="60" name="Conector reto 59">
+            <a:extLst>
+              <a:ext uri="{FF2B5EF4-FFF2-40B4-BE49-F238E27FC236}">
+                <a16:creationId xmlns:a16="http://schemas.microsoft.com/office/drawing/2014/main" id="{1EED3C80-29A9-00FC-38F9-8CB0667083B5}"/>
+              </a:ext>
+            </a:extLst>
+          </p:cNvPr>
+          <p:cNvCxnSpPr>
+            <a:stCxn id="37" idx="0"/>
+          </p:cNvCxnSpPr>
+          <p:nvPr/>
+        </p:nvCxnSpPr>
+        <p:spPr>
+          <a:xfrm flipH="1">
+            <a:off x="1574567" y="2875800"/>
+            <a:ext cx="29794" cy="1545677"/>
+          </a:xfrm>
+          <a:prstGeom prst="line">
+            <a:avLst/>
+          </a:prstGeom>
+          <a:ln w="381000">
+            <a:solidFill>
+              <a:srgbClr val="CF1259"/>
+            </a:solidFill>
+          </a:ln>
+        </p:spPr>
+        <p:style>
+          <a:lnRef idx="1">
+            <a:schemeClr val="accent1"/>
+          </a:lnRef>
+          <a:fillRef idx="0">
+            <a:schemeClr val="accent1"/>
+          </a:fillRef>
+          <a:effectRef idx="0">
+            <a:schemeClr val="accent1"/>
+          </a:effectRef>
+          <a:fontRef idx="minor">
+            <a:schemeClr val="tx1"/>
+          </a:fontRef>
+        </p:style>
+      </p:cxnSp>
+      <p:cxnSp>
+        <p:nvCxnSpPr>
+          <p:cNvPr id="66" name="Conector reto 65">
+            <a:extLst>
+              <a:ext uri="{FF2B5EF4-FFF2-40B4-BE49-F238E27FC236}">
+                <a16:creationId xmlns:a16="http://schemas.microsoft.com/office/drawing/2014/main" id="{96AF2F8C-75B4-3565-348E-0B5C04A6D50A}"/>
+              </a:ext>
+            </a:extLst>
+          </p:cNvPr>
+          <p:cNvCxnSpPr>
+            <a:stCxn id="37" idx="1"/>
+          </p:cNvCxnSpPr>
+          <p:nvPr/>
+        </p:nvCxnSpPr>
+        <p:spPr>
+          <a:xfrm>
+            <a:off x="3431069" y="2879457"/>
+            <a:ext cx="8" cy="1542020"/>
+          </a:xfrm>
+          <a:prstGeom prst="line">
+            <a:avLst/>
+          </a:prstGeom>
+          <a:ln w="381000">
+            <a:solidFill>
+              <a:srgbClr val="CF1259"/>
+            </a:solidFill>
+          </a:ln>
+        </p:spPr>
+        <p:style>
+          <a:lnRef idx="1">
+            <a:schemeClr val="accent1"/>
+          </a:lnRef>
+          <a:fillRef idx="0">
+            <a:schemeClr val="accent1"/>
+          </a:fillRef>
+          <a:effectRef idx="0">
+            <a:schemeClr val="accent1"/>
+          </a:effectRef>
+          <a:fontRef idx="minor">
+            <a:schemeClr val="tx1"/>
+          </a:fontRef>
+        </p:style>
+      </p:cxnSp>
+      <p:sp>
+        <p:nvSpPr>
+          <p:cNvPr id="68" name="Semicírculo 67">
+            <a:extLst>
+              <a:ext uri="{FF2B5EF4-FFF2-40B4-BE49-F238E27FC236}">
+                <a16:creationId xmlns:a16="http://schemas.microsoft.com/office/drawing/2014/main" id="{84E7688D-1662-D334-6514-884684E14ACB}"/>
+              </a:ext>
+            </a:extLst>
+          </p:cNvPr>
+          <p:cNvSpPr/>
+          <p:nvPr/>
+        </p:nvSpPr>
+        <p:spPr>
+          <a:xfrm>
+            <a:off x="3460871" y="1995141"/>
+            <a:ext cx="1826716" cy="1761318"/>
+          </a:xfrm>
+          <a:prstGeom prst="blockArc">
+            <a:avLst>
+              <a:gd name="adj1" fmla="val 10800000"/>
+              <a:gd name="adj2" fmla="val 13763"/>
+              <a:gd name="adj3" fmla="val 0"/>
+            </a:avLst>
+          </a:prstGeom>
+          <a:ln w="381000">
+            <a:solidFill>
+              <a:srgbClr val="CF1259"/>
+            </a:solidFill>
+          </a:ln>
+        </p:spPr>
+        <p:style>
+          <a:lnRef idx="2">
+            <a:schemeClr val="accent1">
+              <a:shade val="50000"/>
+            </a:schemeClr>
+          </a:lnRef>
+          <a:fillRef idx="1">
+            <a:schemeClr val="accent1"/>
+          </a:fillRef>
+          <a:effectRef idx="0">
+            <a:schemeClr val="accent1"/>
+          </a:effectRef>
+          <a:fontRef idx="minor">
+            <a:schemeClr val="lt1"/>
+          </a:fontRef>
+        </p:style>
+        <p:txBody>
+          <a:bodyPr rtlCol="0" anchor="ctr"/>
+          <a:lstStyle/>
+          <a:p>
+            <a:pPr algn="ctr"/>
+            <a:endParaRPr lang="pt-BR">
+              <a:solidFill>
+                <a:schemeClr val="tx1"/>
+              </a:solidFill>
+            </a:endParaRPr>
+          </a:p>
+        </p:txBody>
+      </p:sp>
+      <p:cxnSp>
+        <p:nvCxnSpPr>
+          <p:cNvPr id="70" name="Conector reto 69">
+            <a:extLst>
+              <a:ext uri="{FF2B5EF4-FFF2-40B4-BE49-F238E27FC236}">
+                <a16:creationId xmlns:a16="http://schemas.microsoft.com/office/drawing/2014/main" id="{6D48C7E2-422B-F806-8030-ABE258226C1B}"/>
+              </a:ext>
+            </a:extLst>
+          </p:cNvPr>
+          <p:cNvCxnSpPr>
+            <a:stCxn id="68" idx="1"/>
+          </p:cNvCxnSpPr>
+          <p:nvPr/>
+        </p:nvCxnSpPr>
+        <p:spPr>
+          <a:xfrm>
+            <a:off x="5287579" y="2879457"/>
+            <a:ext cx="8" cy="1542020"/>
+          </a:xfrm>
+          <a:prstGeom prst="line">
+            <a:avLst/>
+          </a:prstGeom>
+          <a:ln w="381000">
+            <a:solidFill>
+              <a:srgbClr val="CF1259"/>
+            </a:solidFill>
+          </a:ln>
+        </p:spPr>
+        <p:style>
+          <a:lnRef idx="1">
+            <a:schemeClr val="accent1"/>
+          </a:lnRef>
+          <a:fillRef idx="0">
+            <a:schemeClr val="accent1"/>
+          </a:fillRef>
+          <a:effectRef idx="0">
+            <a:schemeClr val="accent1"/>
+          </a:effectRef>
+          <a:fontRef idx="minor">
+            <a:schemeClr val="tx1"/>
+          </a:fontRef>
+        </p:style>
+      </p:cxnSp>
+    </p:spTree>
+    <p:extLst>
+      <p:ext uri="{BB962C8B-B14F-4D97-AF65-F5344CB8AC3E}">
+        <p14:creationId xmlns:p14="http://schemas.microsoft.com/office/powerpoint/2010/main" val="3419823524"/>
+      </p:ext>
+    </p:extLst>
+  </p:cSld>
+  <p:clrMapOvr>
+    <a:masterClrMapping/>
+  </p:clrMapOvr>
+</p:sld>
+</file>
+
+<file path=ppt/slides/slide13.xml><?xml version="1.0" encoding="utf-8"?>
+<p:sld xmlns:a="http://schemas.openxmlformats.org/drawingml/2006/main" xmlns:r="http://schemas.openxmlformats.org/officeDocument/2006/relationships" xmlns:p="http://schemas.openxmlformats.org/presentationml/2006/main">
+  <p:cSld>
+    <p:spTree>
+      <p:nvGrpSpPr>
+        <p:cNvPr id="1" name=""/>
+        <p:cNvGrpSpPr/>
+        <p:nvPr/>
+      </p:nvGrpSpPr>
+      <p:grpSpPr>
+        <a:xfrm>
+          <a:off x="0" y="0"/>
+          <a:ext cx="0" cy="0"/>
+          <a:chOff x="0" y="0"/>
+          <a:chExt cx="0" cy="0"/>
+        </a:xfrm>
+      </p:grpSpPr>
+      <p:sp>
+        <p:nvSpPr>
+          <p:cNvPr id="4" name="Retângulo 3">
+            <a:extLst>
+              <a:ext uri="{FF2B5EF4-FFF2-40B4-BE49-F238E27FC236}">
+                <a16:creationId xmlns:a16="http://schemas.microsoft.com/office/drawing/2014/main" id="{73521BF0-0376-2073-7FDD-6DD8B0C9B5B6}"/>
+              </a:ext>
+            </a:extLst>
+          </p:cNvPr>
+          <p:cNvSpPr/>
+          <p:nvPr/>
+        </p:nvSpPr>
+        <p:spPr>
+          <a:xfrm>
+            <a:off x="0" y="1"/>
+            <a:ext cx="7199313" cy="7199312"/>
+          </a:xfrm>
+          <a:prstGeom prst="rect">
+            <a:avLst/>
+          </a:prstGeom>
+          <a:solidFill>
+            <a:srgbClr val="0095BA"/>
+          </a:solidFill>
+          <a:ln>
+            <a:noFill/>
+          </a:ln>
+        </p:spPr>
+        <p:style>
+          <a:lnRef idx="2">
+            <a:schemeClr val="accent1">
+              <a:shade val="50000"/>
+            </a:schemeClr>
+          </a:lnRef>
+          <a:fillRef idx="1">
+            <a:schemeClr val="accent1"/>
+          </a:fillRef>
+          <a:effectRef idx="0">
+            <a:schemeClr val="accent1"/>
+          </a:effectRef>
+          <a:fontRef idx="minor">
+            <a:schemeClr val="lt1"/>
+          </a:fontRef>
+        </p:style>
+        <p:txBody>
+          <a:bodyPr rtlCol="0" anchor="ctr"/>
+          <a:lstStyle/>
+          <a:p>
+            <a:pPr algn="ctr"/>
+            <a:endParaRPr lang="pt-BR" dirty="0"/>
+          </a:p>
+        </p:txBody>
+      </p:sp>
+      <p:pic>
+        <p:nvPicPr>
+          <p:cNvPr id="12" name="Gráfico 11" descr="Adicionar com preenchimento sólido">
+            <a:extLst>
+              <a:ext uri="{FF2B5EF4-FFF2-40B4-BE49-F238E27FC236}">
+                <a16:creationId xmlns:a16="http://schemas.microsoft.com/office/drawing/2014/main" id="{06C3E47E-7254-FBD9-D33F-EBD7A9611FC4}"/>
+              </a:ext>
+            </a:extLst>
+          </p:cNvPr>
+          <p:cNvPicPr>
+            <a:picLocks noChangeAspect="1"/>
+          </p:cNvPicPr>
+          <p:nvPr/>
+        </p:nvPicPr>
+        <p:blipFill>
+          <a:blip r:embed="rId2">
+            <a:extLst>
+              <a:ext uri="{28A0092B-C50C-407E-A947-70E740481C1C}">
+                <a14:useLocalDpi xmlns:a14="http://schemas.microsoft.com/office/drawing/2010/main" val="0"/>
+              </a:ext>
+              <a:ext uri="{96DAC541-7B7A-43D3-8B79-37D633B846F1}">
+                <asvg:svgBlip xmlns:asvg="http://schemas.microsoft.com/office/drawing/2016/SVG/main" r:embed="rId3"/>
+              </a:ext>
+            </a:extLst>
+          </a:blip>
+          <a:stretch>
+            <a:fillRect/>
+          </a:stretch>
+        </p:blipFill>
+        <p:spPr>
+          <a:xfrm>
+            <a:off x="4977535" y="4977534"/>
+            <a:ext cx="2221778" cy="2221778"/>
+          </a:xfrm>
+          <a:prstGeom prst="rect">
+            <a:avLst/>
+          </a:prstGeom>
+        </p:spPr>
+      </p:pic>
+      <p:cxnSp>
+        <p:nvCxnSpPr>
+          <p:cNvPr id="3" name="Conector reto 2">
+            <a:extLst>
+              <a:ext uri="{FF2B5EF4-FFF2-40B4-BE49-F238E27FC236}">
+                <a16:creationId xmlns:a16="http://schemas.microsoft.com/office/drawing/2014/main" id="{5DF2E0F4-7D85-AFD3-8237-8FC7EDD9B57A}"/>
+              </a:ext>
+            </a:extLst>
+          </p:cNvPr>
+          <p:cNvCxnSpPr>
+            <a:cxnSpLocks/>
+          </p:cNvCxnSpPr>
+          <p:nvPr/>
+        </p:nvCxnSpPr>
+        <p:spPr>
+          <a:xfrm>
+            <a:off x="1161417" y="1676399"/>
+            <a:ext cx="2937164" cy="0"/>
+          </a:xfrm>
+          <a:prstGeom prst="line">
+            <a:avLst/>
+          </a:prstGeom>
+          <a:ln w="381000">
+            <a:solidFill>
+              <a:srgbClr val="CF1259"/>
+            </a:solidFill>
+          </a:ln>
+        </p:spPr>
+        <p:style>
+          <a:lnRef idx="1">
+            <a:schemeClr val="accent1"/>
+          </a:lnRef>
+          <a:fillRef idx="0">
+            <a:schemeClr val="accent1"/>
+          </a:fillRef>
+          <a:effectRef idx="0">
+            <a:schemeClr val="accent1"/>
+          </a:effectRef>
+          <a:fontRef idx="minor">
+            <a:schemeClr val="tx1"/>
+          </a:fontRef>
+        </p:style>
+      </p:cxnSp>
+      <p:cxnSp>
+        <p:nvCxnSpPr>
+          <p:cNvPr id="7" name="Conector reto 6">
+            <a:extLst>
+              <a:ext uri="{FF2B5EF4-FFF2-40B4-BE49-F238E27FC236}">
+                <a16:creationId xmlns:a16="http://schemas.microsoft.com/office/drawing/2014/main" id="{12DD2CDF-5270-E761-AF2D-792B5875DD5B}"/>
+              </a:ext>
+            </a:extLst>
+          </p:cNvPr>
+          <p:cNvCxnSpPr>
+            <a:cxnSpLocks/>
+          </p:cNvCxnSpPr>
+          <p:nvPr/>
+        </p:nvCxnSpPr>
+        <p:spPr>
+          <a:xfrm>
+            <a:off x="3912728" y="1537853"/>
+            <a:ext cx="0" cy="1343892"/>
+          </a:xfrm>
+          <a:prstGeom prst="line">
+            <a:avLst/>
+          </a:prstGeom>
+          <a:ln w="381000">
+            <a:solidFill>
+              <a:srgbClr val="CF1259"/>
+            </a:solidFill>
+          </a:ln>
+        </p:spPr>
+        <p:style>
+          <a:lnRef idx="1">
+            <a:schemeClr val="accent1"/>
+          </a:lnRef>
+          <a:fillRef idx="0">
+            <a:schemeClr val="accent1"/>
+          </a:fillRef>
+          <a:effectRef idx="0">
+            <a:schemeClr val="accent1"/>
+          </a:effectRef>
+          <a:fontRef idx="minor">
+            <a:schemeClr val="tx1"/>
+          </a:fontRef>
+        </p:style>
+      </p:cxnSp>
+      <p:cxnSp>
+        <p:nvCxnSpPr>
+          <p:cNvPr id="10" name="Conector reto 9">
+            <a:extLst>
+              <a:ext uri="{FF2B5EF4-FFF2-40B4-BE49-F238E27FC236}">
+                <a16:creationId xmlns:a16="http://schemas.microsoft.com/office/drawing/2014/main" id="{79B09E4B-C8AC-D735-1443-C4B930ABB7D5}"/>
+              </a:ext>
+            </a:extLst>
+          </p:cNvPr>
+          <p:cNvCxnSpPr>
+            <a:cxnSpLocks/>
+          </p:cNvCxnSpPr>
+          <p:nvPr/>
+        </p:nvCxnSpPr>
+        <p:spPr>
+          <a:xfrm>
+            <a:off x="2526683" y="3047998"/>
+            <a:ext cx="2772090" cy="0"/>
+          </a:xfrm>
+          <a:prstGeom prst="line">
+            <a:avLst/>
+          </a:prstGeom>
+          <a:ln w="381000">
+            <a:solidFill>
+              <a:srgbClr val="CF1259"/>
+            </a:solidFill>
+          </a:ln>
+        </p:spPr>
+        <p:style>
+          <a:lnRef idx="1">
+            <a:schemeClr val="accent1"/>
+          </a:lnRef>
+          <a:fillRef idx="0">
+            <a:schemeClr val="accent1"/>
+          </a:fillRef>
+          <a:effectRef idx="0">
+            <a:schemeClr val="accent1"/>
+          </a:effectRef>
+          <a:fontRef idx="minor">
+            <a:schemeClr val="tx1"/>
+          </a:fontRef>
+        </p:style>
+      </p:cxnSp>
+      <p:cxnSp>
+        <p:nvCxnSpPr>
+          <p:cNvPr id="11" name="Conector reto 10">
+            <a:extLst>
+              <a:ext uri="{FF2B5EF4-FFF2-40B4-BE49-F238E27FC236}">
+                <a16:creationId xmlns:a16="http://schemas.microsoft.com/office/drawing/2014/main" id="{A2EA6CEA-5F7A-E596-817C-37EA492B5107}"/>
+              </a:ext>
+            </a:extLst>
+          </p:cNvPr>
+          <p:cNvCxnSpPr>
+            <a:cxnSpLocks/>
+          </p:cNvCxnSpPr>
+          <p:nvPr/>
+        </p:nvCxnSpPr>
+        <p:spPr>
+          <a:xfrm>
+            <a:off x="3043355" y="3785970"/>
+            <a:ext cx="1738746" cy="0"/>
+          </a:xfrm>
+          <a:prstGeom prst="line">
+            <a:avLst/>
+          </a:prstGeom>
+          <a:ln w="381000">
+            <a:solidFill>
+              <a:srgbClr val="CF1259"/>
+            </a:solidFill>
+          </a:ln>
+        </p:spPr>
+        <p:style>
+          <a:lnRef idx="1">
+            <a:schemeClr val="accent1"/>
+          </a:lnRef>
+          <a:fillRef idx="0">
+            <a:schemeClr val="accent1"/>
+          </a:fillRef>
+          <a:effectRef idx="0">
+            <a:schemeClr val="accent1"/>
+          </a:effectRef>
+          <a:fontRef idx="minor">
+            <a:schemeClr val="tx1"/>
+          </a:fontRef>
+        </p:style>
+      </p:cxnSp>
+      <p:cxnSp>
+        <p:nvCxnSpPr>
+          <p:cNvPr id="14" name="Conector reto 13">
+            <a:extLst>
+              <a:ext uri="{FF2B5EF4-FFF2-40B4-BE49-F238E27FC236}">
+                <a16:creationId xmlns:a16="http://schemas.microsoft.com/office/drawing/2014/main" id="{A20536C0-184F-44B5-5AF0-F5BC96EAF8F5}"/>
+              </a:ext>
+            </a:extLst>
+          </p:cNvPr>
+          <p:cNvCxnSpPr>
+            <a:cxnSpLocks/>
+          </p:cNvCxnSpPr>
+          <p:nvPr/>
+        </p:nvCxnSpPr>
+        <p:spPr>
+          <a:xfrm>
+            <a:off x="3493137" y="4531950"/>
+            <a:ext cx="906291" cy="0"/>
+          </a:xfrm>
+          <a:prstGeom prst="line">
+            <a:avLst/>
+          </a:prstGeom>
+          <a:ln w="381000">
+            <a:solidFill>
+              <a:srgbClr val="CF1259"/>
+            </a:solidFill>
+          </a:ln>
+        </p:spPr>
+        <p:style>
+          <a:lnRef idx="1">
+            <a:schemeClr val="accent1"/>
+          </a:lnRef>
+          <a:fillRef idx="0">
+            <a:schemeClr val="accent1"/>
+          </a:fillRef>
+          <a:effectRef idx="0">
+            <a:schemeClr val="accent1"/>
+          </a:effectRef>
+          <a:fontRef idx="minor">
+            <a:schemeClr val="tx1"/>
+          </a:fontRef>
+        </p:style>
+      </p:cxnSp>
+    </p:spTree>
+    <p:extLst>
+      <p:ext uri="{BB962C8B-B14F-4D97-AF65-F5344CB8AC3E}">
+        <p14:creationId xmlns:p14="http://schemas.microsoft.com/office/powerpoint/2010/main" val="2818289404"/>
+      </p:ext>
+    </p:extLst>
+  </p:cSld>
+  <p:clrMapOvr>
+    <a:masterClrMapping/>
+  </p:clrMapOvr>
+</p:sld>
+</file>
+
+<file path=ppt/slides/slide14.xml><?xml version="1.0" encoding="utf-8"?>
+<p:sld xmlns:a="http://schemas.openxmlformats.org/drawingml/2006/main" xmlns:r="http://schemas.openxmlformats.org/officeDocument/2006/relationships" xmlns:p="http://schemas.openxmlformats.org/presentationml/2006/main">
+  <p:cSld>
+    <p:spTree>
+      <p:nvGrpSpPr>
+        <p:cNvPr id="1" name=""/>
+        <p:cNvGrpSpPr/>
+        <p:nvPr/>
+      </p:nvGrpSpPr>
+      <p:grpSpPr>
+        <a:xfrm>
+          <a:off x="0" y="0"/>
+          <a:ext cx="0" cy="0"/>
+          <a:chOff x="0" y="0"/>
+          <a:chExt cx="0" cy="0"/>
+        </a:xfrm>
+      </p:grpSpPr>
+      <p:sp>
+        <p:nvSpPr>
+          <p:cNvPr id="4" name="Retângulo 3">
+            <a:extLst>
+              <a:ext uri="{FF2B5EF4-FFF2-40B4-BE49-F238E27FC236}">
+                <a16:creationId xmlns:a16="http://schemas.microsoft.com/office/drawing/2014/main" id="{73521BF0-0376-2073-7FDD-6DD8B0C9B5B6}"/>
+              </a:ext>
+            </a:extLst>
+          </p:cNvPr>
+          <p:cNvSpPr/>
+          <p:nvPr/>
+        </p:nvSpPr>
+        <p:spPr>
+          <a:xfrm>
+            <a:off x="0" y="1"/>
+            <a:ext cx="7199313" cy="7199312"/>
+          </a:xfrm>
+          <a:prstGeom prst="rect">
+            <a:avLst/>
+          </a:prstGeom>
+          <a:solidFill>
+            <a:srgbClr val="0095BA"/>
+          </a:solidFill>
+          <a:ln>
+            <a:noFill/>
+          </a:ln>
+        </p:spPr>
+        <p:style>
+          <a:lnRef idx="2">
+            <a:schemeClr val="accent1">
+              <a:shade val="50000"/>
+            </a:schemeClr>
+          </a:lnRef>
+          <a:fillRef idx="1">
+            <a:schemeClr val="accent1"/>
+          </a:fillRef>
+          <a:effectRef idx="0">
+            <a:schemeClr val="accent1"/>
+          </a:effectRef>
+          <a:fontRef idx="minor">
+            <a:schemeClr val="lt1"/>
+          </a:fontRef>
+        </p:style>
+        <p:txBody>
+          <a:bodyPr rtlCol="0" anchor="ctr"/>
+          <a:lstStyle/>
+          <a:p>
+            <a:pPr algn="ctr"/>
+            <a:endParaRPr lang="pt-BR" dirty="0"/>
+          </a:p>
+        </p:txBody>
+      </p:sp>
+      <p:pic>
+        <p:nvPicPr>
+          <p:cNvPr id="12" name="Gráfico 11" descr="Adicionar com preenchimento sólido">
+            <a:extLst>
+              <a:ext uri="{FF2B5EF4-FFF2-40B4-BE49-F238E27FC236}">
+                <a16:creationId xmlns:a16="http://schemas.microsoft.com/office/drawing/2014/main" id="{06C3E47E-7254-FBD9-D33F-EBD7A9611FC4}"/>
+              </a:ext>
+            </a:extLst>
+          </p:cNvPr>
+          <p:cNvPicPr>
+            <a:picLocks noChangeAspect="1"/>
+          </p:cNvPicPr>
+          <p:nvPr/>
+        </p:nvPicPr>
+        <p:blipFill>
+          <a:blip r:embed="rId2">
+            <a:extLst>
+              <a:ext uri="{28A0092B-C50C-407E-A947-70E740481C1C}">
+                <a14:useLocalDpi xmlns:a14="http://schemas.microsoft.com/office/drawing/2010/main" val="0"/>
+              </a:ext>
+              <a:ext uri="{96DAC541-7B7A-43D3-8B79-37D633B846F1}">
+                <asvg:svgBlip xmlns:asvg="http://schemas.microsoft.com/office/drawing/2016/SVG/main" r:embed="rId3"/>
+              </a:ext>
+            </a:extLst>
+          </a:blip>
+          <a:stretch>
+            <a:fillRect/>
+          </a:stretch>
+        </p:blipFill>
+        <p:spPr>
+          <a:xfrm>
+            <a:off x="4977535" y="4977534"/>
+            <a:ext cx="2221778" cy="2221778"/>
+          </a:xfrm>
+          <a:prstGeom prst="rect">
+            <a:avLst/>
+          </a:prstGeom>
+        </p:spPr>
+      </p:pic>
+      <p:sp>
+        <p:nvSpPr>
+          <p:cNvPr id="2" name="Elipse 1">
+            <a:extLst>
+              <a:ext uri="{FF2B5EF4-FFF2-40B4-BE49-F238E27FC236}">
+                <a16:creationId xmlns:a16="http://schemas.microsoft.com/office/drawing/2014/main" id="{F0F364E0-7B26-28B2-15E8-A07048BD9996}"/>
+              </a:ext>
+            </a:extLst>
+          </p:cNvPr>
+          <p:cNvSpPr/>
+          <p:nvPr/>
+        </p:nvSpPr>
+        <p:spPr>
+          <a:xfrm>
+            <a:off x="526473" y="845128"/>
+            <a:ext cx="3671454" cy="3671454"/>
+          </a:xfrm>
+          <a:prstGeom prst="ellipse">
+            <a:avLst/>
+          </a:prstGeom>
+          <a:noFill/>
+          <a:ln w="381000">
+            <a:solidFill>
+              <a:srgbClr val="CF1259"/>
+            </a:solidFill>
+          </a:ln>
+        </p:spPr>
+        <p:style>
+          <a:lnRef idx="2">
+            <a:schemeClr val="accent1">
+              <a:shade val="50000"/>
+            </a:schemeClr>
+          </a:lnRef>
+          <a:fillRef idx="1">
+            <a:schemeClr val="accent1"/>
+          </a:fillRef>
+          <a:effectRef idx="0">
+            <a:schemeClr val="accent1"/>
+          </a:effectRef>
+          <a:fontRef idx="minor">
+            <a:schemeClr val="lt1"/>
+          </a:fontRef>
+        </p:style>
+        <p:txBody>
+          <a:bodyPr rtlCol="0" anchor="ctr"/>
+          <a:lstStyle/>
+          <a:p>
+            <a:pPr algn="ctr"/>
+            <a:endParaRPr lang="pt-BR"/>
+          </a:p>
+        </p:txBody>
+      </p:sp>
+      <p:sp>
+        <p:nvSpPr>
+          <p:cNvPr id="5" name="Elipse 4">
+            <a:extLst>
+              <a:ext uri="{FF2B5EF4-FFF2-40B4-BE49-F238E27FC236}">
+                <a16:creationId xmlns:a16="http://schemas.microsoft.com/office/drawing/2014/main" id="{9BC4F504-8E75-4D61-95F1-5CA24755B323}"/>
+              </a:ext>
+            </a:extLst>
+          </p:cNvPr>
+          <p:cNvSpPr/>
+          <p:nvPr/>
+        </p:nvSpPr>
+        <p:spPr>
+          <a:xfrm>
+            <a:off x="2753881" y="845128"/>
+            <a:ext cx="3671454" cy="3671454"/>
+          </a:xfrm>
+          <a:prstGeom prst="ellipse">
+            <a:avLst/>
+          </a:prstGeom>
+          <a:noFill/>
+          <a:ln w="381000">
+            <a:solidFill>
+              <a:srgbClr val="CF1259"/>
+            </a:solidFill>
+          </a:ln>
+        </p:spPr>
+        <p:style>
+          <a:lnRef idx="2">
+            <a:schemeClr val="accent1">
+              <a:shade val="50000"/>
+            </a:schemeClr>
+          </a:lnRef>
+          <a:fillRef idx="1">
+            <a:schemeClr val="accent1"/>
+          </a:fillRef>
+          <a:effectRef idx="0">
+            <a:schemeClr val="accent1"/>
+          </a:effectRef>
+          <a:fontRef idx="minor">
+            <a:schemeClr val="lt1"/>
+          </a:fontRef>
+        </p:style>
+        <p:txBody>
+          <a:bodyPr rtlCol="0" anchor="ctr"/>
+          <a:lstStyle/>
+          <a:p>
+            <a:pPr algn="ctr"/>
+            <a:endParaRPr lang="pt-BR"/>
+          </a:p>
+        </p:txBody>
+      </p:sp>
+    </p:spTree>
+    <p:extLst>
+      <p:ext uri="{BB962C8B-B14F-4D97-AF65-F5344CB8AC3E}">
+        <p14:creationId xmlns:p14="http://schemas.microsoft.com/office/powerpoint/2010/main" val="1234732310"/>
+      </p:ext>
+    </p:extLst>
+  </p:cSld>
+  <p:clrMapOvr>
+    <a:masterClrMapping/>
+  </p:clrMapOvr>
+</p:sld>
+</file>
+
+<file path=ppt/slides/slide15.xml><?xml version="1.0" encoding="utf-8"?>
+<p:sld xmlns:a="http://schemas.openxmlformats.org/drawingml/2006/main" xmlns:r="http://schemas.openxmlformats.org/officeDocument/2006/relationships" xmlns:p="http://schemas.openxmlformats.org/presentationml/2006/main">
+  <p:cSld>
+    <p:spTree>
+      <p:nvGrpSpPr>
+        <p:cNvPr id="1" name=""/>
+        <p:cNvGrpSpPr/>
+        <p:nvPr/>
+      </p:nvGrpSpPr>
+      <p:grpSpPr>
+        <a:xfrm>
+          <a:off x="0" y="0"/>
+          <a:ext cx="0" cy="0"/>
+          <a:chOff x="0" y="0"/>
+          <a:chExt cx="0" cy="0"/>
+        </a:xfrm>
+      </p:grpSpPr>
+      <p:sp>
+        <p:nvSpPr>
+          <p:cNvPr id="4" name="Retângulo 3">
+            <a:extLst>
+              <a:ext uri="{FF2B5EF4-FFF2-40B4-BE49-F238E27FC236}">
+                <a16:creationId xmlns:a16="http://schemas.microsoft.com/office/drawing/2014/main" id="{73521BF0-0376-2073-7FDD-6DD8B0C9B5B6}"/>
+              </a:ext>
+            </a:extLst>
+          </p:cNvPr>
+          <p:cNvSpPr/>
+          <p:nvPr/>
+        </p:nvSpPr>
+        <p:spPr>
+          <a:xfrm>
+            <a:off x="0" y="1"/>
+            <a:ext cx="7199313" cy="7199312"/>
+          </a:xfrm>
+          <a:prstGeom prst="rect">
+            <a:avLst/>
+          </a:prstGeom>
+          <a:solidFill>
+            <a:srgbClr val="0095BA"/>
+          </a:solidFill>
+          <a:ln>
+            <a:noFill/>
+          </a:ln>
+        </p:spPr>
+        <p:style>
+          <a:lnRef idx="2">
+            <a:schemeClr val="accent1">
+              <a:shade val="50000"/>
+            </a:schemeClr>
+          </a:lnRef>
+          <a:fillRef idx="1">
+            <a:schemeClr val="accent1"/>
+          </a:fillRef>
+          <a:effectRef idx="0">
+            <a:schemeClr val="accent1"/>
+          </a:effectRef>
+          <a:fontRef idx="minor">
+            <a:schemeClr val="lt1"/>
+          </a:fontRef>
+        </p:style>
+        <p:txBody>
+          <a:bodyPr rtlCol="0" anchor="ctr"/>
+          <a:lstStyle/>
+          <a:p>
+            <a:pPr algn="ctr"/>
+            <a:endParaRPr lang="pt-BR" dirty="0"/>
+          </a:p>
+        </p:txBody>
+      </p:sp>
+      <p:pic>
+        <p:nvPicPr>
+          <p:cNvPr id="12" name="Gráfico 11" descr="Adicionar com preenchimento sólido">
+            <a:extLst>
+              <a:ext uri="{FF2B5EF4-FFF2-40B4-BE49-F238E27FC236}">
+                <a16:creationId xmlns:a16="http://schemas.microsoft.com/office/drawing/2014/main" id="{06C3E47E-7254-FBD9-D33F-EBD7A9611FC4}"/>
+              </a:ext>
+            </a:extLst>
+          </p:cNvPr>
+          <p:cNvPicPr>
+            <a:picLocks noChangeAspect="1"/>
+          </p:cNvPicPr>
+          <p:nvPr/>
+        </p:nvPicPr>
+        <p:blipFill>
+          <a:blip r:embed="rId2">
+            <a:extLst>
+              <a:ext uri="{28A0092B-C50C-407E-A947-70E740481C1C}">
+                <a14:useLocalDpi xmlns:a14="http://schemas.microsoft.com/office/drawing/2010/main" val="0"/>
+              </a:ext>
+              <a:ext uri="{96DAC541-7B7A-43D3-8B79-37D633B846F1}">
+                <asvg:svgBlip xmlns:asvg="http://schemas.microsoft.com/office/drawing/2016/SVG/main" r:embed="rId3"/>
+              </a:ext>
+            </a:extLst>
+          </a:blip>
+          <a:stretch>
+            <a:fillRect/>
+          </a:stretch>
+        </p:blipFill>
+        <p:spPr>
+          <a:xfrm>
+            <a:off x="4977535" y="4977534"/>
+            <a:ext cx="2221778" cy="2221778"/>
+          </a:xfrm>
+          <a:prstGeom prst="rect">
+            <a:avLst/>
+          </a:prstGeom>
+        </p:spPr>
+      </p:pic>
+      <p:grpSp>
+        <p:nvGrpSpPr>
+          <p:cNvPr id="34" name="Agrupar 33">
+            <a:extLst>
+              <a:ext uri="{FF2B5EF4-FFF2-40B4-BE49-F238E27FC236}">
+                <a16:creationId xmlns:a16="http://schemas.microsoft.com/office/drawing/2014/main" id="{50F6C2B0-58B6-3D86-D1A3-87659C654A7D}"/>
+              </a:ext>
+            </a:extLst>
+          </p:cNvPr>
+          <p:cNvGrpSpPr/>
+          <p:nvPr/>
+        </p:nvGrpSpPr>
+        <p:grpSpPr>
+          <a:xfrm rot="16200000">
+            <a:off x="2413099" y="-1111972"/>
+            <a:ext cx="2373114" cy="6667500"/>
+            <a:chOff x="1435676" y="665018"/>
+            <a:chExt cx="1902295" cy="5423405"/>
+          </a:xfrm>
+        </p:grpSpPr>
+        <p:cxnSp>
+          <p:nvCxnSpPr>
+            <p:cNvPr id="6" name="Conector reto 5">
+              <a:extLst>
+                <a:ext uri="{FF2B5EF4-FFF2-40B4-BE49-F238E27FC236}">
+                  <a16:creationId xmlns:a16="http://schemas.microsoft.com/office/drawing/2014/main" id="{BFD91B71-C6F3-8AA4-CCC1-5D93AA4CC5C4}"/>
+                </a:ext>
+              </a:extLst>
+            </p:cNvPr>
+            <p:cNvCxnSpPr>
+              <a:cxnSpLocks/>
+            </p:cNvCxnSpPr>
+            <p:nvPr/>
+          </p:nvCxnSpPr>
+          <p:spPr>
+            <a:xfrm>
+              <a:off x="1607127" y="665018"/>
+              <a:ext cx="0" cy="1648690"/>
+            </a:xfrm>
+            <a:prstGeom prst="line">
+              <a:avLst/>
+            </a:prstGeom>
+            <a:ln w="381000">
+              <a:solidFill>
+                <a:srgbClr val="CF1259"/>
+              </a:solidFill>
+            </a:ln>
+          </p:spPr>
+          <p:style>
+            <a:lnRef idx="1">
+              <a:schemeClr val="accent1"/>
+            </a:lnRef>
+            <a:fillRef idx="0">
+              <a:schemeClr val="accent1"/>
+            </a:fillRef>
+            <a:effectRef idx="0">
+              <a:schemeClr val="accent1"/>
+            </a:effectRef>
+            <a:fontRef idx="minor">
+              <a:schemeClr val="tx1"/>
+            </a:fontRef>
+          </p:style>
+        </p:cxnSp>
+        <p:sp>
+          <p:nvSpPr>
+            <p:cNvPr id="23" name="Forma Livre: Forma 22">
+              <a:extLst>
+                <a:ext uri="{FF2B5EF4-FFF2-40B4-BE49-F238E27FC236}">
+                  <a16:creationId xmlns:a16="http://schemas.microsoft.com/office/drawing/2014/main" id="{55618181-9E94-5BFC-9129-2050C1B9106C}"/>
+                </a:ext>
+              </a:extLst>
+            </p:cNvPr>
+            <p:cNvSpPr/>
+            <p:nvPr/>
+          </p:nvSpPr>
+          <p:spPr>
+            <a:xfrm>
+              <a:off x="1607127" y="2892641"/>
+              <a:ext cx="1440873" cy="3195782"/>
+            </a:xfrm>
+            <a:custGeom>
+              <a:avLst/>
+              <a:gdLst>
+                <a:gd name="connsiteX0" fmla="*/ 0 w 1080655"/>
+                <a:gd name="connsiteY0" fmla="*/ 2396837 h 2396837"/>
+                <a:gd name="connsiteX1" fmla="*/ 0 w 1080655"/>
+                <a:gd name="connsiteY1" fmla="*/ 1080655 h 2396837"/>
+                <a:gd name="connsiteX2" fmla="*/ 1080655 w 1080655"/>
+                <a:gd name="connsiteY2" fmla="*/ 0 h 2396837"/>
+              </a:gdLst>
+              <a:ahLst/>
+              <a:cxnLst>
+                <a:cxn ang="0">
+                  <a:pos x="connsiteX0" y="connsiteY0"/>
+                </a:cxn>
+                <a:cxn ang="0">
+                  <a:pos x="connsiteX1" y="connsiteY1"/>
+                </a:cxn>
+                <a:cxn ang="0">
+                  <a:pos x="connsiteX2" y="connsiteY2"/>
+                </a:cxn>
+              </a:cxnLst>
+              <a:rect l="l" t="t" r="r" b="b"/>
+              <a:pathLst>
+                <a:path w="1080655" h="2396837">
+                  <a:moveTo>
+                    <a:pt x="0" y="2396837"/>
+                  </a:moveTo>
+                  <a:lnTo>
+                    <a:pt x="0" y="1080655"/>
+                  </a:lnTo>
+                  <a:lnTo>
+                    <a:pt x="1080655" y="0"/>
+                  </a:lnTo>
+                </a:path>
+              </a:pathLst>
+            </a:custGeom>
+            <a:noFill/>
+            <a:ln w="381000">
+              <a:solidFill>
+                <a:srgbClr val="CF1259"/>
+              </a:solidFill>
+            </a:ln>
+          </p:spPr>
+          <p:style>
+            <a:lnRef idx="2">
+              <a:schemeClr val="accent1">
+                <a:shade val="50000"/>
+              </a:schemeClr>
+            </a:lnRef>
+            <a:fillRef idx="1">
+              <a:schemeClr val="accent1"/>
+            </a:fillRef>
+            <a:effectRef idx="0">
+              <a:schemeClr val="accent1"/>
+            </a:effectRef>
+            <a:fontRef idx="minor">
+              <a:schemeClr val="lt1"/>
+            </a:fontRef>
+          </p:style>
+          <p:txBody>
+            <a:bodyPr rtlCol="0" anchor="ctr"/>
+            <a:lstStyle/>
+            <a:p>
+              <a:pPr algn="ctr"/>
+              <a:endParaRPr lang="pt-BR"/>
+            </a:p>
+          </p:txBody>
+        </p:sp>
+        <p:cxnSp>
+          <p:nvCxnSpPr>
+            <p:cNvPr id="26" name="Conector reto 25">
+              <a:extLst>
+                <a:ext uri="{FF2B5EF4-FFF2-40B4-BE49-F238E27FC236}">
+                  <a16:creationId xmlns:a16="http://schemas.microsoft.com/office/drawing/2014/main" id="{8426EAB9-0BE4-C504-B7AE-3B7CDCCF2EB7}"/>
+                </a:ext>
+              </a:extLst>
+            </p:cNvPr>
+            <p:cNvCxnSpPr/>
+            <p:nvPr/>
+          </p:nvCxnSpPr>
+          <p:spPr>
+            <a:xfrm>
+              <a:off x="1435676" y="3416407"/>
+              <a:ext cx="1233055" cy="1233055"/>
+            </a:xfrm>
+            <a:prstGeom prst="line">
+              <a:avLst/>
+            </a:prstGeom>
+            <a:ln w="254000">
+              <a:solidFill>
+                <a:srgbClr val="CF1259"/>
+              </a:solidFill>
+            </a:ln>
+          </p:spPr>
+          <p:style>
+            <a:lnRef idx="1">
+              <a:schemeClr val="accent1"/>
+            </a:lnRef>
+            <a:fillRef idx="0">
+              <a:schemeClr val="accent1"/>
+            </a:fillRef>
+            <a:effectRef idx="0">
+              <a:schemeClr val="accent1"/>
+            </a:effectRef>
+            <a:fontRef idx="minor">
+              <a:schemeClr val="tx1"/>
+            </a:fontRef>
+          </p:style>
+        </p:cxnSp>
+        <p:cxnSp>
+          <p:nvCxnSpPr>
+            <p:cNvPr id="27" name="Conector reto 26">
+              <a:extLst>
+                <a:ext uri="{FF2B5EF4-FFF2-40B4-BE49-F238E27FC236}">
+                  <a16:creationId xmlns:a16="http://schemas.microsoft.com/office/drawing/2014/main" id="{BA14F3E6-3C67-ED9A-07D3-6CE6CBA6335F}"/>
+                </a:ext>
+              </a:extLst>
+            </p:cNvPr>
+            <p:cNvCxnSpPr/>
+            <p:nvPr/>
+          </p:nvCxnSpPr>
+          <p:spPr>
+            <a:xfrm>
+              <a:off x="1783916" y="3090069"/>
+              <a:ext cx="1233055" cy="1233055"/>
+            </a:xfrm>
+            <a:prstGeom prst="line">
+              <a:avLst/>
+            </a:prstGeom>
+            <a:ln w="254000">
+              <a:solidFill>
+                <a:srgbClr val="CF1259"/>
+              </a:solidFill>
+            </a:ln>
+          </p:spPr>
+          <p:style>
+            <a:lnRef idx="1">
+              <a:schemeClr val="accent1"/>
+            </a:lnRef>
+            <a:fillRef idx="0">
+              <a:schemeClr val="accent1"/>
+            </a:fillRef>
+            <a:effectRef idx="0">
+              <a:schemeClr val="accent1"/>
+            </a:effectRef>
+            <a:fontRef idx="minor">
+              <a:schemeClr val="tx1"/>
+            </a:fontRef>
+          </p:style>
+        </p:cxnSp>
+        <p:cxnSp>
+          <p:nvCxnSpPr>
+            <p:cNvPr id="28" name="Conector reto 27">
+              <a:extLst>
+                <a:ext uri="{FF2B5EF4-FFF2-40B4-BE49-F238E27FC236}">
+                  <a16:creationId xmlns:a16="http://schemas.microsoft.com/office/drawing/2014/main" id="{1D944785-1603-575E-D467-21632230C58E}"/>
+                </a:ext>
+              </a:extLst>
+            </p:cNvPr>
+            <p:cNvCxnSpPr/>
+            <p:nvPr/>
+          </p:nvCxnSpPr>
+          <p:spPr>
+            <a:xfrm>
+              <a:off x="2104916" y="2763368"/>
+              <a:ext cx="1233055" cy="1233055"/>
+            </a:xfrm>
+            <a:prstGeom prst="line">
+              <a:avLst/>
+            </a:prstGeom>
+            <a:ln w="254000">
+              <a:solidFill>
+                <a:srgbClr val="CF1259"/>
+              </a:solidFill>
+            </a:ln>
+          </p:spPr>
+          <p:style>
+            <a:lnRef idx="1">
+              <a:schemeClr val="accent1"/>
+            </a:lnRef>
+            <a:fillRef idx="0">
+              <a:schemeClr val="accent1"/>
+            </a:fillRef>
+            <a:effectRef idx="0">
+              <a:schemeClr val="accent1"/>
+            </a:effectRef>
+            <a:fontRef idx="minor">
+              <a:schemeClr val="tx1"/>
+            </a:fontRef>
+          </p:style>
+        </p:cxnSp>
+      </p:grpSp>
+    </p:spTree>
+    <p:extLst>
+      <p:ext uri="{BB962C8B-B14F-4D97-AF65-F5344CB8AC3E}">
+        <p14:creationId xmlns:p14="http://schemas.microsoft.com/office/powerpoint/2010/main" val="1023562805"/>
+      </p:ext>
+    </p:extLst>
+  </p:cSld>
+  <p:clrMapOvr>
+    <a:masterClrMapping/>
+  </p:clrMapOvr>
+</p:sld>
+</file>
+
+<file path=ppt/slides/slide16.xml><?xml version="1.0" encoding="utf-8"?>
+<p:sld xmlns:a="http://schemas.openxmlformats.org/drawingml/2006/main" xmlns:r="http://schemas.openxmlformats.org/officeDocument/2006/relationships" xmlns:p="http://schemas.openxmlformats.org/presentationml/2006/main">
+  <p:cSld>
+    <p:spTree>
+      <p:nvGrpSpPr>
+        <p:cNvPr id="1" name=""/>
+        <p:cNvGrpSpPr/>
+        <p:nvPr/>
+      </p:nvGrpSpPr>
+      <p:grpSpPr>
+        <a:xfrm>
+          <a:off x="0" y="0"/>
+          <a:ext cx="0" cy="0"/>
+          <a:chOff x="0" y="0"/>
+          <a:chExt cx="0" cy="0"/>
+        </a:xfrm>
+      </p:grpSpPr>
+      <p:sp>
+        <p:nvSpPr>
+          <p:cNvPr id="4" name="Retângulo 3">
+            <a:extLst>
+              <a:ext uri="{FF2B5EF4-FFF2-40B4-BE49-F238E27FC236}">
+                <a16:creationId xmlns:a16="http://schemas.microsoft.com/office/drawing/2014/main" id="{73521BF0-0376-2073-7FDD-6DD8B0C9B5B6}"/>
+              </a:ext>
+            </a:extLst>
+          </p:cNvPr>
+          <p:cNvSpPr/>
+          <p:nvPr/>
+        </p:nvSpPr>
+        <p:spPr>
+          <a:xfrm>
+            <a:off x="0" y="1"/>
+            <a:ext cx="7199313" cy="7199312"/>
+          </a:xfrm>
+          <a:prstGeom prst="rect">
+            <a:avLst/>
+          </a:prstGeom>
+          <a:solidFill>
+            <a:srgbClr val="0095BA"/>
+          </a:solidFill>
+          <a:ln>
+            <a:noFill/>
+          </a:ln>
+        </p:spPr>
+        <p:style>
+          <a:lnRef idx="2">
+            <a:schemeClr val="accent1">
+              <a:shade val="50000"/>
+            </a:schemeClr>
+          </a:lnRef>
+          <a:fillRef idx="1">
+            <a:schemeClr val="accent1"/>
+          </a:fillRef>
+          <a:effectRef idx="0">
+            <a:schemeClr val="accent1"/>
+          </a:effectRef>
+          <a:fontRef idx="minor">
+            <a:schemeClr val="lt1"/>
+          </a:fontRef>
+        </p:style>
+        <p:txBody>
+          <a:bodyPr rtlCol="0" anchor="ctr"/>
+          <a:lstStyle/>
+          <a:p>
+            <a:pPr algn="ctr"/>
+            <a:endParaRPr lang="pt-BR" b="1" dirty="0">
+              <a:solidFill>
+                <a:srgbClr val="CF1259"/>
+              </a:solidFill>
+              <a:latin typeface="Arial" panose="020B0604020202020204" pitchFamily="34" charset="0"/>
+              <a:cs typeface="Arial" panose="020B0604020202020204" pitchFamily="34" charset="0"/>
+            </a:endParaRPr>
+          </a:p>
+        </p:txBody>
+      </p:sp>
+      <p:pic>
+        <p:nvPicPr>
+          <p:cNvPr id="12" name="Gráfico 11" descr="Adicionar com preenchimento sólido">
+            <a:extLst>
+              <a:ext uri="{FF2B5EF4-FFF2-40B4-BE49-F238E27FC236}">
+                <a16:creationId xmlns:a16="http://schemas.microsoft.com/office/drawing/2014/main" id="{06C3E47E-7254-FBD9-D33F-EBD7A9611FC4}"/>
+              </a:ext>
+            </a:extLst>
+          </p:cNvPr>
+          <p:cNvPicPr>
+            <a:picLocks noChangeAspect="1"/>
+          </p:cNvPicPr>
+          <p:nvPr/>
+        </p:nvPicPr>
+        <p:blipFill>
+          <a:blip r:embed="rId2">
+            <a:extLst>
+              <a:ext uri="{28A0092B-C50C-407E-A947-70E740481C1C}">
+                <a14:useLocalDpi xmlns:a14="http://schemas.microsoft.com/office/drawing/2010/main" val="0"/>
+              </a:ext>
+              <a:ext uri="{96DAC541-7B7A-43D3-8B79-37D633B846F1}">
+                <asvg:svgBlip xmlns:asvg="http://schemas.microsoft.com/office/drawing/2016/SVG/main" r:embed="rId3"/>
+              </a:ext>
+            </a:extLst>
+          </a:blip>
+          <a:stretch>
+            <a:fillRect/>
+          </a:stretch>
+        </p:blipFill>
+        <p:spPr>
+          <a:xfrm>
+            <a:off x="4977535" y="4977534"/>
+            <a:ext cx="2221778" cy="2221778"/>
+          </a:xfrm>
+          <a:prstGeom prst="rect">
+            <a:avLst/>
+          </a:prstGeom>
+        </p:spPr>
+      </p:pic>
+      <p:sp>
+        <p:nvSpPr>
+          <p:cNvPr id="2" name="CaixaDeTexto 1">
+            <a:extLst>
+              <a:ext uri="{FF2B5EF4-FFF2-40B4-BE49-F238E27FC236}">
+                <a16:creationId xmlns:a16="http://schemas.microsoft.com/office/drawing/2014/main" id="{884EF956-69A2-80AE-C94C-1A49A3AC3CF2}"/>
+              </a:ext>
+            </a:extLst>
+          </p:cNvPr>
+          <p:cNvSpPr txBox="1"/>
+          <p:nvPr/>
+        </p:nvSpPr>
+        <p:spPr>
+          <a:xfrm>
+            <a:off x="2260456" y="1624641"/>
+            <a:ext cx="2678400" cy="2677656"/>
+          </a:xfrm>
+          <a:prstGeom prst="rect">
+            <a:avLst/>
+          </a:prstGeom>
+          <a:noFill/>
+          <a:ln w="381000">
+            <a:solidFill>
+              <a:srgbClr val="CF1259"/>
+            </a:solidFill>
+            <a:miter lim="800000"/>
+          </a:ln>
+        </p:spPr>
+        <p:txBody>
+          <a:bodyPr wrap="square" rtlCol="0" anchor="ctr">
+            <a:spAutoFit/>
+          </a:bodyPr>
+          <a:lstStyle/>
+          <a:p>
+            <a:pPr algn="ctr"/>
+            <a:endParaRPr lang="pt-BR" dirty="0"/>
+          </a:p>
+          <a:p>
+            <a:pPr algn="ctr"/>
+            <a:endParaRPr lang="pt-BR" dirty="0"/>
+          </a:p>
+          <a:p>
+            <a:pPr algn="ctr"/>
+            <a:r>
+              <a:rPr lang="pt-BR" sz="9600" b="1" dirty="0">
+                <a:solidFill>
+                  <a:srgbClr val="CF1259"/>
+                </a:solidFill>
+                <a:latin typeface="Arial" panose="020B0604020202020204" pitchFamily="34" charset="0"/>
+                <a:cs typeface="Arial" panose="020B0604020202020204" pitchFamily="34" charset="0"/>
+              </a:rPr>
+              <a:t>D</a:t>
+            </a:r>
+          </a:p>
+          <a:p>
+            <a:pPr algn="ctr"/>
+            <a:endParaRPr lang="pt-BR" dirty="0"/>
+          </a:p>
+          <a:p>
+            <a:pPr algn="ctr"/>
+            <a:endParaRPr lang="pt-BR" dirty="0"/>
+          </a:p>
+        </p:txBody>
+      </p:sp>
+      <p:cxnSp>
+        <p:nvCxnSpPr>
+          <p:cNvPr id="16" name="Conector reto 15">
+            <a:extLst>
+              <a:ext uri="{FF2B5EF4-FFF2-40B4-BE49-F238E27FC236}">
+                <a16:creationId xmlns:a16="http://schemas.microsoft.com/office/drawing/2014/main" id="{3164E088-78CC-6344-19C6-0E4D54EE55A9}"/>
+              </a:ext>
+            </a:extLst>
+          </p:cNvPr>
+          <p:cNvCxnSpPr>
+            <a:cxnSpLocks/>
+          </p:cNvCxnSpPr>
+          <p:nvPr/>
+        </p:nvCxnSpPr>
+        <p:spPr>
+          <a:xfrm>
+            <a:off x="4758746" y="2963469"/>
+            <a:ext cx="1620000" cy="0"/>
+          </a:xfrm>
+          <a:prstGeom prst="line">
+            <a:avLst/>
+          </a:prstGeom>
+          <a:ln w="381000">
+            <a:solidFill>
+              <a:srgbClr val="CF1259"/>
+            </a:solidFill>
+          </a:ln>
+        </p:spPr>
+        <p:style>
+          <a:lnRef idx="1">
+            <a:schemeClr val="accent1"/>
+          </a:lnRef>
+          <a:fillRef idx="0">
+            <a:schemeClr val="accent1"/>
+          </a:fillRef>
+          <a:effectRef idx="0">
+            <a:schemeClr val="accent1"/>
+          </a:effectRef>
+          <a:fontRef idx="minor">
+            <a:schemeClr val="tx1"/>
+          </a:fontRef>
+        </p:style>
+      </p:cxnSp>
+      <p:cxnSp>
+        <p:nvCxnSpPr>
+          <p:cNvPr id="17" name="Conector reto 16">
+            <a:extLst>
+              <a:ext uri="{FF2B5EF4-FFF2-40B4-BE49-F238E27FC236}">
+                <a16:creationId xmlns:a16="http://schemas.microsoft.com/office/drawing/2014/main" id="{6283C049-22AB-B5A2-1279-A4F1567822CA}"/>
+              </a:ext>
+            </a:extLst>
+          </p:cNvPr>
+          <p:cNvCxnSpPr>
+            <a:cxnSpLocks/>
+          </p:cNvCxnSpPr>
+          <p:nvPr/>
+        </p:nvCxnSpPr>
+        <p:spPr>
+          <a:xfrm>
+            <a:off x="816831" y="2963469"/>
+            <a:ext cx="1620000" cy="0"/>
+          </a:xfrm>
+          <a:prstGeom prst="line">
+            <a:avLst/>
+          </a:prstGeom>
+          <a:ln w="381000">
+            <a:solidFill>
+              <a:srgbClr val="CF1259"/>
+            </a:solidFill>
+          </a:ln>
+        </p:spPr>
+        <p:style>
+          <a:lnRef idx="1">
+            <a:schemeClr val="accent1"/>
+          </a:lnRef>
+          <a:fillRef idx="0">
+            <a:schemeClr val="accent1"/>
+          </a:fillRef>
+          <a:effectRef idx="0">
+            <a:schemeClr val="accent1"/>
+          </a:effectRef>
+          <a:fontRef idx="minor">
+            <a:schemeClr val="tx1"/>
+          </a:fontRef>
+        </p:style>
+      </p:cxnSp>
+    </p:spTree>
+    <p:extLst>
+      <p:ext uri="{BB962C8B-B14F-4D97-AF65-F5344CB8AC3E}">
+        <p14:creationId xmlns:p14="http://schemas.microsoft.com/office/powerpoint/2010/main" val="2922436327"/>
+      </p:ext>
+    </p:extLst>
+  </p:cSld>
+  <p:clrMapOvr>
+    <a:masterClrMapping/>
+  </p:clrMapOvr>
+</p:sld>
+</file>
+
+<file path=ppt/slides/slide17.xml><?xml version="1.0" encoding="utf-8"?>
+<p:sld xmlns:a="http://schemas.openxmlformats.org/drawingml/2006/main" xmlns:r="http://schemas.openxmlformats.org/officeDocument/2006/relationships" xmlns:p="http://schemas.openxmlformats.org/presentationml/2006/main">
+  <p:cSld>
+    <p:spTree>
+      <p:nvGrpSpPr>
+        <p:cNvPr id="1" name=""/>
+        <p:cNvGrpSpPr/>
+        <p:nvPr/>
+      </p:nvGrpSpPr>
+      <p:grpSpPr>
+        <a:xfrm>
+          <a:off x="0" y="0"/>
+          <a:ext cx="0" cy="0"/>
+          <a:chOff x="0" y="0"/>
+          <a:chExt cx="0" cy="0"/>
+        </a:xfrm>
+      </p:grpSpPr>
+      <p:sp>
+        <p:nvSpPr>
+          <p:cNvPr id="4" name="Retângulo 3">
+            <a:extLst>
+              <a:ext uri="{FF2B5EF4-FFF2-40B4-BE49-F238E27FC236}">
+                <a16:creationId xmlns:a16="http://schemas.microsoft.com/office/drawing/2014/main" id="{73521BF0-0376-2073-7FDD-6DD8B0C9B5B6}"/>
+              </a:ext>
+            </a:extLst>
+          </p:cNvPr>
+          <p:cNvSpPr/>
+          <p:nvPr/>
+        </p:nvSpPr>
+        <p:spPr>
+          <a:xfrm>
+            <a:off x="0" y="1"/>
+            <a:ext cx="7199313" cy="7199312"/>
+          </a:xfrm>
+          <a:prstGeom prst="rect">
+            <a:avLst/>
+          </a:prstGeom>
+          <a:solidFill>
+            <a:srgbClr val="0095BA"/>
+          </a:solidFill>
+        </p:spPr>
+        <p:style>
+          <a:lnRef idx="2">
+            <a:schemeClr val="accent1">
+              <a:shade val="50000"/>
+            </a:schemeClr>
+          </a:lnRef>
+          <a:fillRef idx="1">
+            <a:schemeClr val="accent1"/>
+          </a:fillRef>
+          <a:effectRef idx="0">
+            <a:schemeClr val="accent1"/>
+          </a:effectRef>
+          <a:fontRef idx="minor">
+            <a:schemeClr val="lt1"/>
+          </a:fontRef>
+        </p:style>
+        <p:txBody>
+          <a:bodyPr rtlCol="0" anchor="ctr"/>
+          <a:lstStyle/>
+          <a:p>
+            <a:pPr algn="ctr"/>
+            <a:endParaRPr lang="pt-BR" dirty="0"/>
+          </a:p>
+        </p:txBody>
+      </p:sp>
+      <p:pic>
+        <p:nvPicPr>
+          <p:cNvPr id="12" name="Gráfico 11" descr="Adicionar com preenchimento sólido">
+            <a:extLst>
+              <a:ext uri="{FF2B5EF4-FFF2-40B4-BE49-F238E27FC236}">
+                <a16:creationId xmlns:a16="http://schemas.microsoft.com/office/drawing/2014/main" id="{06C3E47E-7254-FBD9-D33F-EBD7A9611FC4}"/>
+              </a:ext>
+            </a:extLst>
+          </p:cNvPr>
+          <p:cNvPicPr>
+            <a:picLocks noChangeAspect="1"/>
+          </p:cNvPicPr>
+          <p:nvPr/>
+        </p:nvPicPr>
+        <p:blipFill>
+          <a:blip r:embed="rId2">
+            <a:extLst>
+              <a:ext uri="{28A0092B-C50C-407E-A947-70E740481C1C}">
+                <a14:useLocalDpi xmlns:a14="http://schemas.microsoft.com/office/drawing/2010/main" val="0"/>
+              </a:ext>
+              <a:ext uri="{96DAC541-7B7A-43D3-8B79-37D633B846F1}">
+                <asvg:svgBlip xmlns:asvg="http://schemas.microsoft.com/office/drawing/2016/SVG/main" r:embed="rId3"/>
+              </a:ext>
+            </a:extLst>
+          </a:blip>
+          <a:stretch>
+            <a:fillRect/>
+          </a:stretch>
+        </p:blipFill>
+        <p:spPr>
+          <a:xfrm>
+            <a:off x="4977535" y="4977534"/>
+            <a:ext cx="2221778" cy="2221778"/>
+          </a:xfrm>
+          <a:prstGeom prst="rect">
+            <a:avLst/>
+          </a:prstGeom>
+        </p:spPr>
+      </p:pic>
+      <p:sp>
+        <p:nvSpPr>
+          <p:cNvPr id="3" name="Semicírculo 2">
+            <a:extLst>
+              <a:ext uri="{FF2B5EF4-FFF2-40B4-BE49-F238E27FC236}">
+                <a16:creationId xmlns:a16="http://schemas.microsoft.com/office/drawing/2014/main" id="{634815C2-79BF-27EF-1DDB-F4D1C04F9B3D}"/>
+              </a:ext>
+            </a:extLst>
+          </p:cNvPr>
+          <p:cNvSpPr/>
+          <p:nvPr/>
+        </p:nvSpPr>
+        <p:spPr>
+          <a:xfrm rot="16200000">
+            <a:off x="3479700" y="1018075"/>
+            <a:ext cx="1979238" cy="1991302"/>
+          </a:xfrm>
+          <a:prstGeom prst="blockArc">
+            <a:avLst>
+              <a:gd name="adj1" fmla="val 10800000"/>
+              <a:gd name="adj2" fmla="val 86715"/>
+              <a:gd name="adj3" fmla="val 0"/>
+            </a:avLst>
+          </a:prstGeom>
+          <a:solidFill>
+            <a:srgbClr val="F36F20"/>
+          </a:solidFill>
+          <a:ln w="381000">
+            <a:solidFill>
+              <a:srgbClr val="F36F20"/>
+            </a:solidFill>
+          </a:ln>
+        </p:spPr>
+        <p:style>
+          <a:lnRef idx="2">
+            <a:schemeClr val="accent1">
+              <a:shade val="50000"/>
+            </a:schemeClr>
+          </a:lnRef>
+          <a:fillRef idx="1">
+            <a:schemeClr val="accent1"/>
+          </a:fillRef>
+          <a:effectRef idx="0">
+            <a:schemeClr val="accent1"/>
+          </a:effectRef>
+          <a:fontRef idx="minor">
+            <a:schemeClr val="lt1"/>
+          </a:fontRef>
+        </p:style>
+        <p:txBody>
+          <a:bodyPr rtlCol="0" anchor="ctr"/>
+          <a:lstStyle/>
+          <a:p>
+            <a:pPr algn="ctr"/>
+            <a:endParaRPr lang="pt-BR"/>
+          </a:p>
+        </p:txBody>
+      </p:sp>
+      <p:sp>
+        <p:nvSpPr>
+          <p:cNvPr id="6" name="Semicírculo 5">
+            <a:extLst>
+              <a:ext uri="{FF2B5EF4-FFF2-40B4-BE49-F238E27FC236}">
+                <a16:creationId xmlns:a16="http://schemas.microsoft.com/office/drawing/2014/main" id="{6A577E45-EDDB-3D13-B265-533092CF2A63}"/>
+              </a:ext>
+            </a:extLst>
+          </p:cNvPr>
+          <p:cNvSpPr/>
+          <p:nvPr/>
+        </p:nvSpPr>
+        <p:spPr>
+          <a:xfrm rot="16200000">
+            <a:off x="3479700" y="2997313"/>
+            <a:ext cx="1979238" cy="1991302"/>
+          </a:xfrm>
+          <a:prstGeom prst="blockArc">
+            <a:avLst>
+              <a:gd name="adj1" fmla="val 10800000"/>
+              <a:gd name="adj2" fmla="val 86715"/>
+              <a:gd name="adj3" fmla="val 0"/>
+            </a:avLst>
+          </a:prstGeom>
+          <a:solidFill>
+            <a:srgbClr val="F36F20"/>
+          </a:solidFill>
+          <a:ln w="381000">
+            <a:solidFill>
+              <a:srgbClr val="F36F20"/>
+            </a:solidFill>
+          </a:ln>
+        </p:spPr>
+        <p:style>
+          <a:lnRef idx="2">
+            <a:schemeClr val="accent1">
+              <a:shade val="50000"/>
+            </a:schemeClr>
+          </a:lnRef>
+          <a:fillRef idx="1">
+            <a:schemeClr val="accent1"/>
+          </a:fillRef>
+          <a:effectRef idx="0">
+            <a:schemeClr val="accent1"/>
+          </a:effectRef>
+          <a:fontRef idx="minor">
+            <a:schemeClr val="lt1"/>
+          </a:fontRef>
+        </p:style>
+        <p:txBody>
+          <a:bodyPr rtlCol="0" anchor="ctr"/>
+          <a:lstStyle/>
+          <a:p>
+            <a:pPr algn="ctr"/>
+            <a:endParaRPr lang="pt-BR"/>
+          </a:p>
+        </p:txBody>
+      </p:sp>
+      <p:sp>
+        <p:nvSpPr>
+          <p:cNvPr id="7" name="Semicírculo 6">
+            <a:extLst>
+              <a:ext uri="{FF2B5EF4-FFF2-40B4-BE49-F238E27FC236}">
+                <a16:creationId xmlns:a16="http://schemas.microsoft.com/office/drawing/2014/main" id="{2AF87D12-168B-2855-4917-78F84072337C}"/>
+              </a:ext>
+            </a:extLst>
+          </p:cNvPr>
+          <p:cNvSpPr/>
+          <p:nvPr/>
+        </p:nvSpPr>
+        <p:spPr>
+          <a:xfrm rot="5400000" flipH="1">
+            <a:off x="1132003" y="929897"/>
+            <a:ext cx="1979238" cy="1991302"/>
+          </a:xfrm>
+          <a:prstGeom prst="blockArc">
+            <a:avLst>
+              <a:gd name="adj1" fmla="val 10800000"/>
+              <a:gd name="adj2" fmla="val 86715"/>
+              <a:gd name="adj3" fmla="val 0"/>
+            </a:avLst>
+          </a:prstGeom>
+          <a:solidFill>
+            <a:srgbClr val="F36F20"/>
+          </a:solidFill>
+          <a:ln w="381000">
+            <a:solidFill>
+              <a:srgbClr val="F36F20"/>
+            </a:solidFill>
+          </a:ln>
+        </p:spPr>
+        <p:style>
+          <a:lnRef idx="2">
+            <a:schemeClr val="accent1">
+              <a:shade val="50000"/>
+            </a:schemeClr>
+          </a:lnRef>
+          <a:fillRef idx="1">
+            <a:schemeClr val="accent1"/>
+          </a:fillRef>
+          <a:effectRef idx="0">
+            <a:schemeClr val="accent1"/>
+          </a:effectRef>
+          <a:fontRef idx="minor">
+            <a:schemeClr val="lt1"/>
+          </a:fontRef>
+        </p:style>
+        <p:txBody>
+          <a:bodyPr rtlCol="0" anchor="ctr"/>
+          <a:lstStyle/>
+          <a:p>
+            <a:pPr algn="ctr"/>
+            <a:endParaRPr lang="pt-BR"/>
+          </a:p>
+        </p:txBody>
+      </p:sp>
+      <p:sp>
+        <p:nvSpPr>
+          <p:cNvPr id="8" name="Semicírculo 7">
+            <a:extLst>
+              <a:ext uri="{FF2B5EF4-FFF2-40B4-BE49-F238E27FC236}">
+                <a16:creationId xmlns:a16="http://schemas.microsoft.com/office/drawing/2014/main" id="{1968A6F0-DCE1-BBB0-A637-7B750448D69B}"/>
+              </a:ext>
+            </a:extLst>
+          </p:cNvPr>
+          <p:cNvSpPr/>
+          <p:nvPr/>
+        </p:nvSpPr>
+        <p:spPr>
+          <a:xfrm rot="5400000" flipH="1">
+            <a:off x="1132003" y="2909135"/>
+            <a:ext cx="1979238" cy="1991302"/>
+          </a:xfrm>
+          <a:prstGeom prst="blockArc">
+            <a:avLst>
+              <a:gd name="adj1" fmla="val 10800000"/>
+              <a:gd name="adj2" fmla="val 86715"/>
+              <a:gd name="adj3" fmla="val 0"/>
+            </a:avLst>
+          </a:prstGeom>
+          <a:solidFill>
+            <a:srgbClr val="F36F20"/>
+          </a:solidFill>
+          <a:ln w="381000">
+            <a:solidFill>
+              <a:srgbClr val="F36F20"/>
+            </a:solidFill>
+          </a:ln>
+        </p:spPr>
+        <p:style>
+          <a:lnRef idx="2">
+            <a:schemeClr val="accent1">
+              <a:shade val="50000"/>
+            </a:schemeClr>
+          </a:lnRef>
+          <a:fillRef idx="1">
+            <a:schemeClr val="accent1"/>
+          </a:fillRef>
+          <a:effectRef idx="0">
+            <a:schemeClr val="accent1"/>
+          </a:effectRef>
+          <a:fontRef idx="minor">
+            <a:schemeClr val="lt1"/>
+          </a:fontRef>
+        </p:style>
+        <p:txBody>
+          <a:bodyPr rtlCol="0" anchor="ctr"/>
+          <a:lstStyle/>
+          <a:p>
+            <a:pPr algn="ctr"/>
+            <a:endParaRPr lang="pt-BR"/>
+          </a:p>
+        </p:txBody>
+      </p:sp>
+      <p:cxnSp>
+        <p:nvCxnSpPr>
+          <p:cNvPr id="10" name="Conector reto 9">
+            <a:extLst>
+              <a:ext uri="{FF2B5EF4-FFF2-40B4-BE49-F238E27FC236}">
+                <a16:creationId xmlns:a16="http://schemas.microsoft.com/office/drawing/2014/main" id="{38E1857C-CED3-905A-FB7D-8274C1516971}"/>
+              </a:ext>
+            </a:extLst>
+          </p:cNvPr>
+          <p:cNvCxnSpPr>
+            <a:cxnSpLocks/>
+            <a:stCxn id="6" idx="1"/>
+          </p:cNvCxnSpPr>
+          <p:nvPr/>
+        </p:nvCxnSpPr>
+        <p:spPr>
+          <a:xfrm flipV="1">
+            <a:off x="4494279" y="3003344"/>
+            <a:ext cx="1579063" cy="312"/>
+          </a:xfrm>
+          <a:prstGeom prst="line">
+            <a:avLst/>
+          </a:prstGeom>
+          <a:ln w="381000">
+            <a:solidFill>
+              <a:srgbClr val="F36F20"/>
+            </a:solidFill>
+          </a:ln>
+        </p:spPr>
+        <p:style>
+          <a:lnRef idx="1">
+            <a:schemeClr val="accent1"/>
+          </a:lnRef>
+          <a:fillRef idx="0">
+            <a:schemeClr val="accent1"/>
+          </a:fillRef>
+          <a:effectRef idx="0">
+            <a:schemeClr val="accent1"/>
+          </a:effectRef>
+          <a:fontRef idx="minor">
+            <a:schemeClr val="tx1"/>
+          </a:fontRef>
+        </p:style>
+      </p:cxnSp>
+      <p:cxnSp>
+        <p:nvCxnSpPr>
+          <p:cNvPr id="11" name="Conector reto 10">
+            <a:extLst>
+              <a:ext uri="{FF2B5EF4-FFF2-40B4-BE49-F238E27FC236}">
+                <a16:creationId xmlns:a16="http://schemas.microsoft.com/office/drawing/2014/main" id="{FDC6EC66-1F5B-37A4-2CCF-BE4751FC5E2E}"/>
+              </a:ext>
+            </a:extLst>
+          </p:cNvPr>
+          <p:cNvCxnSpPr/>
+          <p:nvPr/>
+        </p:nvCxnSpPr>
+        <p:spPr>
+          <a:xfrm flipV="1">
+            <a:off x="690202" y="2914855"/>
+            <a:ext cx="1579063" cy="312"/>
+          </a:xfrm>
+          <a:prstGeom prst="line">
+            <a:avLst/>
+          </a:prstGeom>
+          <a:ln w="381000">
+            <a:solidFill>
+              <a:srgbClr val="F36F20"/>
+            </a:solidFill>
+          </a:ln>
+        </p:spPr>
+        <p:style>
+          <a:lnRef idx="1">
+            <a:schemeClr val="accent1"/>
+          </a:lnRef>
+          <a:fillRef idx="0">
+            <a:schemeClr val="accent1"/>
+          </a:fillRef>
+          <a:effectRef idx="0">
+            <a:schemeClr val="accent1"/>
+          </a:effectRef>
+          <a:fontRef idx="minor">
+            <a:schemeClr val="tx1"/>
+          </a:fontRef>
+        </p:style>
+      </p:cxnSp>
+    </p:spTree>
+    <p:extLst>
+      <p:ext uri="{BB962C8B-B14F-4D97-AF65-F5344CB8AC3E}">
+        <p14:creationId xmlns:p14="http://schemas.microsoft.com/office/powerpoint/2010/main" val="1181625414"/>
+      </p:ext>
+    </p:extLst>
+  </p:cSld>
+  <p:clrMapOvr>
+    <a:masterClrMapping/>
+  </p:clrMapOvr>
+</p:sld>
+</file>
+
+<file path=ppt/slides/slide18.xml><?xml version="1.0" encoding="utf-8"?>
+<p:sld xmlns:a="http://schemas.openxmlformats.org/drawingml/2006/main" xmlns:r="http://schemas.openxmlformats.org/officeDocument/2006/relationships" xmlns:p="http://schemas.openxmlformats.org/presentationml/2006/main">
+  <p:cSld>
+    <p:spTree>
+      <p:nvGrpSpPr>
+        <p:cNvPr id="1" name=""/>
+        <p:cNvGrpSpPr/>
+        <p:nvPr/>
+      </p:nvGrpSpPr>
+      <p:grpSpPr>
+        <a:xfrm>
+          <a:off x="0" y="0"/>
+          <a:ext cx="0" cy="0"/>
+          <a:chOff x="0" y="0"/>
+          <a:chExt cx="0" cy="0"/>
+        </a:xfrm>
+      </p:grpSpPr>
+      <p:sp>
+        <p:nvSpPr>
+          <p:cNvPr id="4" name="Retângulo 3">
+            <a:extLst>
+              <a:ext uri="{FF2B5EF4-FFF2-40B4-BE49-F238E27FC236}">
+                <a16:creationId xmlns:a16="http://schemas.microsoft.com/office/drawing/2014/main" id="{73521BF0-0376-2073-7FDD-6DD8B0C9B5B6}"/>
+              </a:ext>
+            </a:extLst>
+          </p:cNvPr>
+          <p:cNvSpPr/>
+          <p:nvPr/>
+        </p:nvSpPr>
+        <p:spPr>
+          <a:xfrm>
+            <a:off x="0" y="1"/>
+            <a:ext cx="7199313" cy="7199312"/>
+          </a:xfrm>
+          <a:prstGeom prst="rect">
+            <a:avLst/>
+          </a:prstGeom>
+          <a:solidFill>
+            <a:srgbClr val="0095BA"/>
+          </a:solidFill>
+          <a:ln>
+            <a:noFill/>
+          </a:ln>
+        </p:spPr>
+        <p:style>
+          <a:lnRef idx="2">
+            <a:schemeClr val="accent1">
+              <a:shade val="50000"/>
+            </a:schemeClr>
+          </a:lnRef>
+          <a:fillRef idx="1">
+            <a:schemeClr val="accent1"/>
+          </a:fillRef>
+          <a:effectRef idx="0">
+            <a:schemeClr val="accent1"/>
+          </a:effectRef>
+          <a:fontRef idx="minor">
+            <a:schemeClr val="lt1"/>
+          </a:fontRef>
+        </p:style>
+        <p:txBody>
+          <a:bodyPr rtlCol="0" anchor="ctr"/>
+          <a:lstStyle/>
+          <a:p>
+            <a:pPr algn="ctr"/>
+            <a:endParaRPr lang="pt-BR" dirty="0"/>
+          </a:p>
+        </p:txBody>
+      </p:sp>
+      <p:pic>
+        <p:nvPicPr>
+          <p:cNvPr id="12" name="Gráfico 11" descr="Adicionar com preenchimento sólido">
+            <a:extLst>
+              <a:ext uri="{FF2B5EF4-FFF2-40B4-BE49-F238E27FC236}">
+                <a16:creationId xmlns:a16="http://schemas.microsoft.com/office/drawing/2014/main" id="{06C3E47E-7254-FBD9-D33F-EBD7A9611FC4}"/>
+              </a:ext>
+            </a:extLst>
+          </p:cNvPr>
+          <p:cNvPicPr>
+            <a:picLocks noChangeAspect="1"/>
+          </p:cNvPicPr>
+          <p:nvPr/>
+        </p:nvPicPr>
+        <p:blipFill>
+          <a:blip r:embed="rId2">
+            <a:extLst>
+              <a:ext uri="{28A0092B-C50C-407E-A947-70E740481C1C}">
+                <a14:useLocalDpi xmlns:a14="http://schemas.microsoft.com/office/drawing/2010/main" val="0"/>
+              </a:ext>
+              <a:ext uri="{96DAC541-7B7A-43D3-8B79-37D633B846F1}">
+                <asvg:svgBlip xmlns:asvg="http://schemas.microsoft.com/office/drawing/2016/SVG/main" r:embed="rId3"/>
+              </a:ext>
+            </a:extLst>
+          </a:blip>
+          <a:stretch>
+            <a:fillRect/>
+          </a:stretch>
+        </p:blipFill>
+        <p:spPr>
+          <a:xfrm>
+            <a:off x="4977535" y="4977534"/>
+            <a:ext cx="2221778" cy="2221778"/>
+          </a:xfrm>
+          <a:prstGeom prst="rect">
+            <a:avLst/>
+          </a:prstGeom>
+        </p:spPr>
+      </p:pic>
+      <p:cxnSp>
+        <p:nvCxnSpPr>
+          <p:cNvPr id="5" name="Conector reto 4">
+            <a:extLst>
+              <a:ext uri="{FF2B5EF4-FFF2-40B4-BE49-F238E27FC236}">
+                <a16:creationId xmlns:a16="http://schemas.microsoft.com/office/drawing/2014/main" id="{4D05363C-7AA0-4773-9366-D00436A2811A}"/>
+              </a:ext>
+            </a:extLst>
+          </p:cNvPr>
+          <p:cNvCxnSpPr>
+            <a:cxnSpLocks/>
+          </p:cNvCxnSpPr>
+          <p:nvPr/>
+        </p:nvCxnSpPr>
+        <p:spPr>
+          <a:xfrm>
+            <a:off x="581891" y="3200400"/>
+            <a:ext cx="5846618" cy="0"/>
+          </a:xfrm>
+          <a:prstGeom prst="line">
+            <a:avLst/>
+          </a:prstGeom>
+          <a:ln w="381000">
+            <a:solidFill>
+              <a:srgbClr val="F36F20"/>
+            </a:solidFill>
+          </a:ln>
+        </p:spPr>
+        <p:style>
+          <a:lnRef idx="1">
+            <a:schemeClr val="accent1"/>
+          </a:lnRef>
+          <a:fillRef idx="0">
+            <a:schemeClr val="accent1"/>
+          </a:fillRef>
+          <a:effectRef idx="0">
+            <a:schemeClr val="accent1"/>
+          </a:effectRef>
+          <a:fontRef idx="minor">
+            <a:schemeClr val="tx1"/>
+          </a:fontRef>
+        </p:style>
+      </p:cxnSp>
+      <p:sp>
+        <p:nvSpPr>
+          <p:cNvPr id="37" name="Semicírculo 36">
+            <a:extLst>
+              <a:ext uri="{FF2B5EF4-FFF2-40B4-BE49-F238E27FC236}">
+                <a16:creationId xmlns:a16="http://schemas.microsoft.com/office/drawing/2014/main" id="{43C977D9-81B0-D2D4-E9E7-773692A17329}"/>
+              </a:ext>
+            </a:extLst>
+          </p:cNvPr>
+          <p:cNvSpPr/>
+          <p:nvPr/>
+        </p:nvSpPr>
+        <p:spPr>
+          <a:xfrm>
+            <a:off x="1604361" y="1995141"/>
+            <a:ext cx="1826716" cy="1761318"/>
+          </a:xfrm>
+          <a:prstGeom prst="blockArc">
+            <a:avLst>
+              <a:gd name="adj1" fmla="val 10800000"/>
+              <a:gd name="adj2" fmla="val 13763"/>
+              <a:gd name="adj3" fmla="val 0"/>
+            </a:avLst>
+          </a:prstGeom>
+          <a:ln w="381000">
+            <a:solidFill>
+              <a:srgbClr val="F36F20"/>
+            </a:solidFill>
+          </a:ln>
+        </p:spPr>
+        <p:style>
+          <a:lnRef idx="2">
+            <a:schemeClr val="accent1">
+              <a:shade val="50000"/>
+            </a:schemeClr>
+          </a:lnRef>
+          <a:fillRef idx="1">
+            <a:schemeClr val="accent1"/>
+          </a:fillRef>
+          <a:effectRef idx="0">
+            <a:schemeClr val="accent1"/>
+          </a:effectRef>
+          <a:fontRef idx="minor">
+            <a:schemeClr val="lt1"/>
+          </a:fontRef>
+        </p:style>
+        <p:txBody>
+          <a:bodyPr rtlCol="0" anchor="ctr"/>
+          <a:lstStyle/>
+          <a:p>
+            <a:pPr algn="ctr"/>
+            <a:endParaRPr lang="pt-BR">
+              <a:solidFill>
+                <a:schemeClr val="tx1"/>
+              </a:solidFill>
+            </a:endParaRPr>
+          </a:p>
+        </p:txBody>
+      </p:sp>
+      <p:cxnSp>
+        <p:nvCxnSpPr>
+          <p:cNvPr id="60" name="Conector reto 59">
+            <a:extLst>
+              <a:ext uri="{FF2B5EF4-FFF2-40B4-BE49-F238E27FC236}">
+                <a16:creationId xmlns:a16="http://schemas.microsoft.com/office/drawing/2014/main" id="{1EED3C80-29A9-00FC-38F9-8CB0667083B5}"/>
+              </a:ext>
+            </a:extLst>
+          </p:cNvPr>
+          <p:cNvCxnSpPr>
+            <a:stCxn id="37" idx="0"/>
+          </p:cNvCxnSpPr>
+          <p:nvPr/>
+        </p:nvCxnSpPr>
+        <p:spPr>
+          <a:xfrm flipH="1">
+            <a:off x="1574567" y="2875800"/>
+            <a:ext cx="29794" cy="1545677"/>
+          </a:xfrm>
+          <a:prstGeom prst="line">
+            <a:avLst/>
+          </a:prstGeom>
+          <a:ln w="381000">
+            <a:solidFill>
+              <a:srgbClr val="F36F20"/>
+            </a:solidFill>
+          </a:ln>
+        </p:spPr>
+        <p:style>
+          <a:lnRef idx="1">
+            <a:schemeClr val="accent1"/>
+          </a:lnRef>
+          <a:fillRef idx="0">
+            <a:schemeClr val="accent1"/>
+          </a:fillRef>
+          <a:effectRef idx="0">
+            <a:schemeClr val="accent1"/>
+          </a:effectRef>
+          <a:fontRef idx="minor">
+            <a:schemeClr val="tx1"/>
+          </a:fontRef>
+        </p:style>
+      </p:cxnSp>
+      <p:cxnSp>
+        <p:nvCxnSpPr>
+          <p:cNvPr id="66" name="Conector reto 65">
+            <a:extLst>
+              <a:ext uri="{FF2B5EF4-FFF2-40B4-BE49-F238E27FC236}">
+                <a16:creationId xmlns:a16="http://schemas.microsoft.com/office/drawing/2014/main" id="{96AF2F8C-75B4-3565-348E-0B5C04A6D50A}"/>
+              </a:ext>
+            </a:extLst>
+          </p:cNvPr>
+          <p:cNvCxnSpPr>
+            <a:stCxn id="37" idx="1"/>
+          </p:cNvCxnSpPr>
+          <p:nvPr/>
+        </p:nvCxnSpPr>
+        <p:spPr>
+          <a:xfrm>
+            <a:off x="3431069" y="2879457"/>
+            <a:ext cx="8" cy="1542020"/>
+          </a:xfrm>
+          <a:prstGeom prst="line">
+            <a:avLst/>
+          </a:prstGeom>
+          <a:ln w="381000">
+            <a:solidFill>
+              <a:srgbClr val="F36F20"/>
+            </a:solidFill>
+          </a:ln>
+        </p:spPr>
+        <p:style>
+          <a:lnRef idx="1">
+            <a:schemeClr val="accent1"/>
+          </a:lnRef>
+          <a:fillRef idx="0">
+            <a:schemeClr val="accent1"/>
+          </a:fillRef>
+          <a:effectRef idx="0">
+            <a:schemeClr val="accent1"/>
+          </a:effectRef>
+          <a:fontRef idx="minor">
+            <a:schemeClr val="tx1"/>
+          </a:fontRef>
+        </p:style>
+      </p:cxnSp>
+      <p:sp>
+        <p:nvSpPr>
+          <p:cNvPr id="68" name="Semicírculo 67">
+            <a:extLst>
+              <a:ext uri="{FF2B5EF4-FFF2-40B4-BE49-F238E27FC236}">
+                <a16:creationId xmlns:a16="http://schemas.microsoft.com/office/drawing/2014/main" id="{84E7688D-1662-D334-6514-884684E14ACB}"/>
+              </a:ext>
+            </a:extLst>
+          </p:cNvPr>
+          <p:cNvSpPr/>
+          <p:nvPr/>
+        </p:nvSpPr>
+        <p:spPr>
+          <a:xfrm>
+            <a:off x="3460871" y="1995141"/>
+            <a:ext cx="1826716" cy="1761318"/>
+          </a:xfrm>
+          <a:prstGeom prst="blockArc">
+            <a:avLst>
+              <a:gd name="adj1" fmla="val 10800000"/>
+              <a:gd name="adj2" fmla="val 13763"/>
+              <a:gd name="adj3" fmla="val 0"/>
+            </a:avLst>
+          </a:prstGeom>
+          <a:ln w="381000">
+            <a:solidFill>
+              <a:srgbClr val="F36F20"/>
+            </a:solidFill>
+          </a:ln>
+        </p:spPr>
+        <p:style>
+          <a:lnRef idx="2">
+            <a:schemeClr val="accent1">
+              <a:shade val="50000"/>
+            </a:schemeClr>
+          </a:lnRef>
+          <a:fillRef idx="1">
+            <a:schemeClr val="accent1"/>
+          </a:fillRef>
+          <a:effectRef idx="0">
+            <a:schemeClr val="accent1"/>
+          </a:effectRef>
+          <a:fontRef idx="minor">
+            <a:schemeClr val="lt1"/>
+          </a:fontRef>
+        </p:style>
+        <p:txBody>
+          <a:bodyPr rtlCol="0" anchor="ctr"/>
+          <a:lstStyle/>
+          <a:p>
+            <a:pPr algn="ctr"/>
+            <a:endParaRPr lang="pt-BR">
+              <a:solidFill>
+                <a:schemeClr val="tx1"/>
+              </a:solidFill>
+            </a:endParaRPr>
+          </a:p>
+        </p:txBody>
+      </p:sp>
+      <p:cxnSp>
+        <p:nvCxnSpPr>
+          <p:cNvPr id="70" name="Conector reto 69">
+            <a:extLst>
+              <a:ext uri="{FF2B5EF4-FFF2-40B4-BE49-F238E27FC236}">
+                <a16:creationId xmlns:a16="http://schemas.microsoft.com/office/drawing/2014/main" id="{6D48C7E2-422B-F806-8030-ABE258226C1B}"/>
+              </a:ext>
+            </a:extLst>
+          </p:cNvPr>
+          <p:cNvCxnSpPr>
+            <a:stCxn id="68" idx="1"/>
+          </p:cNvCxnSpPr>
+          <p:nvPr/>
+        </p:nvCxnSpPr>
+        <p:spPr>
+          <a:xfrm>
+            <a:off x="5287579" y="2879457"/>
+            <a:ext cx="8" cy="1542020"/>
+          </a:xfrm>
+          <a:prstGeom prst="line">
+            <a:avLst/>
+          </a:prstGeom>
+          <a:ln w="381000">
+            <a:solidFill>
+              <a:srgbClr val="F36F20"/>
+            </a:solidFill>
+          </a:ln>
+        </p:spPr>
+        <p:style>
+          <a:lnRef idx="1">
+            <a:schemeClr val="accent1"/>
+          </a:lnRef>
+          <a:fillRef idx="0">
+            <a:schemeClr val="accent1"/>
+          </a:fillRef>
+          <a:effectRef idx="0">
+            <a:schemeClr val="accent1"/>
+          </a:effectRef>
+          <a:fontRef idx="minor">
+            <a:schemeClr val="tx1"/>
+          </a:fontRef>
+        </p:style>
+      </p:cxnSp>
+    </p:spTree>
+    <p:extLst>
+      <p:ext uri="{BB962C8B-B14F-4D97-AF65-F5344CB8AC3E}">
+        <p14:creationId xmlns:p14="http://schemas.microsoft.com/office/powerpoint/2010/main" val="3990156722"/>
+      </p:ext>
+    </p:extLst>
+  </p:cSld>
+  <p:clrMapOvr>
+    <a:masterClrMapping/>
+  </p:clrMapOvr>
+</p:sld>
+</file>
+
+<file path=ppt/slides/slide19.xml><?xml version="1.0" encoding="utf-8"?>
+<p:sld xmlns:a="http://schemas.openxmlformats.org/drawingml/2006/main" xmlns:r="http://schemas.openxmlformats.org/officeDocument/2006/relationships" xmlns:p="http://schemas.openxmlformats.org/presentationml/2006/main">
+  <p:cSld>
+    <p:spTree>
+      <p:nvGrpSpPr>
+        <p:cNvPr id="1" name=""/>
+        <p:cNvGrpSpPr/>
+        <p:nvPr/>
+      </p:nvGrpSpPr>
+      <p:grpSpPr>
+        <a:xfrm>
+          <a:off x="0" y="0"/>
+          <a:ext cx="0" cy="0"/>
+          <a:chOff x="0" y="0"/>
+          <a:chExt cx="0" cy="0"/>
+        </a:xfrm>
+      </p:grpSpPr>
+      <p:sp>
+        <p:nvSpPr>
+          <p:cNvPr id="4" name="Retângulo 3">
+            <a:extLst>
+              <a:ext uri="{FF2B5EF4-FFF2-40B4-BE49-F238E27FC236}">
+                <a16:creationId xmlns:a16="http://schemas.microsoft.com/office/drawing/2014/main" id="{73521BF0-0376-2073-7FDD-6DD8B0C9B5B6}"/>
+              </a:ext>
+            </a:extLst>
+          </p:cNvPr>
+          <p:cNvSpPr/>
+          <p:nvPr/>
+        </p:nvSpPr>
+        <p:spPr>
+          <a:xfrm>
+            <a:off x="0" y="1"/>
+            <a:ext cx="7199313" cy="7199312"/>
+          </a:xfrm>
+          <a:prstGeom prst="rect">
+            <a:avLst/>
+          </a:prstGeom>
+          <a:solidFill>
+            <a:srgbClr val="0095BA"/>
+          </a:solidFill>
+          <a:ln>
+            <a:noFill/>
+          </a:ln>
+        </p:spPr>
+        <p:style>
+          <a:lnRef idx="2">
+            <a:schemeClr val="accent1">
+              <a:shade val="50000"/>
+            </a:schemeClr>
+          </a:lnRef>
+          <a:fillRef idx="1">
+            <a:schemeClr val="accent1"/>
+          </a:fillRef>
+          <a:effectRef idx="0">
+            <a:schemeClr val="accent1"/>
+          </a:effectRef>
+          <a:fontRef idx="minor">
+            <a:schemeClr val="lt1"/>
+          </a:fontRef>
+        </p:style>
+        <p:txBody>
+          <a:bodyPr rtlCol="0" anchor="ctr"/>
+          <a:lstStyle/>
+          <a:p>
+            <a:pPr algn="ctr"/>
+            <a:endParaRPr lang="pt-BR" dirty="0"/>
+          </a:p>
+        </p:txBody>
+      </p:sp>
+      <p:pic>
+        <p:nvPicPr>
+          <p:cNvPr id="12" name="Gráfico 11" descr="Adicionar com preenchimento sólido">
+            <a:extLst>
+              <a:ext uri="{FF2B5EF4-FFF2-40B4-BE49-F238E27FC236}">
+                <a16:creationId xmlns:a16="http://schemas.microsoft.com/office/drawing/2014/main" id="{06C3E47E-7254-FBD9-D33F-EBD7A9611FC4}"/>
+              </a:ext>
+            </a:extLst>
+          </p:cNvPr>
+          <p:cNvPicPr>
+            <a:picLocks noChangeAspect="1"/>
+          </p:cNvPicPr>
+          <p:nvPr/>
+        </p:nvPicPr>
+        <p:blipFill>
+          <a:blip r:embed="rId2">
+            <a:extLst>
+              <a:ext uri="{28A0092B-C50C-407E-A947-70E740481C1C}">
+                <a14:useLocalDpi xmlns:a14="http://schemas.microsoft.com/office/drawing/2010/main" val="0"/>
+              </a:ext>
+              <a:ext uri="{96DAC541-7B7A-43D3-8B79-37D633B846F1}">
+                <asvg:svgBlip xmlns:asvg="http://schemas.microsoft.com/office/drawing/2016/SVG/main" r:embed="rId3"/>
+              </a:ext>
+            </a:extLst>
+          </a:blip>
+          <a:stretch>
+            <a:fillRect/>
+          </a:stretch>
+        </p:blipFill>
+        <p:spPr>
+          <a:xfrm>
+            <a:off x="4977535" y="4977534"/>
+            <a:ext cx="2221778" cy="2221778"/>
+          </a:xfrm>
+          <a:prstGeom prst="rect">
+            <a:avLst/>
+          </a:prstGeom>
+        </p:spPr>
+      </p:pic>
+      <p:cxnSp>
+        <p:nvCxnSpPr>
+          <p:cNvPr id="3" name="Conector reto 2">
+            <a:extLst>
+              <a:ext uri="{FF2B5EF4-FFF2-40B4-BE49-F238E27FC236}">
+                <a16:creationId xmlns:a16="http://schemas.microsoft.com/office/drawing/2014/main" id="{5DF2E0F4-7D85-AFD3-8237-8FC7EDD9B57A}"/>
+              </a:ext>
+            </a:extLst>
+          </p:cNvPr>
+          <p:cNvCxnSpPr>
+            <a:cxnSpLocks/>
+          </p:cNvCxnSpPr>
+          <p:nvPr/>
+        </p:nvCxnSpPr>
+        <p:spPr>
+          <a:xfrm>
+            <a:off x="1161417" y="1676399"/>
+            <a:ext cx="2937164" cy="0"/>
+          </a:xfrm>
+          <a:prstGeom prst="line">
+            <a:avLst/>
+          </a:prstGeom>
+          <a:ln w="381000">
+            <a:solidFill>
+              <a:srgbClr val="F36F20"/>
+            </a:solidFill>
+          </a:ln>
+        </p:spPr>
+        <p:style>
+          <a:lnRef idx="1">
+            <a:schemeClr val="accent1"/>
+          </a:lnRef>
+          <a:fillRef idx="0">
+            <a:schemeClr val="accent1"/>
+          </a:fillRef>
+          <a:effectRef idx="0">
+            <a:schemeClr val="accent1"/>
+          </a:effectRef>
+          <a:fontRef idx="minor">
+            <a:schemeClr val="tx1"/>
+          </a:fontRef>
+        </p:style>
+      </p:cxnSp>
+      <p:cxnSp>
+        <p:nvCxnSpPr>
+          <p:cNvPr id="7" name="Conector reto 6">
+            <a:extLst>
+              <a:ext uri="{FF2B5EF4-FFF2-40B4-BE49-F238E27FC236}">
+                <a16:creationId xmlns:a16="http://schemas.microsoft.com/office/drawing/2014/main" id="{12DD2CDF-5270-E761-AF2D-792B5875DD5B}"/>
+              </a:ext>
+            </a:extLst>
+          </p:cNvPr>
+          <p:cNvCxnSpPr>
+            <a:cxnSpLocks/>
+          </p:cNvCxnSpPr>
+          <p:nvPr/>
+        </p:nvCxnSpPr>
+        <p:spPr>
+          <a:xfrm>
+            <a:off x="3912728" y="1537853"/>
+            <a:ext cx="0" cy="1343892"/>
+          </a:xfrm>
+          <a:prstGeom prst="line">
+            <a:avLst/>
+          </a:prstGeom>
+          <a:ln w="381000">
+            <a:solidFill>
+              <a:srgbClr val="F36F20"/>
+            </a:solidFill>
+          </a:ln>
+        </p:spPr>
+        <p:style>
+          <a:lnRef idx="1">
+            <a:schemeClr val="accent1"/>
+          </a:lnRef>
+          <a:fillRef idx="0">
+            <a:schemeClr val="accent1"/>
+          </a:fillRef>
+          <a:effectRef idx="0">
+            <a:schemeClr val="accent1"/>
+          </a:effectRef>
+          <a:fontRef idx="minor">
+            <a:schemeClr val="tx1"/>
+          </a:fontRef>
+        </p:style>
+      </p:cxnSp>
+      <p:cxnSp>
+        <p:nvCxnSpPr>
+          <p:cNvPr id="10" name="Conector reto 9">
+            <a:extLst>
+              <a:ext uri="{FF2B5EF4-FFF2-40B4-BE49-F238E27FC236}">
+                <a16:creationId xmlns:a16="http://schemas.microsoft.com/office/drawing/2014/main" id="{79B09E4B-C8AC-D735-1443-C4B930ABB7D5}"/>
+              </a:ext>
+            </a:extLst>
+          </p:cNvPr>
+          <p:cNvCxnSpPr>
+            <a:cxnSpLocks/>
+          </p:cNvCxnSpPr>
+          <p:nvPr/>
+        </p:nvCxnSpPr>
+        <p:spPr>
+          <a:xfrm>
+            <a:off x="2526683" y="3047998"/>
+            <a:ext cx="2772090" cy="0"/>
+          </a:xfrm>
+          <a:prstGeom prst="line">
+            <a:avLst/>
+          </a:prstGeom>
+          <a:ln w="381000">
+            <a:solidFill>
+              <a:srgbClr val="F36F20"/>
+            </a:solidFill>
+          </a:ln>
+        </p:spPr>
+        <p:style>
+          <a:lnRef idx="1">
+            <a:schemeClr val="accent1"/>
+          </a:lnRef>
+          <a:fillRef idx="0">
+            <a:schemeClr val="accent1"/>
+          </a:fillRef>
+          <a:effectRef idx="0">
+            <a:schemeClr val="accent1"/>
+          </a:effectRef>
+          <a:fontRef idx="minor">
+            <a:schemeClr val="tx1"/>
+          </a:fontRef>
+        </p:style>
+      </p:cxnSp>
+      <p:cxnSp>
+        <p:nvCxnSpPr>
+          <p:cNvPr id="11" name="Conector reto 10">
+            <a:extLst>
+              <a:ext uri="{FF2B5EF4-FFF2-40B4-BE49-F238E27FC236}">
+                <a16:creationId xmlns:a16="http://schemas.microsoft.com/office/drawing/2014/main" id="{A2EA6CEA-5F7A-E596-817C-37EA492B5107}"/>
+              </a:ext>
+            </a:extLst>
+          </p:cNvPr>
+          <p:cNvCxnSpPr>
+            <a:cxnSpLocks/>
+          </p:cNvCxnSpPr>
+          <p:nvPr/>
+        </p:nvCxnSpPr>
+        <p:spPr>
+          <a:xfrm>
+            <a:off x="3043355" y="3785970"/>
+            <a:ext cx="1738746" cy="0"/>
+          </a:xfrm>
+          <a:prstGeom prst="line">
+            <a:avLst/>
+          </a:prstGeom>
+          <a:ln w="381000">
+            <a:solidFill>
+              <a:srgbClr val="F36F20"/>
+            </a:solidFill>
+          </a:ln>
+        </p:spPr>
+        <p:style>
+          <a:lnRef idx="1">
+            <a:schemeClr val="accent1"/>
+          </a:lnRef>
+          <a:fillRef idx="0">
+            <a:schemeClr val="accent1"/>
+          </a:fillRef>
+          <a:effectRef idx="0">
+            <a:schemeClr val="accent1"/>
+          </a:effectRef>
+          <a:fontRef idx="minor">
+            <a:schemeClr val="tx1"/>
+          </a:fontRef>
+        </p:style>
+      </p:cxnSp>
+      <p:cxnSp>
+        <p:nvCxnSpPr>
+          <p:cNvPr id="14" name="Conector reto 13">
+            <a:extLst>
+              <a:ext uri="{FF2B5EF4-FFF2-40B4-BE49-F238E27FC236}">
+                <a16:creationId xmlns:a16="http://schemas.microsoft.com/office/drawing/2014/main" id="{A20536C0-184F-44B5-5AF0-F5BC96EAF8F5}"/>
+              </a:ext>
+            </a:extLst>
+          </p:cNvPr>
+          <p:cNvCxnSpPr>
+            <a:cxnSpLocks/>
+          </p:cNvCxnSpPr>
+          <p:nvPr/>
+        </p:nvCxnSpPr>
+        <p:spPr>
+          <a:xfrm>
+            <a:off x="3493137" y="4531950"/>
+            <a:ext cx="906291" cy="0"/>
+          </a:xfrm>
+          <a:prstGeom prst="line">
+            <a:avLst/>
+          </a:prstGeom>
+          <a:ln w="381000">
+            <a:solidFill>
+              <a:srgbClr val="F36F20"/>
+            </a:solidFill>
+          </a:ln>
+        </p:spPr>
+        <p:style>
+          <a:lnRef idx="1">
+            <a:schemeClr val="accent1"/>
+          </a:lnRef>
+          <a:fillRef idx="0">
+            <a:schemeClr val="accent1"/>
+          </a:fillRef>
+          <a:effectRef idx="0">
+            <a:schemeClr val="accent1"/>
+          </a:effectRef>
+          <a:fontRef idx="minor">
+            <a:schemeClr val="tx1"/>
+          </a:fontRef>
+        </p:style>
+      </p:cxnSp>
+    </p:spTree>
+    <p:extLst>
+      <p:ext uri="{BB962C8B-B14F-4D97-AF65-F5344CB8AC3E}">
+        <p14:creationId xmlns:p14="http://schemas.microsoft.com/office/powerpoint/2010/main" val="3144439883"/>
+      </p:ext>
+    </p:extLst>
+  </p:cSld>
+  <p:clrMapOvr>
+    <a:masterClrMapping/>
+  </p:clrMapOvr>
+</p:sld>
+</file>
+
 <file path=ppt/slides/slide2.xml><?xml version="1.0" encoding="utf-8"?>
 <p:sld xmlns:a="http://schemas.openxmlformats.org/drawingml/2006/main" xmlns:r="http://schemas.openxmlformats.org/officeDocument/2006/relationships" xmlns:p="http://schemas.openxmlformats.org/presentationml/2006/main">
   <p:cSld>
@@ -3430,6 +6698,1410 @@
     <p:extLst>
       <p:ext uri="{BB962C8B-B14F-4D97-AF65-F5344CB8AC3E}">
         <p14:creationId xmlns:p14="http://schemas.microsoft.com/office/powerpoint/2010/main" val="3376674702"/>
+      </p:ext>
+    </p:extLst>
+  </p:cSld>
+  <p:clrMapOvr>
+    <a:masterClrMapping/>
+  </p:clrMapOvr>
+</p:sld>
+</file>
+
+<file path=ppt/slides/slide20.xml><?xml version="1.0" encoding="utf-8"?>
+<p:sld xmlns:a="http://schemas.openxmlformats.org/drawingml/2006/main" xmlns:r="http://schemas.openxmlformats.org/officeDocument/2006/relationships" xmlns:p="http://schemas.openxmlformats.org/presentationml/2006/main">
+  <p:cSld>
+    <p:spTree>
+      <p:nvGrpSpPr>
+        <p:cNvPr id="1" name=""/>
+        <p:cNvGrpSpPr/>
+        <p:nvPr/>
+      </p:nvGrpSpPr>
+      <p:grpSpPr>
+        <a:xfrm>
+          <a:off x="0" y="0"/>
+          <a:ext cx="0" cy="0"/>
+          <a:chOff x="0" y="0"/>
+          <a:chExt cx="0" cy="0"/>
+        </a:xfrm>
+      </p:grpSpPr>
+      <p:sp>
+        <p:nvSpPr>
+          <p:cNvPr id="4" name="Retângulo 3">
+            <a:extLst>
+              <a:ext uri="{FF2B5EF4-FFF2-40B4-BE49-F238E27FC236}">
+                <a16:creationId xmlns:a16="http://schemas.microsoft.com/office/drawing/2014/main" id="{73521BF0-0376-2073-7FDD-6DD8B0C9B5B6}"/>
+              </a:ext>
+            </a:extLst>
+          </p:cNvPr>
+          <p:cNvSpPr/>
+          <p:nvPr/>
+        </p:nvSpPr>
+        <p:spPr>
+          <a:xfrm>
+            <a:off x="0" y="1"/>
+            <a:ext cx="7199313" cy="7199312"/>
+          </a:xfrm>
+          <a:prstGeom prst="rect">
+            <a:avLst/>
+          </a:prstGeom>
+          <a:solidFill>
+            <a:srgbClr val="0095BA"/>
+          </a:solidFill>
+          <a:ln>
+            <a:noFill/>
+          </a:ln>
+        </p:spPr>
+        <p:style>
+          <a:lnRef idx="2">
+            <a:schemeClr val="accent1">
+              <a:shade val="50000"/>
+            </a:schemeClr>
+          </a:lnRef>
+          <a:fillRef idx="1">
+            <a:schemeClr val="accent1"/>
+          </a:fillRef>
+          <a:effectRef idx="0">
+            <a:schemeClr val="accent1"/>
+          </a:effectRef>
+          <a:fontRef idx="minor">
+            <a:schemeClr val="lt1"/>
+          </a:fontRef>
+        </p:style>
+        <p:txBody>
+          <a:bodyPr rtlCol="0" anchor="ctr"/>
+          <a:lstStyle/>
+          <a:p>
+            <a:pPr algn="ctr"/>
+            <a:endParaRPr lang="pt-BR" dirty="0"/>
+          </a:p>
+        </p:txBody>
+      </p:sp>
+      <p:pic>
+        <p:nvPicPr>
+          <p:cNvPr id="12" name="Gráfico 11" descr="Adicionar com preenchimento sólido">
+            <a:extLst>
+              <a:ext uri="{FF2B5EF4-FFF2-40B4-BE49-F238E27FC236}">
+                <a16:creationId xmlns:a16="http://schemas.microsoft.com/office/drawing/2014/main" id="{06C3E47E-7254-FBD9-D33F-EBD7A9611FC4}"/>
+              </a:ext>
+            </a:extLst>
+          </p:cNvPr>
+          <p:cNvPicPr>
+            <a:picLocks noChangeAspect="1"/>
+          </p:cNvPicPr>
+          <p:nvPr/>
+        </p:nvPicPr>
+        <p:blipFill>
+          <a:blip r:embed="rId2">
+            <a:extLst>
+              <a:ext uri="{28A0092B-C50C-407E-A947-70E740481C1C}">
+                <a14:useLocalDpi xmlns:a14="http://schemas.microsoft.com/office/drawing/2010/main" val="0"/>
+              </a:ext>
+              <a:ext uri="{96DAC541-7B7A-43D3-8B79-37D633B846F1}">
+                <asvg:svgBlip xmlns:asvg="http://schemas.microsoft.com/office/drawing/2016/SVG/main" r:embed="rId3"/>
+              </a:ext>
+            </a:extLst>
+          </a:blip>
+          <a:stretch>
+            <a:fillRect/>
+          </a:stretch>
+        </p:blipFill>
+        <p:spPr>
+          <a:xfrm>
+            <a:off x="4977535" y="4977534"/>
+            <a:ext cx="2221778" cy="2221778"/>
+          </a:xfrm>
+          <a:prstGeom prst="rect">
+            <a:avLst/>
+          </a:prstGeom>
+        </p:spPr>
+      </p:pic>
+      <p:sp>
+        <p:nvSpPr>
+          <p:cNvPr id="2" name="Elipse 1">
+            <a:extLst>
+              <a:ext uri="{FF2B5EF4-FFF2-40B4-BE49-F238E27FC236}">
+                <a16:creationId xmlns:a16="http://schemas.microsoft.com/office/drawing/2014/main" id="{F0F364E0-7B26-28B2-15E8-A07048BD9996}"/>
+              </a:ext>
+            </a:extLst>
+          </p:cNvPr>
+          <p:cNvSpPr/>
+          <p:nvPr/>
+        </p:nvSpPr>
+        <p:spPr>
+          <a:xfrm>
+            <a:off x="526473" y="845128"/>
+            <a:ext cx="3671454" cy="3671454"/>
+          </a:xfrm>
+          <a:prstGeom prst="ellipse">
+            <a:avLst/>
+          </a:prstGeom>
+          <a:noFill/>
+          <a:ln w="381000">
+            <a:solidFill>
+              <a:srgbClr val="F36F20"/>
+            </a:solidFill>
+          </a:ln>
+        </p:spPr>
+        <p:style>
+          <a:lnRef idx="2">
+            <a:schemeClr val="accent1">
+              <a:shade val="50000"/>
+            </a:schemeClr>
+          </a:lnRef>
+          <a:fillRef idx="1">
+            <a:schemeClr val="accent1"/>
+          </a:fillRef>
+          <a:effectRef idx="0">
+            <a:schemeClr val="accent1"/>
+          </a:effectRef>
+          <a:fontRef idx="minor">
+            <a:schemeClr val="lt1"/>
+          </a:fontRef>
+        </p:style>
+        <p:txBody>
+          <a:bodyPr rtlCol="0" anchor="ctr"/>
+          <a:lstStyle/>
+          <a:p>
+            <a:pPr algn="ctr"/>
+            <a:endParaRPr lang="pt-BR"/>
+          </a:p>
+        </p:txBody>
+      </p:sp>
+      <p:sp>
+        <p:nvSpPr>
+          <p:cNvPr id="5" name="Elipse 4">
+            <a:extLst>
+              <a:ext uri="{FF2B5EF4-FFF2-40B4-BE49-F238E27FC236}">
+                <a16:creationId xmlns:a16="http://schemas.microsoft.com/office/drawing/2014/main" id="{9BC4F504-8E75-4D61-95F1-5CA24755B323}"/>
+              </a:ext>
+            </a:extLst>
+          </p:cNvPr>
+          <p:cNvSpPr/>
+          <p:nvPr/>
+        </p:nvSpPr>
+        <p:spPr>
+          <a:xfrm>
+            <a:off x="2753881" y="845128"/>
+            <a:ext cx="3671454" cy="3671454"/>
+          </a:xfrm>
+          <a:prstGeom prst="ellipse">
+            <a:avLst/>
+          </a:prstGeom>
+          <a:noFill/>
+          <a:ln w="381000">
+            <a:solidFill>
+              <a:srgbClr val="F36F20"/>
+            </a:solidFill>
+          </a:ln>
+        </p:spPr>
+        <p:style>
+          <a:lnRef idx="2">
+            <a:schemeClr val="accent1">
+              <a:shade val="50000"/>
+            </a:schemeClr>
+          </a:lnRef>
+          <a:fillRef idx="1">
+            <a:schemeClr val="accent1"/>
+          </a:fillRef>
+          <a:effectRef idx="0">
+            <a:schemeClr val="accent1"/>
+          </a:effectRef>
+          <a:fontRef idx="minor">
+            <a:schemeClr val="lt1"/>
+          </a:fontRef>
+        </p:style>
+        <p:txBody>
+          <a:bodyPr rtlCol="0" anchor="ctr"/>
+          <a:lstStyle/>
+          <a:p>
+            <a:pPr algn="ctr"/>
+            <a:endParaRPr lang="pt-BR"/>
+          </a:p>
+        </p:txBody>
+      </p:sp>
+    </p:spTree>
+    <p:extLst>
+      <p:ext uri="{BB962C8B-B14F-4D97-AF65-F5344CB8AC3E}">
+        <p14:creationId xmlns:p14="http://schemas.microsoft.com/office/powerpoint/2010/main" val="248246549"/>
+      </p:ext>
+    </p:extLst>
+  </p:cSld>
+  <p:clrMapOvr>
+    <a:masterClrMapping/>
+  </p:clrMapOvr>
+</p:sld>
+</file>
+
+<file path=ppt/slides/slide21.xml><?xml version="1.0" encoding="utf-8"?>
+<p:sld xmlns:a="http://schemas.openxmlformats.org/drawingml/2006/main" xmlns:r="http://schemas.openxmlformats.org/officeDocument/2006/relationships" xmlns:p="http://schemas.openxmlformats.org/presentationml/2006/main">
+  <p:cSld>
+    <p:spTree>
+      <p:nvGrpSpPr>
+        <p:cNvPr id="1" name=""/>
+        <p:cNvGrpSpPr/>
+        <p:nvPr/>
+      </p:nvGrpSpPr>
+      <p:grpSpPr>
+        <a:xfrm>
+          <a:off x="0" y="0"/>
+          <a:ext cx="0" cy="0"/>
+          <a:chOff x="0" y="0"/>
+          <a:chExt cx="0" cy="0"/>
+        </a:xfrm>
+      </p:grpSpPr>
+      <p:sp>
+        <p:nvSpPr>
+          <p:cNvPr id="4" name="Retângulo 3">
+            <a:extLst>
+              <a:ext uri="{FF2B5EF4-FFF2-40B4-BE49-F238E27FC236}">
+                <a16:creationId xmlns:a16="http://schemas.microsoft.com/office/drawing/2014/main" id="{73521BF0-0376-2073-7FDD-6DD8B0C9B5B6}"/>
+              </a:ext>
+            </a:extLst>
+          </p:cNvPr>
+          <p:cNvSpPr/>
+          <p:nvPr/>
+        </p:nvSpPr>
+        <p:spPr>
+          <a:xfrm>
+            <a:off x="0" y="1"/>
+            <a:ext cx="7199313" cy="7199312"/>
+          </a:xfrm>
+          <a:prstGeom prst="rect">
+            <a:avLst/>
+          </a:prstGeom>
+          <a:solidFill>
+            <a:srgbClr val="0095BA"/>
+          </a:solidFill>
+          <a:ln>
+            <a:noFill/>
+          </a:ln>
+        </p:spPr>
+        <p:style>
+          <a:lnRef idx="2">
+            <a:schemeClr val="accent1">
+              <a:shade val="50000"/>
+            </a:schemeClr>
+          </a:lnRef>
+          <a:fillRef idx="1">
+            <a:schemeClr val="accent1"/>
+          </a:fillRef>
+          <a:effectRef idx="0">
+            <a:schemeClr val="accent1"/>
+          </a:effectRef>
+          <a:fontRef idx="minor">
+            <a:schemeClr val="lt1"/>
+          </a:fontRef>
+        </p:style>
+        <p:txBody>
+          <a:bodyPr rtlCol="0" anchor="ctr"/>
+          <a:lstStyle/>
+          <a:p>
+            <a:pPr algn="ctr"/>
+            <a:endParaRPr lang="pt-BR" dirty="0"/>
+          </a:p>
+        </p:txBody>
+      </p:sp>
+      <p:pic>
+        <p:nvPicPr>
+          <p:cNvPr id="12" name="Gráfico 11" descr="Adicionar com preenchimento sólido">
+            <a:extLst>
+              <a:ext uri="{FF2B5EF4-FFF2-40B4-BE49-F238E27FC236}">
+                <a16:creationId xmlns:a16="http://schemas.microsoft.com/office/drawing/2014/main" id="{06C3E47E-7254-FBD9-D33F-EBD7A9611FC4}"/>
+              </a:ext>
+            </a:extLst>
+          </p:cNvPr>
+          <p:cNvPicPr>
+            <a:picLocks noChangeAspect="1"/>
+          </p:cNvPicPr>
+          <p:nvPr/>
+        </p:nvPicPr>
+        <p:blipFill>
+          <a:blip r:embed="rId2">
+            <a:extLst>
+              <a:ext uri="{28A0092B-C50C-407E-A947-70E740481C1C}">
+                <a14:useLocalDpi xmlns:a14="http://schemas.microsoft.com/office/drawing/2010/main" val="0"/>
+              </a:ext>
+              <a:ext uri="{96DAC541-7B7A-43D3-8B79-37D633B846F1}">
+                <asvg:svgBlip xmlns:asvg="http://schemas.microsoft.com/office/drawing/2016/SVG/main" r:embed="rId3"/>
+              </a:ext>
+            </a:extLst>
+          </a:blip>
+          <a:stretch>
+            <a:fillRect/>
+          </a:stretch>
+        </p:blipFill>
+        <p:spPr>
+          <a:xfrm>
+            <a:off x="4977535" y="4977534"/>
+            <a:ext cx="2221778" cy="2221778"/>
+          </a:xfrm>
+          <a:prstGeom prst="rect">
+            <a:avLst/>
+          </a:prstGeom>
+        </p:spPr>
+      </p:pic>
+      <p:grpSp>
+        <p:nvGrpSpPr>
+          <p:cNvPr id="34" name="Agrupar 33">
+            <a:extLst>
+              <a:ext uri="{FF2B5EF4-FFF2-40B4-BE49-F238E27FC236}">
+                <a16:creationId xmlns:a16="http://schemas.microsoft.com/office/drawing/2014/main" id="{50F6C2B0-58B6-3D86-D1A3-87659C654A7D}"/>
+              </a:ext>
+            </a:extLst>
+          </p:cNvPr>
+          <p:cNvGrpSpPr/>
+          <p:nvPr/>
+        </p:nvGrpSpPr>
+        <p:grpSpPr>
+          <a:xfrm rot="16200000">
+            <a:off x="2413099" y="-1111972"/>
+            <a:ext cx="2373114" cy="6667500"/>
+            <a:chOff x="1435676" y="665018"/>
+            <a:chExt cx="1902295" cy="5423405"/>
+          </a:xfrm>
+        </p:grpSpPr>
+        <p:cxnSp>
+          <p:nvCxnSpPr>
+            <p:cNvPr id="6" name="Conector reto 5">
+              <a:extLst>
+                <a:ext uri="{FF2B5EF4-FFF2-40B4-BE49-F238E27FC236}">
+                  <a16:creationId xmlns:a16="http://schemas.microsoft.com/office/drawing/2014/main" id="{BFD91B71-C6F3-8AA4-CCC1-5D93AA4CC5C4}"/>
+                </a:ext>
+              </a:extLst>
+            </p:cNvPr>
+            <p:cNvCxnSpPr>
+              <a:cxnSpLocks/>
+            </p:cNvCxnSpPr>
+            <p:nvPr/>
+          </p:nvCxnSpPr>
+          <p:spPr>
+            <a:xfrm>
+              <a:off x="1607127" y="665018"/>
+              <a:ext cx="0" cy="1648690"/>
+            </a:xfrm>
+            <a:prstGeom prst="line">
+              <a:avLst/>
+            </a:prstGeom>
+            <a:ln w="381000">
+              <a:solidFill>
+                <a:srgbClr val="F36F20"/>
+              </a:solidFill>
+            </a:ln>
+          </p:spPr>
+          <p:style>
+            <a:lnRef idx="1">
+              <a:schemeClr val="accent1"/>
+            </a:lnRef>
+            <a:fillRef idx="0">
+              <a:schemeClr val="accent1"/>
+            </a:fillRef>
+            <a:effectRef idx="0">
+              <a:schemeClr val="accent1"/>
+            </a:effectRef>
+            <a:fontRef idx="minor">
+              <a:schemeClr val="tx1"/>
+            </a:fontRef>
+          </p:style>
+        </p:cxnSp>
+        <p:sp>
+          <p:nvSpPr>
+            <p:cNvPr id="23" name="Forma Livre: Forma 22">
+              <a:extLst>
+                <a:ext uri="{FF2B5EF4-FFF2-40B4-BE49-F238E27FC236}">
+                  <a16:creationId xmlns:a16="http://schemas.microsoft.com/office/drawing/2014/main" id="{55618181-9E94-5BFC-9129-2050C1B9106C}"/>
+                </a:ext>
+              </a:extLst>
+            </p:cNvPr>
+            <p:cNvSpPr/>
+            <p:nvPr/>
+          </p:nvSpPr>
+          <p:spPr>
+            <a:xfrm>
+              <a:off x="1607127" y="2892641"/>
+              <a:ext cx="1440873" cy="3195782"/>
+            </a:xfrm>
+            <a:custGeom>
+              <a:avLst/>
+              <a:gdLst>
+                <a:gd name="connsiteX0" fmla="*/ 0 w 1080655"/>
+                <a:gd name="connsiteY0" fmla="*/ 2396837 h 2396837"/>
+                <a:gd name="connsiteX1" fmla="*/ 0 w 1080655"/>
+                <a:gd name="connsiteY1" fmla="*/ 1080655 h 2396837"/>
+                <a:gd name="connsiteX2" fmla="*/ 1080655 w 1080655"/>
+                <a:gd name="connsiteY2" fmla="*/ 0 h 2396837"/>
+              </a:gdLst>
+              <a:ahLst/>
+              <a:cxnLst>
+                <a:cxn ang="0">
+                  <a:pos x="connsiteX0" y="connsiteY0"/>
+                </a:cxn>
+                <a:cxn ang="0">
+                  <a:pos x="connsiteX1" y="connsiteY1"/>
+                </a:cxn>
+                <a:cxn ang="0">
+                  <a:pos x="connsiteX2" y="connsiteY2"/>
+                </a:cxn>
+              </a:cxnLst>
+              <a:rect l="l" t="t" r="r" b="b"/>
+              <a:pathLst>
+                <a:path w="1080655" h="2396837">
+                  <a:moveTo>
+                    <a:pt x="0" y="2396837"/>
+                  </a:moveTo>
+                  <a:lnTo>
+                    <a:pt x="0" y="1080655"/>
+                  </a:lnTo>
+                  <a:lnTo>
+                    <a:pt x="1080655" y="0"/>
+                  </a:lnTo>
+                </a:path>
+              </a:pathLst>
+            </a:custGeom>
+            <a:noFill/>
+            <a:ln w="381000">
+              <a:solidFill>
+                <a:srgbClr val="F36F20"/>
+              </a:solidFill>
+            </a:ln>
+          </p:spPr>
+          <p:style>
+            <a:lnRef idx="2">
+              <a:schemeClr val="accent1">
+                <a:shade val="50000"/>
+              </a:schemeClr>
+            </a:lnRef>
+            <a:fillRef idx="1">
+              <a:schemeClr val="accent1"/>
+            </a:fillRef>
+            <a:effectRef idx="0">
+              <a:schemeClr val="accent1"/>
+            </a:effectRef>
+            <a:fontRef idx="minor">
+              <a:schemeClr val="lt1"/>
+            </a:fontRef>
+          </p:style>
+          <p:txBody>
+            <a:bodyPr rtlCol="0" anchor="ctr"/>
+            <a:lstStyle/>
+            <a:p>
+              <a:pPr algn="ctr"/>
+              <a:endParaRPr lang="pt-BR"/>
+            </a:p>
+          </p:txBody>
+        </p:sp>
+        <p:cxnSp>
+          <p:nvCxnSpPr>
+            <p:cNvPr id="26" name="Conector reto 25">
+              <a:extLst>
+                <a:ext uri="{FF2B5EF4-FFF2-40B4-BE49-F238E27FC236}">
+                  <a16:creationId xmlns:a16="http://schemas.microsoft.com/office/drawing/2014/main" id="{8426EAB9-0BE4-C504-B7AE-3B7CDCCF2EB7}"/>
+                </a:ext>
+              </a:extLst>
+            </p:cNvPr>
+            <p:cNvCxnSpPr/>
+            <p:nvPr/>
+          </p:nvCxnSpPr>
+          <p:spPr>
+            <a:xfrm>
+              <a:off x="1435676" y="3416407"/>
+              <a:ext cx="1233055" cy="1233055"/>
+            </a:xfrm>
+            <a:prstGeom prst="line">
+              <a:avLst/>
+            </a:prstGeom>
+            <a:ln w="254000">
+              <a:solidFill>
+                <a:srgbClr val="F36F20"/>
+              </a:solidFill>
+            </a:ln>
+          </p:spPr>
+          <p:style>
+            <a:lnRef idx="1">
+              <a:schemeClr val="accent1"/>
+            </a:lnRef>
+            <a:fillRef idx="0">
+              <a:schemeClr val="accent1"/>
+            </a:fillRef>
+            <a:effectRef idx="0">
+              <a:schemeClr val="accent1"/>
+            </a:effectRef>
+            <a:fontRef idx="minor">
+              <a:schemeClr val="tx1"/>
+            </a:fontRef>
+          </p:style>
+        </p:cxnSp>
+        <p:cxnSp>
+          <p:nvCxnSpPr>
+            <p:cNvPr id="27" name="Conector reto 26">
+              <a:extLst>
+                <a:ext uri="{FF2B5EF4-FFF2-40B4-BE49-F238E27FC236}">
+                  <a16:creationId xmlns:a16="http://schemas.microsoft.com/office/drawing/2014/main" id="{BA14F3E6-3C67-ED9A-07D3-6CE6CBA6335F}"/>
+                </a:ext>
+              </a:extLst>
+            </p:cNvPr>
+            <p:cNvCxnSpPr/>
+            <p:nvPr/>
+          </p:nvCxnSpPr>
+          <p:spPr>
+            <a:xfrm>
+              <a:off x="1783916" y="3090069"/>
+              <a:ext cx="1233055" cy="1233055"/>
+            </a:xfrm>
+            <a:prstGeom prst="line">
+              <a:avLst/>
+            </a:prstGeom>
+            <a:ln w="254000">
+              <a:solidFill>
+                <a:srgbClr val="F36F20"/>
+              </a:solidFill>
+            </a:ln>
+          </p:spPr>
+          <p:style>
+            <a:lnRef idx="1">
+              <a:schemeClr val="accent1"/>
+            </a:lnRef>
+            <a:fillRef idx="0">
+              <a:schemeClr val="accent1"/>
+            </a:fillRef>
+            <a:effectRef idx="0">
+              <a:schemeClr val="accent1"/>
+            </a:effectRef>
+            <a:fontRef idx="minor">
+              <a:schemeClr val="tx1"/>
+            </a:fontRef>
+          </p:style>
+        </p:cxnSp>
+        <p:cxnSp>
+          <p:nvCxnSpPr>
+            <p:cNvPr id="28" name="Conector reto 27">
+              <a:extLst>
+                <a:ext uri="{FF2B5EF4-FFF2-40B4-BE49-F238E27FC236}">
+                  <a16:creationId xmlns:a16="http://schemas.microsoft.com/office/drawing/2014/main" id="{1D944785-1603-575E-D467-21632230C58E}"/>
+                </a:ext>
+              </a:extLst>
+            </p:cNvPr>
+            <p:cNvCxnSpPr/>
+            <p:nvPr/>
+          </p:nvCxnSpPr>
+          <p:spPr>
+            <a:xfrm>
+              <a:off x="2104916" y="2763368"/>
+              <a:ext cx="1233055" cy="1233055"/>
+            </a:xfrm>
+            <a:prstGeom prst="line">
+              <a:avLst/>
+            </a:prstGeom>
+            <a:ln w="254000">
+              <a:solidFill>
+                <a:srgbClr val="F36F20"/>
+              </a:solidFill>
+            </a:ln>
+          </p:spPr>
+          <p:style>
+            <a:lnRef idx="1">
+              <a:schemeClr val="accent1"/>
+            </a:lnRef>
+            <a:fillRef idx="0">
+              <a:schemeClr val="accent1"/>
+            </a:fillRef>
+            <a:effectRef idx="0">
+              <a:schemeClr val="accent1"/>
+            </a:effectRef>
+            <a:fontRef idx="minor">
+              <a:schemeClr val="tx1"/>
+            </a:fontRef>
+          </p:style>
+        </p:cxnSp>
+      </p:grpSp>
+    </p:spTree>
+    <p:extLst>
+      <p:ext uri="{BB962C8B-B14F-4D97-AF65-F5344CB8AC3E}">
+        <p14:creationId xmlns:p14="http://schemas.microsoft.com/office/powerpoint/2010/main" val="3497544818"/>
+      </p:ext>
+    </p:extLst>
+  </p:cSld>
+  <p:clrMapOvr>
+    <a:masterClrMapping/>
+  </p:clrMapOvr>
+</p:sld>
+</file>
+
+<file path=ppt/slides/slide22.xml><?xml version="1.0" encoding="utf-8"?>
+<p:sld xmlns:a="http://schemas.openxmlformats.org/drawingml/2006/main" xmlns:r="http://schemas.openxmlformats.org/officeDocument/2006/relationships" xmlns:p="http://schemas.openxmlformats.org/presentationml/2006/main">
+  <p:cSld>
+    <p:spTree>
+      <p:nvGrpSpPr>
+        <p:cNvPr id="1" name=""/>
+        <p:cNvGrpSpPr/>
+        <p:nvPr/>
+      </p:nvGrpSpPr>
+      <p:grpSpPr>
+        <a:xfrm>
+          <a:off x="0" y="0"/>
+          <a:ext cx="0" cy="0"/>
+          <a:chOff x="0" y="0"/>
+          <a:chExt cx="0" cy="0"/>
+        </a:xfrm>
+      </p:grpSpPr>
+      <p:sp>
+        <p:nvSpPr>
+          <p:cNvPr id="4" name="Retângulo 3">
+            <a:extLst>
+              <a:ext uri="{FF2B5EF4-FFF2-40B4-BE49-F238E27FC236}">
+                <a16:creationId xmlns:a16="http://schemas.microsoft.com/office/drawing/2014/main" id="{73521BF0-0376-2073-7FDD-6DD8B0C9B5B6}"/>
+              </a:ext>
+            </a:extLst>
+          </p:cNvPr>
+          <p:cNvSpPr/>
+          <p:nvPr/>
+        </p:nvSpPr>
+        <p:spPr>
+          <a:xfrm>
+            <a:off x="0" y="1"/>
+            <a:ext cx="7199313" cy="7199312"/>
+          </a:xfrm>
+          <a:prstGeom prst="rect">
+            <a:avLst/>
+          </a:prstGeom>
+          <a:solidFill>
+            <a:srgbClr val="0095BA"/>
+          </a:solidFill>
+          <a:ln>
+            <a:noFill/>
+          </a:ln>
+        </p:spPr>
+        <p:style>
+          <a:lnRef idx="2">
+            <a:schemeClr val="accent1">
+              <a:shade val="50000"/>
+            </a:schemeClr>
+          </a:lnRef>
+          <a:fillRef idx="1">
+            <a:schemeClr val="accent1"/>
+          </a:fillRef>
+          <a:effectRef idx="0">
+            <a:schemeClr val="accent1"/>
+          </a:effectRef>
+          <a:fontRef idx="minor">
+            <a:schemeClr val="lt1"/>
+          </a:fontRef>
+        </p:style>
+        <p:txBody>
+          <a:bodyPr rtlCol="0" anchor="ctr"/>
+          <a:lstStyle/>
+          <a:p>
+            <a:pPr algn="ctr"/>
+            <a:endParaRPr lang="pt-BR" b="1" dirty="0">
+              <a:solidFill>
+                <a:srgbClr val="CF1259"/>
+              </a:solidFill>
+              <a:latin typeface="Arial" panose="020B0604020202020204" pitchFamily="34" charset="0"/>
+              <a:cs typeface="Arial" panose="020B0604020202020204" pitchFamily="34" charset="0"/>
+            </a:endParaRPr>
+          </a:p>
+        </p:txBody>
+      </p:sp>
+      <p:pic>
+        <p:nvPicPr>
+          <p:cNvPr id="12" name="Gráfico 11" descr="Adicionar com preenchimento sólido">
+            <a:extLst>
+              <a:ext uri="{FF2B5EF4-FFF2-40B4-BE49-F238E27FC236}">
+                <a16:creationId xmlns:a16="http://schemas.microsoft.com/office/drawing/2014/main" id="{06C3E47E-7254-FBD9-D33F-EBD7A9611FC4}"/>
+              </a:ext>
+            </a:extLst>
+          </p:cNvPr>
+          <p:cNvPicPr>
+            <a:picLocks noChangeAspect="1"/>
+          </p:cNvPicPr>
+          <p:nvPr/>
+        </p:nvPicPr>
+        <p:blipFill>
+          <a:blip r:embed="rId2">
+            <a:extLst>
+              <a:ext uri="{28A0092B-C50C-407E-A947-70E740481C1C}">
+                <a14:useLocalDpi xmlns:a14="http://schemas.microsoft.com/office/drawing/2010/main" val="0"/>
+              </a:ext>
+              <a:ext uri="{96DAC541-7B7A-43D3-8B79-37D633B846F1}">
+                <asvg:svgBlip xmlns:asvg="http://schemas.microsoft.com/office/drawing/2016/SVG/main" r:embed="rId3"/>
+              </a:ext>
+            </a:extLst>
+          </a:blip>
+          <a:stretch>
+            <a:fillRect/>
+          </a:stretch>
+        </p:blipFill>
+        <p:spPr>
+          <a:xfrm>
+            <a:off x="4977535" y="4977534"/>
+            <a:ext cx="2221778" cy="2221778"/>
+          </a:xfrm>
+          <a:prstGeom prst="rect">
+            <a:avLst/>
+          </a:prstGeom>
+        </p:spPr>
+      </p:pic>
+      <p:sp>
+        <p:nvSpPr>
+          <p:cNvPr id="2" name="CaixaDeTexto 1">
+            <a:extLst>
+              <a:ext uri="{FF2B5EF4-FFF2-40B4-BE49-F238E27FC236}">
+                <a16:creationId xmlns:a16="http://schemas.microsoft.com/office/drawing/2014/main" id="{884EF956-69A2-80AE-C94C-1A49A3AC3CF2}"/>
+              </a:ext>
+            </a:extLst>
+          </p:cNvPr>
+          <p:cNvSpPr txBox="1"/>
+          <p:nvPr/>
+        </p:nvSpPr>
+        <p:spPr>
+          <a:xfrm>
+            <a:off x="2260456" y="1624641"/>
+            <a:ext cx="2678400" cy="2677656"/>
+          </a:xfrm>
+          <a:prstGeom prst="rect">
+            <a:avLst/>
+          </a:prstGeom>
+          <a:noFill/>
+          <a:ln w="381000">
+            <a:solidFill>
+              <a:srgbClr val="F36F20"/>
+            </a:solidFill>
+            <a:miter lim="800000"/>
+          </a:ln>
+        </p:spPr>
+        <p:txBody>
+          <a:bodyPr wrap="square" rtlCol="0" anchor="ctr">
+            <a:spAutoFit/>
+          </a:bodyPr>
+          <a:lstStyle/>
+          <a:p>
+            <a:pPr algn="ctr"/>
+            <a:endParaRPr lang="pt-BR" dirty="0"/>
+          </a:p>
+          <a:p>
+            <a:pPr algn="ctr"/>
+            <a:endParaRPr lang="pt-BR" dirty="0"/>
+          </a:p>
+          <a:p>
+            <a:pPr algn="ctr"/>
+            <a:r>
+              <a:rPr lang="pt-BR" sz="9600" b="1" dirty="0">
+                <a:solidFill>
+                  <a:srgbClr val="F36F20"/>
+                </a:solidFill>
+                <a:latin typeface="Arial" panose="020B0604020202020204" pitchFamily="34" charset="0"/>
+                <a:cs typeface="Arial" panose="020B0604020202020204" pitchFamily="34" charset="0"/>
+              </a:rPr>
+              <a:t>D</a:t>
+            </a:r>
+          </a:p>
+          <a:p>
+            <a:pPr algn="ctr"/>
+            <a:endParaRPr lang="pt-BR" dirty="0"/>
+          </a:p>
+          <a:p>
+            <a:pPr algn="ctr"/>
+            <a:endParaRPr lang="pt-BR" dirty="0"/>
+          </a:p>
+        </p:txBody>
+      </p:sp>
+      <p:cxnSp>
+        <p:nvCxnSpPr>
+          <p:cNvPr id="16" name="Conector reto 15">
+            <a:extLst>
+              <a:ext uri="{FF2B5EF4-FFF2-40B4-BE49-F238E27FC236}">
+                <a16:creationId xmlns:a16="http://schemas.microsoft.com/office/drawing/2014/main" id="{3164E088-78CC-6344-19C6-0E4D54EE55A9}"/>
+              </a:ext>
+            </a:extLst>
+          </p:cNvPr>
+          <p:cNvCxnSpPr>
+            <a:cxnSpLocks/>
+          </p:cNvCxnSpPr>
+          <p:nvPr/>
+        </p:nvCxnSpPr>
+        <p:spPr>
+          <a:xfrm>
+            <a:off x="4758746" y="2963469"/>
+            <a:ext cx="1620000" cy="0"/>
+          </a:xfrm>
+          <a:prstGeom prst="line">
+            <a:avLst/>
+          </a:prstGeom>
+          <a:ln w="381000">
+            <a:solidFill>
+              <a:srgbClr val="F36F20"/>
+            </a:solidFill>
+          </a:ln>
+        </p:spPr>
+        <p:style>
+          <a:lnRef idx="1">
+            <a:schemeClr val="accent1"/>
+          </a:lnRef>
+          <a:fillRef idx="0">
+            <a:schemeClr val="accent1"/>
+          </a:fillRef>
+          <a:effectRef idx="0">
+            <a:schemeClr val="accent1"/>
+          </a:effectRef>
+          <a:fontRef idx="minor">
+            <a:schemeClr val="tx1"/>
+          </a:fontRef>
+        </p:style>
+      </p:cxnSp>
+      <p:cxnSp>
+        <p:nvCxnSpPr>
+          <p:cNvPr id="17" name="Conector reto 16">
+            <a:extLst>
+              <a:ext uri="{FF2B5EF4-FFF2-40B4-BE49-F238E27FC236}">
+                <a16:creationId xmlns:a16="http://schemas.microsoft.com/office/drawing/2014/main" id="{6283C049-22AB-B5A2-1279-A4F1567822CA}"/>
+              </a:ext>
+            </a:extLst>
+          </p:cNvPr>
+          <p:cNvCxnSpPr>
+            <a:cxnSpLocks/>
+          </p:cNvCxnSpPr>
+          <p:nvPr/>
+        </p:nvCxnSpPr>
+        <p:spPr>
+          <a:xfrm>
+            <a:off x="816831" y="2963469"/>
+            <a:ext cx="1620000" cy="0"/>
+          </a:xfrm>
+          <a:prstGeom prst="line">
+            <a:avLst/>
+          </a:prstGeom>
+          <a:ln w="381000">
+            <a:solidFill>
+              <a:srgbClr val="F36F20"/>
+            </a:solidFill>
+          </a:ln>
+        </p:spPr>
+        <p:style>
+          <a:lnRef idx="1">
+            <a:schemeClr val="accent1"/>
+          </a:lnRef>
+          <a:fillRef idx="0">
+            <a:schemeClr val="accent1"/>
+          </a:fillRef>
+          <a:effectRef idx="0">
+            <a:schemeClr val="accent1"/>
+          </a:effectRef>
+          <a:fontRef idx="minor">
+            <a:schemeClr val="tx1"/>
+          </a:fontRef>
+        </p:style>
+      </p:cxnSp>
+    </p:spTree>
+    <p:extLst>
+      <p:ext uri="{BB962C8B-B14F-4D97-AF65-F5344CB8AC3E}">
+        <p14:creationId xmlns:p14="http://schemas.microsoft.com/office/powerpoint/2010/main" val="4062710140"/>
+      </p:ext>
+    </p:extLst>
+  </p:cSld>
+  <p:clrMapOvr>
+    <a:masterClrMapping/>
+  </p:clrMapOvr>
+</p:sld>
+</file>
+
+<file path=ppt/slides/slide23.xml><?xml version="1.0" encoding="utf-8"?>
+<p:sld xmlns:a="http://schemas.openxmlformats.org/drawingml/2006/main" xmlns:r="http://schemas.openxmlformats.org/officeDocument/2006/relationships" xmlns:p="http://schemas.openxmlformats.org/presentationml/2006/main">
+  <p:cSld>
+    <p:spTree>
+      <p:nvGrpSpPr>
+        <p:cNvPr id="1" name=""/>
+        <p:cNvGrpSpPr/>
+        <p:nvPr/>
+      </p:nvGrpSpPr>
+      <p:grpSpPr>
+        <a:xfrm>
+          <a:off x="0" y="0"/>
+          <a:ext cx="0" cy="0"/>
+          <a:chOff x="0" y="0"/>
+          <a:chExt cx="0" cy="0"/>
+        </a:xfrm>
+      </p:grpSpPr>
+      <p:sp>
+        <p:nvSpPr>
+          <p:cNvPr id="4" name="Retângulo 3">
+            <a:extLst>
+              <a:ext uri="{FF2B5EF4-FFF2-40B4-BE49-F238E27FC236}">
+                <a16:creationId xmlns:a16="http://schemas.microsoft.com/office/drawing/2014/main" id="{73521BF0-0376-2073-7FDD-6DD8B0C9B5B6}"/>
+              </a:ext>
+            </a:extLst>
+          </p:cNvPr>
+          <p:cNvSpPr/>
+          <p:nvPr/>
+        </p:nvSpPr>
+        <p:spPr>
+          <a:xfrm>
+            <a:off x="0" y="1"/>
+            <a:ext cx="7199313" cy="7199312"/>
+          </a:xfrm>
+          <a:prstGeom prst="rect">
+            <a:avLst/>
+          </a:prstGeom>
+          <a:solidFill>
+            <a:srgbClr val="141B41"/>
+          </a:solidFill>
+          <a:ln>
+            <a:noFill/>
+          </a:ln>
+        </p:spPr>
+        <p:style>
+          <a:lnRef idx="2">
+            <a:schemeClr val="accent1">
+              <a:shade val="50000"/>
+            </a:schemeClr>
+          </a:lnRef>
+          <a:fillRef idx="1">
+            <a:schemeClr val="accent1"/>
+          </a:fillRef>
+          <a:effectRef idx="0">
+            <a:schemeClr val="accent1"/>
+          </a:effectRef>
+          <a:fontRef idx="minor">
+            <a:schemeClr val="lt1"/>
+          </a:fontRef>
+        </p:style>
+        <p:txBody>
+          <a:bodyPr rtlCol="0" anchor="ctr"/>
+          <a:lstStyle/>
+          <a:p>
+            <a:pPr algn="ctr"/>
+            <a:endParaRPr lang="pt-BR" b="1" dirty="0">
+              <a:solidFill>
+                <a:srgbClr val="CF1259"/>
+              </a:solidFill>
+              <a:latin typeface="Arial" panose="020B0604020202020204" pitchFamily="34" charset="0"/>
+              <a:cs typeface="Arial" panose="020B0604020202020204" pitchFamily="34" charset="0"/>
+            </a:endParaRPr>
+          </a:p>
+        </p:txBody>
+      </p:sp>
+      <p:pic>
+        <p:nvPicPr>
+          <p:cNvPr id="5" name="Gráfico 4" descr="Casa com preenchimento sólido">
+            <a:extLst>
+              <a:ext uri="{FF2B5EF4-FFF2-40B4-BE49-F238E27FC236}">
+                <a16:creationId xmlns:a16="http://schemas.microsoft.com/office/drawing/2014/main" id="{9A3FACC0-C081-69C3-2620-0F58FF668B53}"/>
+              </a:ext>
+            </a:extLst>
+          </p:cNvPr>
+          <p:cNvPicPr>
+            <a:picLocks noChangeAspect="1"/>
+          </p:cNvPicPr>
+          <p:nvPr/>
+        </p:nvPicPr>
+        <p:blipFill>
+          <a:blip r:embed="rId2">
+            <a:extLst>
+              <a:ext uri="{28A0092B-C50C-407E-A947-70E740481C1C}">
+                <a14:useLocalDpi xmlns:a14="http://schemas.microsoft.com/office/drawing/2010/main" val="0"/>
+              </a:ext>
+              <a:ext uri="{96DAC541-7B7A-43D3-8B79-37D633B846F1}">
+                <asvg:svgBlip xmlns:asvg="http://schemas.microsoft.com/office/drawing/2016/SVG/main" r:embed="rId3"/>
+              </a:ext>
+            </a:extLst>
+          </a:blip>
+          <a:stretch>
+            <a:fillRect/>
+          </a:stretch>
+        </p:blipFill>
+        <p:spPr>
+          <a:xfrm>
+            <a:off x="669419" y="669419"/>
+            <a:ext cx="5860473" cy="5860473"/>
+          </a:xfrm>
+          <a:prstGeom prst="rect">
+            <a:avLst/>
+          </a:prstGeom>
+        </p:spPr>
+      </p:pic>
+    </p:spTree>
+    <p:extLst>
+      <p:ext uri="{BB962C8B-B14F-4D97-AF65-F5344CB8AC3E}">
+        <p14:creationId xmlns:p14="http://schemas.microsoft.com/office/powerpoint/2010/main" val="1799527099"/>
+      </p:ext>
+    </p:extLst>
+  </p:cSld>
+  <p:clrMapOvr>
+    <a:masterClrMapping/>
+  </p:clrMapOvr>
+</p:sld>
+</file>
+
+<file path=ppt/slides/slide24.xml><?xml version="1.0" encoding="utf-8"?>
+<p:sld xmlns:a="http://schemas.openxmlformats.org/drawingml/2006/main" xmlns:r="http://schemas.openxmlformats.org/officeDocument/2006/relationships" xmlns:p="http://schemas.openxmlformats.org/presentationml/2006/main">
+  <p:cSld>
+    <p:spTree>
+      <p:nvGrpSpPr>
+        <p:cNvPr id="1" name=""/>
+        <p:cNvGrpSpPr/>
+        <p:nvPr/>
+      </p:nvGrpSpPr>
+      <p:grpSpPr>
+        <a:xfrm>
+          <a:off x="0" y="0"/>
+          <a:ext cx="0" cy="0"/>
+          <a:chOff x="0" y="0"/>
+          <a:chExt cx="0" cy="0"/>
+        </a:xfrm>
+      </p:grpSpPr>
+      <p:sp>
+        <p:nvSpPr>
+          <p:cNvPr id="4" name="Retângulo 3">
+            <a:extLst>
+              <a:ext uri="{FF2B5EF4-FFF2-40B4-BE49-F238E27FC236}">
+                <a16:creationId xmlns:a16="http://schemas.microsoft.com/office/drawing/2014/main" id="{73521BF0-0376-2073-7FDD-6DD8B0C9B5B6}"/>
+              </a:ext>
+            </a:extLst>
+          </p:cNvPr>
+          <p:cNvSpPr/>
+          <p:nvPr/>
+        </p:nvSpPr>
+        <p:spPr>
+          <a:xfrm>
+            <a:off x="0" y="1"/>
+            <a:ext cx="7199313" cy="7199312"/>
+          </a:xfrm>
+          <a:prstGeom prst="rect">
+            <a:avLst/>
+          </a:prstGeom>
+          <a:solidFill>
+            <a:srgbClr val="141B41"/>
+          </a:solidFill>
+          <a:ln>
+            <a:noFill/>
+          </a:ln>
+        </p:spPr>
+        <p:style>
+          <a:lnRef idx="2">
+            <a:schemeClr val="accent1">
+              <a:shade val="50000"/>
+            </a:schemeClr>
+          </a:lnRef>
+          <a:fillRef idx="1">
+            <a:schemeClr val="accent1"/>
+          </a:fillRef>
+          <a:effectRef idx="0">
+            <a:schemeClr val="accent1"/>
+          </a:effectRef>
+          <a:fontRef idx="minor">
+            <a:schemeClr val="lt1"/>
+          </a:fontRef>
+        </p:style>
+        <p:txBody>
+          <a:bodyPr rtlCol="0" anchor="ctr"/>
+          <a:lstStyle/>
+          <a:p>
+            <a:pPr algn="ctr"/>
+            <a:endParaRPr lang="pt-BR" b="1" dirty="0">
+              <a:solidFill>
+                <a:srgbClr val="CF1259"/>
+              </a:solidFill>
+              <a:latin typeface="Arial" panose="020B0604020202020204" pitchFamily="34" charset="0"/>
+              <a:cs typeface="Arial" panose="020B0604020202020204" pitchFamily="34" charset="0"/>
+            </a:endParaRPr>
+          </a:p>
+        </p:txBody>
+      </p:sp>
+      <p:pic>
+        <p:nvPicPr>
+          <p:cNvPr id="5" name="Gráfico 4" descr="Casa com preenchimento sólido">
+            <a:extLst>
+              <a:ext uri="{FF2B5EF4-FFF2-40B4-BE49-F238E27FC236}">
+                <a16:creationId xmlns:a16="http://schemas.microsoft.com/office/drawing/2014/main" id="{9A3FACC0-C081-69C3-2620-0F58FF668B53}"/>
+              </a:ext>
+            </a:extLst>
+          </p:cNvPr>
+          <p:cNvPicPr>
+            <a:picLocks noChangeAspect="1"/>
+          </p:cNvPicPr>
+          <p:nvPr/>
+        </p:nvPicPr>
+        <p:blipFill>
+          <a:blip r:embed="rId2">
+            <a:extLst>
+              <a:ext uri="{28A0092B-C50C-407E-A947-70E740481C1C}">
+                <a14:useLocalDpi xmlns:a14="http://schemas.microsoft.com/office/drawing/2010/main" val="0"/>
+              </a:ext>
+              <a:ext uri="{96DAC541-7B7A-43D3-8B79-37D633B846F1}">
+                <asvg:svgBlip xmlns:asvg="http://schemas.microsoft.com/office/drawing/2016/SVG/main" r:embed="rId3"/>
+              </a:ext>
+            </a:extLst>
+          </a:blip>
+          <a:stretch>
+            <a:fillRect/>
+          </a:stretch>
+        </p:blipFill>
+        <p:spPr>
+          <a:xfrm>
+            <a:off x="669419" y="669419"/>
+            <a:ext cx="5860473" cy="5860473"/>
+          </a:xfrm>
+          <a:prstGeom prst="rect">
+            <a:avLst/>
+          </a:prstGeom>
+        </p:spPr>
+      </p:pic>
+    </p:spTree>
+    <p:extLst>
+      <p:ext uri="{BB962C8B-B14F-4D97-AF65-F5344CB8AC3E}">
+        <p14:creationId xmlns:p14="http://schemas.microsoft.com/office/powerpoint/2010/main" val="3571824825"/>
+      </p:ext>
+    </p:extLst>
+  </p:cSld>
+  <p:clrMapOvr>
+    <a:masterClrMapping/>
+  </p:clrMapOvr>
+</p:sld>
+</file>
+
+<file path=ppt/slides/slide25.xml><?xml version="1.0" encoding="utf-8"?>
+<p:sld xmlns:a="http://schemas.openxmlformats.org/drawingml/2006/main" xmlns:r="http://schemas.openxmlformats.org/officeDocument/2006/relationships" xmlns:p="http://schemas.openxmlformats.org/presentationml/2006/main">
+  <p:cSld>
+    <p:spTree>
+      <p:nvGrpSpPr>
+        <p:cNvPr id="1" name=""/>
+        <p:cNvGrpSpPr/>
+        <p:nvPr/>
+      </p:nvGrpSpPr>
+      <p:grpSpPr>
+        <a:xfrm>
+          <a:off x="0" y="0"/>
+          <a:ext cx="0" cy="0"/>
+          <a:chOff x="0" y="0"/>
+          <a:chExt cx="0" cy="0"/>
+        </a:xfrm>
+      </p:grpSpPr>
+      <p:sp>
+        <p:nvSpPr>
+          <p:cNvPr id="4" name="Retângulo 3">
+            <a:extLst>
+              <a:ext uri="{FF2B5EF4-FFF2-40B4-BE49-F238E27FC236}">
+                <a16:creationId xmlns:a16="http://schemas.microsoft.com/office/drawing/2014/main" id="{73521BF0-0376-2073-7FDD-6DD8B0C9B5B6}"/>
+              </a:ext>
+            </a:extLst>
+          </p:cNvPr>
+          <p:cNvSpPr/>
+          <p:nvPr/>
+        </p:nvSpPr>
+        <p:spPr>
+          <a:xfrm>
+            <a:off x="0" y="1"/>
+            <a:ext cx="7199313" cy="7199312"/>
+          </a:xfrm>
+          <a:prstGeom prst="rect">
+            <a:avLst/>
+          </a:prstGeom>
+          <a:solidFill>
+            <a:srgbClr val="141B41"/>
+          </a:solidFill>
+          <a:ln>
+            <a:noFill/>
+          </a:ln>
+        </p:spPr>
+        <p:style>
+          <a:lnRef idx="2">
+            <a:schemeClr val="accent1">
+              <a:shade val="50000"/>
+            </a:schemeClr>
+          </a:lnRef>
+          <a:fillRef idx="1">
+            <a:schemeClr val="accent1"/>
+          </a:fillRef>
+          <a:effectRef idx="0">
+            <a:schemeClr val="accent1"/>
+          </a:effectRef>
+          <a:fontRef idx="minor">
+            <a:schemeClr val="lt1"/>
+          </a:fontRef>
+        </p:style>
+        <p:txBody>
+          <a:bodyPr rtlCol="0" anchor="ctr"/>
+          <a:lstStyle/>
+          <a:p>
+            <a:pPr algn="ctr"/>
+            <a:endParaRPr lang="pt-BR" b="1" dirty="0">
+              <a:solidFill>
+                <a:srgbClr val="CF1259"/>
+              </a:solidFill>
+              <a:latin typeface="Arial" panose="020B0604020202020204" pitchFamily="34" charset="0"/>
+              <a:cs typeface="Arial" panose="020B0604020202020204" pitchFamily="34" charset="0"/>
+            </a:endParaRPr>
+          </a:p>
+        </p:txBody>
+      </p:sp>
+      <p:pic>
+        <p:nvPicPr>
+          <p:cNvPr id="3" name="Gráfico 2" descr="Seta: curva ligeira com preenchimento sólido">
+            <a:extLst>
+              <a:ext uri="{FF2B5EF4-FFF2-40B4-BE49-F238E27FC236}">
+                <a16:creationId xmlns:a16="http://schemas.microsoft.com/office/drawing/2014/main" id="{1B2AB188-0934-8981-49B5-117BBF374C91}"/>
+              </a:ext>
+            </a:extLst>
+          </p:cNvPr>
+          <p:cNvPicPr>
+            <a:picLocks noChangeAspect="1"/>
+          </p:cNvPicPr>
+          <p:nvPr/>
+        </p:nvPicPr>
+        <p:blipFill>
+          <a:blip r:embed="rId2">
+            <a:extLst>
+              <a:ext uri="{28A0092B-C50C-407E-A947-70E740481C1C}">
+                <a14:useLocalDpi xmlns:a14="http://schemas.microsoft.com/office/drawing/2010/main" val="0"/>
+              </a:ext>
+              <a:ext uri="{96DAC541-7B7A-43D3-8B79-37D633B846F1}">
+                <asvg:svgBlip xmlns:asvg="http://schemas.microsoft.com/office/drawing/2016/SVG/main" r:embed="rId3"/>
+              </a:ext>
+            </a:extLst>
+          </a:blip>
+          <a:stretch>
+            <a:fillRect/>
+          </a:stretch>
+        </p:blipFill>
+        <p:spPr>
+          <a:xfrm flipH="1" flipV="1">
+            <a:off x="906210" y="906210"/>
+            <a:ext cx="5386892" cy="5386892"/>
+          </a:xfrm>
+          <a:prstGeom prst="rect">
+            <a:avLst/>
+          </a:prstGeom>
+        </p:spPr>
+      </p:pic>
+    </p:spTree>
+    <p:extLst>
+      <p:ext uri="{BB962C8B-B14F-4D97-AF65-F5344CB8AC3E}">
+        <p14:creationId xmlns:p14="http://schemas.microsoft.com/office/powerpoint/2010/main" val="2351747689"/>
+      </p:ext>
+    </p:extLst>
+  </p:cSld>
+  <p:clrMapOvr>
+    <a:masterClrMapping/>
+  </p:clrMapOvr>
+</p:sld>
+</file>
+
+<file path=ppt/slides/slide26.xml><?xml version="1.0" encoding="utf-8"?>
+<p:sld xmlns:a="http://schemas.openxmlformats.org/drawingml/2006/main" xmlns:r="http://schemas.openxmlformats.org/officeDocument/2006/relationships" xmlns:p="http://schemas.openxmlformats.org/presentationml/2006/main">
+  <p:cSld>
+    <p:spTree>
+      <p:nvGrpSpPr>
+        <p:cNvPr id="1" name=""/>
+        <p:cNvGrpSpPr/>
+        <p:nvPr/>
+      </p:nvGrpSpPr>
+      <p:grpSpPr>
+        <a:xfrm>
+          <a:off x="0" y="0"/>
+          <a:ext cx="0" cy="0"/>
+          <a:chOff x="0" y="0"/>
+          <a:chExt cx="0" cy="0"/>
+        </a:xfrm>
+      </p:grpSpPr>
+      <p:sp>
+        <p:nvSpPr>
+          <p:cNvPr id="4" name="Retângulo 3">
+            <a:extLst>
+              <a:ext uri="{FF2B5EF4-FFF2-40B4-BE49-F238E27FC236}">
+                <a16:creationId xmlns:a16="http://schemas.microsoft.com/office/drawing/2014/main" id="{73521BF0-0376-2073-7FDD-6DD8B0C9B5B6}"/>
+              </a:ext>
+            </a:extLst>
+          </p:cNvPr>
+          <p:cNvSpPr/>
+          <p:nvPr/>
+        </p:nvSpPr>
+        <p:spPr>
+          <a:xfrm>
+            <a:off x="0" y="1"/>
+            <a:ext cx="7199313" cy="7199312"/>
+          </a:xfrm>
+          <a:prstGeom prst="rect">
+            <a:avLst/>
+          </a:prstGeom>
+          <a:solidFill>
+            <a:srgbClr val="141B41"/>
+          </a:solidFill>
+          <a:ln>
+            <a:noFill/>
+          </a:ln>
+        </p:spPr>
+        <p:style>
+          <a:lnRef idx="2">
+            <a:schemeClr val="accent1">
+              <a:shade val="50000"/>
+            </a:schemeClr>
+          </a:lnRef>
+          <a:fillRef idx="1">
+            <a:schemeClr val="accent1"/>
+          </a:fillRef>
+          <a:effectRef idx="0">
+            <a:schemeClr val="accent1"/>
+          </a:effectRef>
+          <a:fontRef idx="minor">
+            <a:schemeClr val="lt1"/>
+          </a:fontRef>
+        </p:style>
+        <p:txBody>
+          <a:bodyPr rtlCol="0" anchor="ctr"/>
+          <a:lstStyle/>
+          <a:p>
+            <a:pPr algn="ctr"/>
+            <a:endParaRPr lang="pt-BR" b="1" dirty="0">
+              <a:solidFill>
+                <a:srgbClr val="CF1259"/>
+              </a:solidFill>
+              <a:latin typeface="Arial" panose="020B0604020202020204" pitchFamily="34" charset="0"/>
+              <a:cs typeface="Arial" panose="020B0604020202020204" pitchFamily="34" charset="0"/>
+            </a:endParaRPr>
+          </a:p>
+        </p:txBody>
+      </p:sp>
+      <p:pic>
+        <p:nvPicPr>
+          <p:cNvPr id="3" name="Gráfico 2" descr="Seta: curva ligeira com preenchimento sólido">
+            <a:extLst>
+              <a:ext uri="{FF2B5EF4-FFF2-40B4-BE49-F238E27FC236}">
+                <a16:creationId xmlns:a16="http://schemas.microsoft.com/office/drawing/2014/main" id="{1B2AB188-0934-8981-49B5-117BBF374C91}"/>
+              </a:ext>
+            </a:extLst>
+          </p:cNvPr>
+          <p:cNvPicPr>
+            <a:picLocks noChangeAspect="1"/>
+          </p:cNvPicPr>
+          <p:nvPr/>
+        </p:nvPicPr>
+        <p:blipFill>
+          <a:blip r:embed="rId2">
+            <a:extLst>
+              <a:ext uri="{28A0092B-C50C-407E-A947-70E740481C1C}">
+                <a14:useLocalDpi xmlns:a14="http://schemas.microsoft.com/office/drawing/2010/main" val="0"/>
+              </a:ext>
+              <a:ext uri="{96DAC541-7B7A-43D3-8B79-37D633B846F1}">
+                <asvg:svgBlip xmlns:asvg="http://schemas.microsoft.com/office/drawing/2016/SVG/main" r:embed="rId3"/>
+              </a:ext>
+            </a:extLst>
+          </a:blip>
+          <a:stretch>
+            <a:fillRect/>
+          </a:stretch>
+        </p:blipFill>
+        <p:spPr>
+          <a:xfrm flipH="1" flipV="1">
+            <a:off x="906210" y="906210"/>
+            <a:ext cx="5386892" cy="5386892"/>
+          </a:xfrm>
+          <a:prstGeom prst="rect">
+            <a:avLst/>
+          </a:prstGeom>
+        </p:spPr>
+      </p:pic>
+    </p:spTree>
+    <p:extLst>
+      <p:ext uri="{BB962C8B-B14F-4D97-AF65-F5344CB8AC3E}">
+        <p14:creationId xmlns:p14="http://schemas.microsoft.com/office/powerpoint/2010/main" val="1226242250"/>
       </p:ext>
     </p:extLst>
   </p:cSld>

</xml_diff>

<commit_message>
Adicionando Formulário de Cadastro de TC
</commit_message>
<xml_diff>
--- a/Icons/icons.pptx
+++ b/Icons/icons.pptx
@@ -31,6 +31,8 @@
     <p:sldId id="290" r:id="rId25"/>
     <p:sldId id="291" r:id="rId26"/>
     <p:sldId id="292" r:id="rId27"/>
+    <p:sldId id="293" r:id="rId28"/>
+    <p:sldId id="295" r:id="rId29"/>
   </p:sldIdLst>
   <p:sldSz cx="7199313" cy="7199313"/>
   <p:notesSz cx="6858000" cy="9144000"/>
@@ -8111,6 +8113,260 @@
 </p:sld>
 </file>
 
+<file path=ppt/slides/slide27.xml><?xml version="1.0" encoding="utf-8"?>
+<p:sld xmlns:a="http://schemas.openxmlformats.org/drawingml/2006/main" xmlns:r="http://schemas.openxmlformats.org/officeDocument/2006/relationships" xmlns:p="http://schemas.openxmlformats.org/presentationml/2006/main">
+  <p:cSld>
+    <p:spTree>
+      <p:nvGrpSpPr>
+        <p:cNvPr id="1" name=""/>
+        <p:cNvGrpSpPr/>
+        <p:nvPr/>
+      </p:nvGrpSpPr>
+      <p:grpSpPr>
+        <a:xfrm>
+          <a:off x="0" y="0"/>
+          <a:ext cx="0" cy="0"/>
+          <a:chOff x="0" y="0"/>
+          <a:chExt cx="0" cy="0"/>
+        </a:xfrm>
+      </p:grpSpPr>
+      <p:sp>
+        <p:nvSpPr>
+          <p:cNvPr id="4" name="Retângulo 3">
+            <a:extLst>
+              <a:ext uri="{FF2B5EF4-FFF2-40B4-BE49-F238E27FC236}">
+                <a16:creationId xmlns:a16="http://schemas.microsoft.com/office/drawing/2014/main" id="{73521BF0-0376-2073-7FDD-6DD8B0C9B5B6}"/>
+              </a:ext>
+            </a:extLst>
+          </p:cNvPr>
+          <p:cNvSpPr/>
+          <p:nvPr/>
+        </p:nvSpPr>
+        <p:spPr>
+          <a:xfrm>
+            <a:off x="0" y="1"/>
+            <a:ext cx="7199313" cy="7199312"/>
+          </a:xfrm>
+          <a:prstGeom prst="rect">
+            <a:avLst/>
+          </a:prstGeom>
+          <a:solidFill>
+            <a:srgbClr val="141B41"/>
+          </a:solidFill>
+          <a:ln>
+            <a:noFill/>
+          </a:ln>
+        </p:spPr>
+        <p:style>
+          <a:lnRef idx="2">
+            <a:schemeClr val="accent1">
+              <a:shade val="50000"/>
+            </a:schemeClr>
+          </a:lnRef>
+          <a:fillRef idx="1">
+            <a:schemeClr val="accent1"/>
+          </a:fillRef>
+          <a:effectRef idx="0">
+            <a:schemeClr val="accent1"/>
+          </a:effectRef>
+          <a:fontRef idx="minor">
+            <a:schemeClr val="lt1"/>
+          </a:fontRef>
+        </p:style>
+        <p:txBody>
+          <a:bodyPr rtlCol="0" anchor="ctr"/>
+          <a:lstStyle/>
+          <a:p>
+            <a:pPr algn="ctr"/>
+            <a:endParaRPr lang="pt-BR" b="1" dirty="0">
+              <a:solidFill>
+                <a:srgbClr val="CF1259"/>
+              </a:solidFill>
+              <a:latin typeface="Arial" panose="020B0604020202020204" pitchFamily="34" charset="0"/>
+              <a:cs typeface="Arial" panose="020B0604020202020204" pitchFamily="34" charset="0"/>
+            </a:endParaRPr>
+          </a:p>
+        </p:txBody>
+      </p:sp>
+      <p:pic>
+        <p:nvPicPr>
+          <p:cNvPr id="5" name="Gráfico 4" descr="Disco com preenchimento sólido">
+            <a:extLst>
+              <a:ext uri="{FF2B5EF4-FFF2-40B4-BE49-F238E27FC236}">
+                <a16:creationId xmlns:a16="http://schemas.microsoft.com/office/drawing/2014/main" id="{1CC3EEA3-E507-B7C5-267A-018175F9F9E5}"/>
+              </a:ext>
+            </a:extLst>
+          </p:cNvPr>
+          <p:cNvPicPr>
+            <a:picLocks noChangeAspect="1"/>
+          </p:cNvPicPr>
+          <p:nvPr/>
+        </p:nvPicPr>
+        <p:blipFill>
+          <a:blip r:embed="rId2">
+            <a:extLst>
+              <a:ext uri="{28A0092B-C50C-407E-A947-70E740481C1C}">
+                <a14:useLocalDpi xmlns:a14="http://schemas.microsoft.com/office/drawing/2010/main" val="0"/>
+              </a:ext>
+              <a:ext uri="{96DAC541-7B7A-43D3-8B79-37D633B846F1}">
+                <asvg:svgBlip xmlns:asvg="http://schemas.microsoft.com/office/drawing/2016/SVG/main" r:embed="rId3"/>
+              </a:ext>
+            </a:extLst>
+          </a:blip>
+          <a:stretch>
+            <a:fillRect/>
+          </a:stretch>
+        </p:blipFill>
+        <p:spPr>
+          <a:xfrm>
+            <a:off x="1049156" y="1049156"/>
+            <a:ext cx="5101000" cy="5101000"/>
+          </a:xfrm>
+          <a:prstGeom prst="rect">
+            <a:avLst/>
+          </a:prstGeom>
+        </p:spPr>
+      </p:pic>
+    </p:spTree>
+    <p:extLst>
+      <p:ext uri="{BB962C8B-B14F-4D97-AF65-F5344CB8AC3E}">
+        <p14:creationId xmlns:p14="http://schemas.microsoft.com/office/powerpoint/2010/main" val="2653874445"/>
+      </p:ext>
+    </p:extLst>
+  </p:cSld>
+  <p:clrMapOvr>
+    <a:masterClrMapping/>
+  </p:clrMapOvr>
+</p:sld>
+</file>
+
+<file path=ppt/slides/slide28.xml><?xml version="1.0" encoding="utf-8"?>
+<p:sld xmlns:a="http://schemas.openxmlformats.org/drawingml/2006/main" xmlns:r="http://schemas.openxmlformats.org/officeDocument/2006/relationships" xmlns:p="http://schemas.openxmlformats.org/presentationml/2006/main">
+  <p:cSld>
+    <p:spTree>
+      <p:nvGrpSpPr>
+        <p:cNvPr id="1" name=""/>
+        <p:cNvGrpSpPr/>
+        <p:nvPr/>
+      </p:nvGrpSpPr>
+      <p:grpSpPr>
+        <a:xfrm>
+          <a:off x="0" y="0"/>
+          <a:ext cx="0" cy="0"/>
+          <a:chOff x="0" y="0"/>
+          <a:chExt cx="0" cy="0"/>
+        </a:xfrm>
+      </p:grpSpPr>
+      <p:sp>
+        <p:nvSpPr>
+          <p:cNvPr id="4" name="Retângulo 3">
+            <a:extLst>
+              <a:ext uri="{FF2B5EF4-FFF2-40B4-BE49-F238E27FC236}">
+                <a16:creationId xmlns:a16="http://schemas.microsoft.com/office/drawing/2014/main" id="{73521BF0-0376-2073-7FDD-6DD8B0C9B5B6}"/>
+              </a:ext>
+            </a:extLst>
+          </p:cNvPr>
+          <p:cNvSpPr/>
+          <p:nvPr/>
+        </p:nvSpPr>
+        <p:spPr>
+          <a:xfrm>
+            <a:off x="0" y="1"/>
+            <a:ext cx="7199313" cy="7199312"/>
+          </a:xfrm>
+          <a:prstGeom prst="rect">
+            <a:avLst/>
+          </a:prstGeom>
+          <a:solidFill>
+            <a:srgbClr val="141B41"/>
+          </a:solidFill>
+          <a:ln>
+            <a:noFill/>
+          </a:ln>
+        </p:spPr>
+        <p:style>
+          <a:lnRef idx="2">
+            <a:schemeClr val="accent1">
+              <a:shade val="50000"/>
+            </a:schemeClr>
+          </a:lnRef>
+          <a:fillRef idx="1">
+            <a:schemeClr val="accent1"/>
+          </a:fillRef>
+          <a:effectRef idx="0">
+            <a:schemeClr val="accent1"/>
+          </a:effectRef>
+          <a:fontRef idx="minor">
+            <a:schemeClr val="lt1"/>
+          </a:fontRef>
+        </p:style>
+        <p:txBody>
+          <a:bodyPr rtlCol="0" anchor="ctr"/>
+          <a:lstStyle/>
+          <a:p>
+            <a:pPr algn="ctr"/>
+            <a:endParaRPr lang="pt-BR" b="1" dirty="0">
+              <a:solidFill>
+                <a:srgbClr val="CF1259"/>
+              </a:solidFill>
+              <a:latin typeface="Arial" panose="020B0604020202020204" pitchFamily="34" charset="0"/>
+              <a:cs typeface="Arial" panose="020B0604020202020204" pitchFamily="34" charset="0"/>
+            </a:endParaRPr>
+          </a:p>
+        </p:txBody>
+      </p:sp>
+      <p:pic>
+        <p:nvPicPr>
+          <p:cNvPr id="5" name="Gráfico 4" descr="Disco com preenchimento sólido">
+            <a:extLst>
+              <a:ext uri="{FF2B5EF4-FFF2-40B4-BE49-F238E27FC236}">
+                <a16:creationId xmlns:a16="http://schemas.microsoft.com/office/drawing/2014/main" id="{1CC3EEA3-E507-B7C5-267A-018175F9F9E5}"/>
+              </a:ext>
+            </a:extLst>
+          </p:cNvPr>
+          <p:cNvPicPr>
+            <a:picLocks noChangeAspect="1"/>
+          </p:cNvPicPr>
+          <p:nvPr/>
+        </p:nvPicPr>
+        <p:blipFill>
+          <a:blip r:embed="rId2">
+            <a:extLst>
+              <a:ext uri="{28A0092B-C50C-407E-A947-70E740481C1C}">
+                <a14:useLocalDpi xmlns:a14="http://schemas.microsoft.com/office/drawing/2010/main" val="0"/>
+              </a:ext>
+              <a:ext uri="{96DAC541-7B7A-43D3-8B79-37D633B846F1}">
+                <asvg:svgBlip xmlns:asvg="http://schemas.microsoft.com/office/drawing/2016/SVG/main" r:embed="rId3"/>
+              </a:ext>
+            </a:extLst>
+          </a:blip>
+          <a:stretch>
+            <a:fillRect/>
+          </a:stretch>
+        </p:blipFill>
+        <p:spPr>
+          <a:xfrm>
+            <a:off x="1049156" y="1049156"/>
+            <a:ext cx="5101000" cy="5101000"/>
+          </a:xfrm>
+          <a:prstGeom prst="rect">
+            <a:avLst/>
+          </a:prstGeom>
+        </p:spPr>
+      </p:pic>
+    </p:spTree>
+    <p:extLst>
+      <p:ext uri="{BB962C8B-B14F-4D97-AF65-F5344CB8AC3E}">
+        <p14:creationId xmlns:p14="http://schemas.microsoft.com/office/powerpoint/2010/main" val="674988754"/>
+      </p:ext>
+    </p:extLst>
+  </p:cSld>
+  <p:clrMapOvr>
+    <a:masterClrMapping/>
+  </p:clrMapOvr>
+</p:sld>
+</file>
+
 <file path=ppt/slides/slide3.xml><?xml version="1.0" encoding="utf-8"?>
 <p:sld xmlns:a="http://schemas.openxmlformats.org/drawingml/2006/main" xmlns:r="http://schemas.openxmlformats.org/officeDocument/2006/relationships" xmlns:p="http://schemas.openxmlformats.org/presentationml/2006/main">
   <p:cSld>

</xml_diff>

<commit_message>
Criando Forms Edição Deletar e Hovers Lixo e Ficha
</commit_message>
<xml_diff>
--- a/Icons/icons.pptx
+++ b/Icons/icons.pptx
@@ -33,6 +33,10 @@
     <p:sldId id="292" r:id="rId27"/>
     <p:sldId id="293" r:id="rId28"/>
     <p:sldId id="295" r:id="rId29"/>
+    <p:sldId id="298" r:id="rId30"/>
+    <p:sldId id="296" r:id="rId31"/>
+    <p:sldId id="299" r:id="rId32"/>
+    <p:sldId id="300" r:id="rId33"/>
   </p:sldIdLst>
   <p:sldSz cx="7199313" cy="7199313"/>
   <p:notesSz cx="6858000" cy="9144000"/>
@@ -281,7 +285,7 @@
           <a:p>
             <a:fld id="{1EBE8C36-EE12-445F-BC15-76F5298A89EB}" type="datetimeFigureOut">
               <a:rPr lang="pt-BR" smtClean="0"/>
-              <a:t>12/03/2023</a:t>
+              <a:t>28/03/2023</a:t>
             </a:fld>
             <a:endParaRPr lang="pt-BR"/>
           </a:p>
@@ -451,7 +455,7 @@
           <a:p>
             <a:fld id="{1EBE8C36-EE12-445F-BC15-76F5298A89EB}" type="datetimeFigureOut">
               <a:rPr lang="pt-BR" smtClean="0"/>
-              <a:t>12/03/2023</a:t>
+              <a:t>28/03/2023</a:t>
             </a:fld>
             <a:endParaRPr lang="pt-BR"/>
           </a:p>
@@ -631,7 +635,7 @@
           <a:p>
             <a:fld id="{1EBE8C36-EE12-445F-BC15-76F5298A89EB}" type="datetimeFigureOut">
               <a:rPr lang="pt-BR" smtClean="0"/>
-              <a:t>12/03/2023</a:t>
+              <a:t>28/03/2023</a:t>
             </a:fld>
             <a:endParaRPr lang="pt-BR"/>
           </a:p>
@@ -801,7 +805,7 @@
           <a:p>
             <a:fld id="{1EBE8C36-EE12-445F-BC15-76F5298A89EB}" type="datetimeFigureOut">
               <a:rPr lang="pt-BR" smtClean="0"/>
-              <a:t>12/03/2023</a:t>
+              <a:t>28/03/2023</a:t>
             </a:fld>
             <a:endParaRPr lang="pt-BR"/>
           </a:p>
@@ -1045,7 +1049,7 @@
           <a:p>
             <a:fld id="{1EBE8C36-EE12-445F-BC15-76F5298A89EB}" type="datetimeFigureOut">
               <a:rPr lang="pt-BR" smtClean="0"/>
-              <a:t>12/03/2023</a:t>
+              <a:t>28/03/2023</a:t>
             </a:fld>
             <a:endParaRPr lang="pt-BR"/>
           </a:p>
@@ -1277,7 +1281,7 @@
           <a:p>
             <a:fld id="{1EBE8C36-EE12-445F-BC15-76F5298A89EB}" type="datetimeFigureOut">
               <a:rPr lang="pt-BR" smtClean="0"/>
-              <a:t>12/03/2023</a:t>
+              <a:t>28/03/2023</a:t>
             </a:fld>
             <a:endParaRPr lang="pt-BR"/>
           </a:p>
@@ -1644,7 +1648,7 @@
           <a:p>
             <a:fld id="{1EBE8C36-EE12-445F-BC15-76F5298A89EB}" type="datetimeFigureOut">
               <a:rPr lang="pt-BR" smtClean="0"/>
-              <a:t>12/03/2023</a:t>
+              <a:t>28/03/2023</a:t>
             </a:fld>
             <a:endParaRPr lang="pt-BR"/>
           </a:p>
@@ -1762,7 +1766,7 @@
           <a:p>
             <a:fld id="{1EBE8C36-EE12-445F-BC15-76F5298A89EB}" type="datetimeFigureOut">
               <a:rPr lang="pt-BR" smtClean="0"/>
-              <a:t>12/03/2023</a:t>
+              <a:t>28/03/2023</a:t>
             </a:fld>
             <a:endParaRPr lang="pt-BR"/>
           </a:p>
@@ -1857,7 +1861,7 @@
           <a:p>
             <a:fld id="{1EBE8C36-EE12-445F-BC15-76F5298A89EB}" type="datetimeFigureOut">
               <a:rPr lang="pt-BR" smtClean="0"/>
-              <a:t>12/03/2023</a:t>
+              <a:t>28/03/2023</a:t>
             </a:fld>
             <a:endParaRPr lang="pt-BR"/>
           </a:p>
@@ -2134,7 +2138,7 @@
           <a:p>
             <a:fld id="{1EBE8C36-EE12-445F-BC15-76F5298A89EB}" type="datetimeFigureOut">
               <a:rPr lang="pt-BR" smtClean="0"/>
-              <a:t>12/03/2023</a:t>
+              <a:t>28/03/2023</a:t>
             </a:fld>
             <a:endParaRPr lang="pt-BR"/>
           </a:p>
@@ -2391,7 +2395,7 @@
           <a:p>
             <a:fld id="{1EBE8C36-EE12-445F-BC15-76F5298A89EB}" type="datetimeFigureOut">
               <a:rPr lang="pt-BR" smtClean="0"/>
-              <a:t>12/03/2023</a:t>
+              <a:t>28/03/2023</a:t>
             </a:fld>
             <a:endParaRPr lang="pt-BR"/>
           </a:p>
@@ -2604,7 +2608,7 @@
           <a:p>
             <a:fld id="{1EBE8C36-EE12-445F-BC15-76F5298A89EB}" type="datetimeFigureOut">
               <a:rPr lang="pt-BR" smtClean="0"/>
-              <a:t>12/03/2023</a:t>
+              <a:t>28/03/2023</a:t>
             </a:fld>
             <a:endParaRPr lang="pt-BR"/>
           </a:p>
@@ -8367,6 +8371,133 @@
 </p:sld>
 </file>
 
+<file path=ppt/slides/slide29.xml><?xml version="1.0" encoding="utf-8"?>
+<p:sld xmlns:a="http://schemas.openxmlformats.org/drawingml/2006/main" xmlns:r="http://schemas.openxmlformats.org/officeDocument/2006/relationships" xmlns:p="http://schemas.openxmlformats.org/presentationml/2006/main">
+  <p:cSld>
+    <p:spTree>
+      <p:nvGrpSpPr>
+        <p:cNvPr id="1" name=""/>
+        <p:cNvGrpSpPr/>
+        <p:nvPr/>
+      </p:nvGrpSpPr>
+      <p:grpSpPr>
+        <a:xfrm>
+          <a:off x="0" y="0"/>
+          <a:ext cx="0" cy="0"/>
+          <a:chOff x="0" y="0"/>
+          <a:chExt cx="0" cy="0"/>
+        </a:xfrm>
+      </p:grpSpPr>
+      <p:sp>
+        <p:nvSpPr>
+          <p:cNvPr id="4" name="Retângulo 3">
+            <a:extLst>
+              <a:ext uri="{FF2B5EF4-FFF2-40B4-BE49-F238E27FC236}">
+                <a16:creationId xmlns:a16="http://schemas.microsoft.com/office/drawing/2014/main" id="{73521BF0-0376-2073-7FDD-6DD8B0C9B5B6}"/>
+              </a:ext>
+            </a:extLst>
+          </p:cNvPr>
+          <p:cNvSpPr/>
+          <p:nvPr/>
+        </p:nvSpPr>
+        <p:spPr>
+          <a:xfrm>
+            <a:off x="0" y="1"/>
+            <a:ext cx="7199313" cy="7199312"/>
+          </a:xfrm>
+          <a:prstGeom prst="rect">
+            <a:avLst/>
+          </a:prstGeom>
+          <a:solidFill>
+            <a:srgbClr val="141B41"/>
+          </a:solidFill>
+          <a:ln>
+            <a:noFill/>
+          </a:ln>
+        </p:spPr>
+        <p:style>
+          <a:lnRef idx="2">
+            <a:schemeClr val="accent1">
+              <a:shade val="50000"/>
+            </a:schemeClr>
+          </a:lnRef>
+          <a:fillRef idx="1">
+            <a:schemeClr val="accent1"/>
+          </a:fillRef>
+          <a:effectRef idx="0">
+            <a:schemeClr val="accent1"/>
+          </a:effectRef>
+          <a:fontRef idx="minor">
+            <a:schemeClr val="lt1"/>
+          </a:fontRef>
+        </p:style>
+        <p:txBody>
+          <a:bodyPr rtlCol="0" anchor="ctr"/>
+          <a:lstStyle/>
+          <a:p>
+            <a:pPr algn="ctr"/>
+            <a:endParaRPr lang="pt-BR" b="1" dirty="0">
+              <a:solidFill>
+                <a:srgbClr val="CF1259"/>
+              </a:solidFill>
+              <a:latin typeface="Arial" panose="020B0604020202020204" pitchFamily="34" charset="0"/>
+              <a:cs typeface="Arial" panose="020B0604020202020204" pitchFamily="34" charset="0"/>
+            </a:endParaRPr>
+          </a:p>
+        </p:txBody>
+      </p:sp>
+      <p:pic>
+        <p:nvPicPr>
+          <p:cNvPr id="3" name="Gráfico 2" descr="Documento">
+            <a:extLst>
+              <a:ext uri="{FF2B5EF4-FFF2-40B4-BE49-F238E27FC236}">
+                <a16:creationId xmlns:a16="http://schemas.microsoft.com/office/drawing/2014/main" id="{AAC6FE2B-7EF0-4E1B-8596-0AA702319E3B}"/>
+              </a:ext>
+            </a:extLst>
+          </p:cNvPr>
+          <p:cNvPicPr>
+            <a:picLocks noChangeAspect="1"/>
+          </p:cNvPicPr>
+          <p:nvPr/>
+        </p:nvPicPr>
+        <p:blipFill>
+          <a:blip r:embed="rId2">
+            <a:extLst>
+              <a:ext uri="{28A0092B-C50C-407E-A947-70E740481C1C}">
+                <a14:useLocalDpi xmlns:a14="http://schemas.microsoft.com/office/drawing/2010/main" val="0"/>
+              </a:ext>
+              <a:ext uri="{96DAC541-7B7A-43D3-8B79-37D633B846F1}">
+                <asvg:svgBlip xmlns:asvg="http://schemas.microsoft.com/office/drawing/2016/SVG/main" r:embed="rId3"/>
+              </a:ext>
+            </a:extLst>
+          </a:blip>
+          <a:stretch>
+            <a:fillRect/>
+          </a:stretch>
+        </p:blipFill>
+        <p:spPr>
+          <a:xfrm>
+            <a:off x="1049056" y="1049056"/>
+            <a:ext cx="5101200" cy="5101200"/>
+          </a:xfrm>
+          <a:prstGeom prst="rect">
+            <a:avLst/>
+          </a:prstGeom>
+        </p:spPr>
+      </p:pic>
+    </p:spTree>
+    <p:extLst>
+      <p:ext uri="{BB962C8B-B14F-4D97-AF65-F5344CB8AC3E}">
+        <p14:creationId xmlns:p14="http://schemas.microsoft.com/office/powerpoint/2010/main" val="3505999877"/>
+      </p:ext>
+    </p:extLst>
+  </p:cSld>
+  <p:clrMapOvr>
+    <a:masterClrMapping/>
+  </p:clrMapOvr>
+</p:sld>
+</file>
+
 <file path=ppt/slides/slide3.xml><?xml version="1.0" encoding="utf-8"?>
 <p:sld xmlns:a="http://schemas.openxmlformats.org/drawingml/2006/main" xmlns:r="http://schemas.openxmlformats.org/officeDocument/2006/relationships" xmlns:p="http://schemas.openxmlformats.org/presentationml/2006/main">
   <p:cSld>
@@ -8512,6 +8643,387 @@
     <p:extLst>
       <p:ext uri="{BB962C8B-B14F-4D97-AF65-F5344CB8AC3E}">
         <p14:creationId xmlns:p14="http://schemas.microsoft.com/office/powerpoint/2010/main" val="765477307"/>
+      </p:ext>
+    </p:extLst>
+  </p:cSld>
+  <p:clrMapOvr>
+    <a:masterClrMapping/>
+  </p:clrMapOvr>
+</p:sld>
+</file>
+
+<file path=ppt/slides/slide30.xml><?xml version="1.0" encoding="utf-8"?>
+<p:sld xmlns:a="http://schemas.openxmlformats.org/drawingml/2006/main" xmlns:r="http://schemas.openxmlformats.org/officeDocument/2006/relationships" xmlns:p="http://schemas.openxmlformats.org/presentationml/2006/main">
+  <p:cSld>
+    <p:spTree>
+      <p:nvGrpSpPr>
+        <p:cNvPr id="1" name=""/>
+        <p:cNvGrpSpPr/>
+        <p:nvPr/>
+      </p:nvGrpSpPr>
+      <p:grpSpPr>
+        <a:xfrm>
+          <a:off x="0" y="0"/>
+          <a:ext cx="0" cy="0"/>
+          <a:chOff x="0" y="0"/>
+          <a:chExt cx="0" cy="0"/>
+        </a:xfrm>
+      </p:grpSpPr>
+      <p:sp>
+        <p:nvSpPr>
+          <p:cNvPr id="4" name="Retângulo 3">
+            <a:extLst>
+              <a:ext uri="{FF2B5EF4-FFF2-40B4-BE49-F238E27FC236}">
+                <a16:creationId xmlns:a16="http://schemas.microsoft.com/office/drawing/2014/main" id="{73521BF0-0376-2073-7FDD-6DD8B0C9B5B6}"/>
+              </a:ext>
+            </a:extLst>
+          </p:cNvPr>
+          <p:cNvSpPr/>
+          <p:nvPr/>
+        </p:nvSpPr>
+        <p:spPr>
+          <a:xfrm>
+            <a:off x="0" y="1"/>
+            <a:ext cx="7199313" cy="7199312"/>
+          </a:xfrm>
+          <a:prstGeom prst="rect">
+            <a:avLst/>
+          </a:prstGeom>
+          <a:solidFill>
+            <a:srgbClr val="141B41"/>
+          </a:solidFill>
+          <a:ln>
+            <a:noFill/>
+          </a:ln>
+        </p:spPr>
+        <p:style>
+          <a:lnRef idx="2">
+            <a:schemeClr val="accent1">
+              <a:shade val="50000"/>
+            </a:schemeClr>
+          </a:lnRef>
+          <a:fillRef idx="1">
+            <a:schemeClr val="accent1"/>
+          </a:fillRef>
+          <a:effectRef idx="0">
+            <a:schemeClr val="accent1"/>
+          </a:effectRef>
+          <a:fontRef idx="minor">
+            <a:schemeClr val="lt1"/>
+          </a:fontRef>
+        </p:style>
+        <p:txBody>
+          <a:bodyPr rtlCol="0" anchor="ctr"/>
+          <a:lstStyle/>
+          <a:p>
+            <a:pPr algn="ctr"/>
+            <a:endParaRPr lang="pt-BR" b="1" dirty="0">
+              <a:solidFill>
+                <a:srgbClr val="CF1259"/>
+              </a:solidFill>
+              <a:latin typeface="Arial" panose="020B0604020202020204" pitchFamily="34" charset="0"/>
+              <a:cs typeface="Arial" panose="020B0604020202020204" pitchFamily="34" charset="0"/>
+            </a:endParaRPr>
+          </a:p>
+        </p:txBody>
+      </p:sp>
+      <p:pic>
+        <p:nvPicPr>
+          <p:cNvPr id="3" name="Gráfico 2" descr="Documento">
+            <a:extLst>
+              <a:ext uri="{FF2B5EF4-FFF2-40B4-BE49-F238E27FC236}">
+                <a16:creationId xmlns:a16="http://schemas.microsoft.com/office/drawing/2014/main" id="{AAC6FE2B-7EF0-4E1B-8596-0AA702319E3B}"/>
+              </a:ext>
+            </a:extLst>
+          </p:cNvPr>
+          <p:cNvPicPr>
+            <a:picLocks noChangeAspect="1"/>
+          </p:cNvPicPr>
+          <p:nvPr/>
+        </p:nvPicPr>
+        <p:blipFill>
+          <a:blip r:embed="rId2">
+            <a:extLst>
+              <a:ext uri="{28A0092B-C50C-407E-A947-70E740481C1C}">
+                <a14:useLocalDpi xmlns:a14="http://schemas.microsoft.com/office/drawing/2010/main" val="0"/>
+              </a:ext>
+              <a:ext uri="{96DAC541-7B7A-43D3-8B79-37D633B846F1}">
+                <asvg:svgBlip xmlns:asvg="http://schemas.microsoft.com/office/drawing/2016/SVG/main" r:embed="rId3"/>
+              </a:ext>
+            </a:extLst>
+          </a:blip>
+          <a:stretch>
+            <a:fillRect/>
+          </a:stretch>
+        </p:blipFill>
+        <p:spPr>
+          <a:xfrm>
+            <a:off x="1049056" y="1049056"/>
+            <a:ext cx="5101200" cy="5101200"/>
+          </a:xfrm>
+          <a:prstGeom prst="rect">
+            <a:avLst/>
+          </a:prstGeom>
+        </p:spPr>
+      </p:pic>
+    </p:spTree>
+    <p:extLst>
+      <p:ext uri="{BB962C8B-B14F-4D97-AF65-F5344CB8AC3E}">
+        <p14:creationId xmlns:p14="http://schemas.microsoft.com/office/powerpoint/2010/main" val="2899131437"/>
+      </p:ext>
+    </p:extLst>
+  </p:cSld>
+  <p:clrMapOvr>
+    <a:masterClrMapping/>
+  </p:clrMapOvr>
+</p:sld>
+</file>
+
+<file path=ppt/slides/slide31.xml><?xml version="1.0" encoding="utf-8"?>
+<p:sld xmlns:a="http://schemas.openxmlformats.org/drawingml/2006/main" xmlns:r="http://schemas.openxmlformats.org/officeDocument/2006/relationships" xmlns:p="http://schemas.openxmlformats.org/presentationml/2006/main">
+  <p:cSld>
+    <p:spTree>
+      <p:nvGrpSpPr>
+        <p:cNvPr id="1" name=""/>
+        <p:cNvGrpSpPr/>
+        <p:nvPr/>
+      </p:nvGrpSpPr>
+      <p:grpSpPr>
+        <a:xfrm>
+          <a:off x="0" y="0"/>
+          <a:ext cx="0" cy="0"/>
+          <a:chOff x="0" y="0"/>
+          <a:chExt cx="0" cy="0"/>
+        </a:xfrm>
+      </p:grpSpPr>
+      <p:sp>
+        <p:nvSpPr>
+          <p:cNvPr id="4" name="Retângulo 3">
+            <a:extLst>
+              <a:ext uri="{FF2B5EF4-FFF2-40B4-BE49-F238E27FC236}">
+                <a16:creationId xmlns:a16="http://schemas.microsoft.com/office/drawing/2014/main" id="{73521BF0-0376-2073-7FDD-6DD8B0C9B5B6}"/>
+              </a:ext>
+            </a:extLst>
+          </p:cNvPr>
+          <p:cNvSpPr/>
+          <p:nvPr/>
+        </p:nvSpPr>
+        <p:spPr>
+          <a:xfrm>
+            <a:off x="0" y="1"/>
+            <a:ext cx="7199313" cy="7199312"/>
+          </a:xfrm>
+          <a:prstGeom prst="rect">
+            <a:avLst/>
+          </a:prstGeom>
+          <a:solidFill>
+            <a:srgbClr val="141B41"/>
+          </a:solidFill>
+          <a:ln>
+            <a:noFill/>
+          </a:ln>
+        </p:spPr>
+        <p:style>
+          <a:lnRef idx="2">
+            <a:schemeClr val="accent1">
+              <a:shade val="50000"/>
+            </a:schemeClr>
+          </a:lnRef>
+          <a:fillRef idx="1">
+            <a:schemeClr val="accent1"/>
+          </a:fillRef>
+          <a:effectRef idx="0">
+            <a:schemeClr val="accent1"/>
+          </a:effectRef>
+          <a:fontRef idx="minor">
+            <a:schemeClr val="lt1"/>
+          </a:fontRef>
+        </p:style>
+        <p:txBody>
+          <a:bodyPr rtlCol="0" anchor="ctr"/>
+          <a:lstStyle/>
+          <a:p>
+            <a:pPr algn="ctr"/>
+            <a:endParaRPr lang="pt-BR" b="1" dirty="0">
+              <a:solidFill>
+                <a:srgbClr val="CF1259"/>
+              </a:solidFill>
+              <a:latin typeface="Arial" panose="020B0604020202020204" pitchFamily="34" charset="0"/>
+              <a:cs typeface="Arial" panose="020B0604020202020204" pitchFamily="34" charset="0"/>
+            </a:endParaRPr>
+          </a:p>
+        </p:txBody>
+      </p:sp>
+      <p:pic>
+        <p:nvPicPr>
+          <p:cNvPr id="5" name="Gráfico 4" descr="Lixo com preenchimento sólido">
+            <a:extLst>
+              <a:ext uri="{FF2B5EF4-FFF2-40B4-BE49-F238E27FC236}">
+                <a16:creationId xmlns:a16="http://schemas.microsoft.com/office/drawing/2014/main" id="{0E79CBA8-5EA7-404A-807B-577C39B9527E}"/>
+              </a:ext>
+            </a:extLst>
+          </p:cNvPr>
+          <p:cNvPicPr>
+            <a:picLocks noChangeAspect="1"/>
+          </p:cNvPicPr>
+          <p:nvPr/>
+        </p:nvPicPr>
+        <p:blipFill>
+          <a:blip r:embed="rId2">
+            <a:extLst>
+              <a:ext uri="{28A0092B-C50C-407E-A947-70E740481C1C}">
+                <a14:useLocalDpi xmlns:a14="http://schemas.microsoft.com/office/drawing/2010/main" val="0"/>
+              </a:ext>
+              <a:ext uri="{96DAC541-7B7A-43D3-8B79-37D633B846F1}">
+                <asvg:svgBlip xmlns:asvg="http://schemas.microsoft.com/office/drawing/2016/SVG/main" r:embed="rId3"/>
+              </a:ext>
+            </a:extLst>
+          </a:blip>
+          <a:stretch>
+            <a:fillRect/>
+          </a:stretch>
+        </p:blipFill>
+        <p:spPr>
+          <a:xfrm>
+            <a:off x="1049056" y="1049056"/>
+            <a:ext cx="5101200" cy="5101200"/>
+          </a:xfrm>
+          <a:prstGeom prst="rect">
+            <a:avLst/>
+          </a:prstGeom>
+        </p:spPr>
+      </p:pic>
+    </p:spTree>
+    <p:extLst>
+      <p:ext uri="{BB962C8B-B14F-4D97-AF65-F5344CB8AC3E}">
+        <p14:creationId xmlns:p14="http://schemas.microsoft.com/office/powerpoint/2010/main" val="2717980100"/>
+      </p:ext>
+    </p:extLst>
+  </p:cSld>
+  <p:clrMapOvr>
+    <a:masterClrMapping/>
+  </p:clrMapOvr>
+</p:sld>
+</file>
+
+<file path=ppt/slides/slide32.xml><?xml version="1.0" encoding="utf-8"?>
+<p:sld xmlns:a="http://schemas.openxmlformats.org/drawingml/2006/main" xmlns:r="http://schemas.openxmlformats.org/officeDocument/2006/relationships" xmlns:p="http://schemas.openxmlformats.org/presentationml/2006/main">
+  <p:cSld>
+    <p:spTree>
+      <p:nvGrpSpPr>
+        <p:cNvPr id="1" name=""/>
+        <p:cNvGrpSpPr/>
+        <p:nvPr/>
+      </p:nvGrpSpPr>
+      <p:grpSpPr>
+        <a:xfrm>
+          <a:off x="0" y="0"/>
+          <a:ext cx="0" cy="0"/>
+          <a:chOff x="0" y="0"/>
+          <a:chExt cx="0" cy="0"/>
+        </a:xfrm>
+      </p:grpSpPr>
+      <p:sp>
+        <p:nvSpPr>
+          <p:cNvPr id="4" name="Retângulo 3">
+            <a:extLst>
+              <a:ext uri="{FF2B5EF4-FFF2-40B4-BE49-F238E27FC236}">
+                <a16:creationId xmlns:a16="http://schemas.microsoft.com/office/drawing/2014/main" id="{73521BF0-0376-2073-7FDD-6DD8B0C9B5B6}"/>
+              </a:ext>
+            </a:extLst>
+          </p:cNvPr>
+          <p:cNvSpPr/>
+          <p:nvPr/>
+        </p:nvSpPr>
+        <p:spPr>
+          <a:xfrm>
+            <a:off x="0" y="1"/>
+            <a:ext cx="7199313" cy="7199312"/>
+          </a:xfrm>
+          <a:prstGeom prst="rect">
+            <a:avLst/>
+          </a:prstGeom>
+          <a:solidFill>
+            <a:srgbClr val="141B41"/>
+          </a:solidFill>
+          <a:ln>
+            <a:noFill/>
+          </a:ln>
+        </p:spPr>
+        <p:style>
+          <a:lnRef idx="2">
+            <a:schemeClr val="accent1">
+              <a:shade val="50000"/>
+            </a:schemeClr>
+          </a:lnRef>
+          <a:fillRef idx="1">
+            <a:schemeClr val="accent1"/>
+          </a:fillRef>
+          <a:effectRef idx="0">
+            <a:schemeClr val="accent1"/>
+          </a:effectRef>
+          <a:fontRef idx="minor">
+            <a:schemeClr val="lt1"/>
+          </a:fontRef>
+        </p:style>
+        <p:txBody>
+          <a:bodyPr rtlCol="0" anchor="ctr"/>
+          <a:lstStyle/>
+          <a:p>
+            <a:pPr algn="ctr"/>
+            <a:endParaRPr lang="pt-BR" b="1" dirty="0">
+              <a:solidFill>
+                <a:srgbClr val="CF1259"/>
+              </a:solidFill>
+              <a:latin typeface="Arial" panose="020B0604020202020204" pitchFamily="34" charset="0"/>
+              <a:cs typeface="Arial" panose="020B0604020202020204" pitchFamily="34" charset="0"/>
+            </a:endParaRPr>
+          </a:p>
+        </p:txBody>
+      </p:sp>
+      <p:pic>
+        <p:nvPicPr>
+          <p:cNvPr id="5" name="Gráfico 4" descr="Lixo com preenchimento sólido">
+            <a:extLst>
+              <a:ext uri="{FF2B5EF4-FFF2-40B4-BE49-F238E27FC236}">
+                <a16:creationId xmlns:a16="http://schemas.microsoft.com/office/drawing/2014/main" id="{0E79CBA8-5EA7-404A-807B-577C39B9527E}"/>
+              </a:ext>
+            </a:extLst>
+          </p:cNvPr>
+          <p:cNvPicPr>
+            <a:picLocks noChangeAspect="1"/>
+          </p:cNvPicPr>
+          <p:nvPr/>
+        </p:nvPicPr>
+        <p:blipFill>
+          <a:blip r:embed="rId2">
+            <a:extLst>
+              <a:ext uri="{28A0092B-C50C-407E-A947-70E740481C1C}">
+                <a14:useLocalDpi xmlns:a14="http://schemas.microsoft.com/office/drawing/2010/main" val="0"/>
+              </a:ext>
+              <a:ext uri="{96DAC541-7B7A-43D3-8B79-37D633B846F1}">
+                <asvg:svgBlip xmlns:asvg="http://schemas.microsoft.com/office/drawing/2016/SVG/main" r:embed="rId3"/>
+              </a:ext>
+            </a:extLst>
+          </a:blip>
+          <a:stretch>
+            <a:fillRect/>
+          </a:stretch>
+        </p:blipFill>
+        <p:spPr>
+          <a:xfrm>
+            <a:off x="1049056" y="1049056"/>
+            <a:ext cx="5101200" cy="5101200"/>
+          </a:xfrm>
+          <a:prstGeom prst="rect">
+            <a:avLst/>
+          </a:prstGeom>
+        </p:spPr>
+      </p:pic>
+    </p:spTree>
+    <p:extLst>
+      <p:ext uri="{BB962C8B-B14F-4D97-AF65-F5344CB8AC3E}">
+        <p14:creationId xmlns:p14="http://schemas.microsoft.com/office/powerpoint/2010/main" val="4234558771"/>
       </p:ext>
     </p:extLst>
   </p:cSld>

</xml_diff>

<commit_message>
Adicionando botões dos forms de edit e delete
</commit_message>
<xml_diff>
--- a/Icons/icons.pptx
+++ b/Icons/icons.pptx
@@ -37,6 +37,8 @@
     <p:sldId id="296" r:id="rId31"/>
     <p:sldId id="299" r:id="rId32"/>
     <p:sldId id="300" r:id="rId33"/>
+    <p:sldId id="301" r:id="rId34"/>
+    <p:sldId id="302" r:id="rId35"/>
   </p:sldIdLst>
   <p:sldSz cx="7199313" cy="7199313"/>
   <p:notesSz cx="6858000" cy="9144000"/>
@@ -285,7 +287,7 @@
           <a:p>
             <a:fld id="{1EBE8C36-EE12-445F-BC15-76F5298A89EB}" type="datetimeFigureOut">
               <a:rPr lang="pt-BR" smtClean="0"/>
-              <a:t>28/03/2023</a:t>
+              <a:t>29/03/2023</a:t>
             </a:fld>
             <a:endParaRPr lang="pt-BR"/>
           </a:p>
@@ -455,7 +457,7 @@
           <a:p>
             <a:fld id="{1EBE8C36-EE12-445F-BC15-76F5298A89EB}" type="datetimeFigureOut">
               <a:rPr lang="pt-BR" smtClean="0"/>
-              <a:t>28/03/2023</a:t>
+              <a:t>29/03/2023</a:t>
             </a:fld>
             <a:endParaRPr lang="pt-BR"/>
           </a:p>
@@ -635,7 +637,7 @@
           <a:p>
             <a:fld id="{1EBE8C36-EE12-445F-BC15-76F5298A89EB}" type="datetimeFigureOut">
               <a:rPr lang="pt-BR" smtClean="0"/>
-              <a:t>28/03/2023</a:t>
+              <a:t>29/03/2023</a:t>
             </a:fld>
             <a:endParaRPr lang="pt-BR"/>
           </a:p>
@@ -805,7 +807,7 @@
           <a:p>
             <a:fld id="{1EBE8C36-EE12-445F-BC15-76F5298A89EB}" type="datetimeFigureOut">
               <a:rPr lang="pt-BR" smtClean="0"/>
-              <a:t>28/03/2023</a:t>
+              <a:t>29/03/2023</a:t>
             </a:fld>
             <a:endParaRPr lang="pt-BR"/>
           </a:p>
@@ -1049,7 +1051,7 @@
           <a:p>
             <a:fld id="{1EBE8C36-EE12-445F-BC15-76F5298A89EB}" type="datetimeFigureOut">
               <a:rPr lang="pt-BR" smtClean="0"/>
-              <a:t>28/03/2023</a:t>
+              <a:t>29/03/2023</a:t>
             </a:fld>
             <a:endParaRPr lang="pt-BR"/>
           </a:p>
@@ -1281,7 +1283,7 @@
           <a:p>
             <a:fld id="{1EBE8C36-EE12-445F-BC15-76F5298A89EB}" type="datetimeFigureOut">
               <a:rPr lang="pt-BR" smtClean="0"/>
-              <a:t>28/03/2023</a:t>
+              <a:t>29/03/2023</a:t>
             </a:fld>
             <a:endParaRPr lang="pt-BR"/>
           </a:p>
@@ -1648,7 +1650,7 @@
           <a:p>
             <a:fld id="{1EBE8C36-EE12-445F-BC15-76F5298A89EB}" type="datetimeFigureOut">
               <a:rPr lang="pt-BR" smtClean="0"/>
-              <a:t>28/03/2023</a:t>
+              <a:t>29/03/2023</a:t>
             </a:fld>
             <a:endParaRPr lang="pt-BR"/>
           </a:p>
@@ -1766,7 +1768,7 @@
           <a:p>
             <a:fld id="{1EBE8C36-EE12-445F-BC15-76F5298A89EB}" type="datetimeFigureOut">
               <a:rPr lang="pt-BR" smtClean="0"/>
-              <a:t>28/03/2023</a:t>
+              <a:t>29/03/2023</a:t>
             </a:fld>
             <a:endParaRPr lang="pt-BR"/>
           </a:p>
@@ -1861,7 +1863,7 @@
           <a:p>
             <a:fld id="{1EBE8C36-EE12-445F-BC15-76F5298A89EB}" type="datetimeFigureOut">
               <a:rPr lang="pt-BR" smtClean="0"/>
-              <a:t>28/03/2023</a:t>
+              <a:t>29/03/2023</a:t>
             </a:fld>
             <a:endParaRPr lang="pt-BR"/>
           </a:p>
@@ -2138,7 +2140,7 @@
           <a:p>
             <a:fld id="{1EBE8C36-EE12-445F-BC15-76F5298A89EB}" type="datetimeFigureOut">
               <a:rPr lang="pt-BR" smtClean="0"/>
-              <a:t>28/03/2023</a:t>
+              <a:t>29/03/2023</a:t>
             </a:fld>
             <a:endParaRPr lang="pt-BR"/>
           </a:p>
@@ -2395,7 +2397,7 @@
           <a:p>
             <a:fld id="{1EBE8C36-EE12-445F-BC15-76F5298A89EB}" type="datetimeFigureOut">
               <a:rPr lang="pt-BR" smtClean="0"/>
-              <a:t>28/03/2023</a:t>
+              <a:t>29/03/2023</a:t>
             </a:fld>
             <a:endParaRPr lang="pt-BR"/>
           </a:p>
@@ -2608,7 +2610,7 @@
           <a:p>
             <a:fld id="{1EBE8C36-EE12-445F-BC15-76F5298A89EB}" type="datetimeFigureOut">
               <a:rPr lang="pt-BR" smtClean="0"/>
-              <a:t>28/03/2023</a:t>
+              <a:t>29/03/2023</a:t>
             </a:fld>
             <a:endParaRPr lang="pt-BR"/>
           </a:p>
@@ -3083,7 +3085,7 @@
                 <a14:useLocalDpi xmlns:a14="http://schemas.microsoft.com/office/drawing/2010/main" val="0"/>
               </a:ext>
               <a:ext uri="{96DAC541-7B7A-43D3-8B79-37D633B846F1}">
-                <asvg:svgBlip xmlns:asvg="http://schemas.microsoft.com/office/drawing/2016/SVG/main" r:embed="rId3"/>
+                <asvg:svgBlip xmlns:asvg="http://schemas.microsoft.com/office/drawing/2016/SVG/main" xmlns="" r:embed="rId3"/>
               </a:ext>
             </a:extLst>
           </a:blip>
@@ -3237,7 +3239,7 @@
                 <a14:useLocalDpi xmlns:a14="http://schemas.microsoft.com/office/drawing/2010/main" val="0"/>
               </a:ext>
               <a:ext uri="{96DAC541-7B7A-43D3-8B79-37D633B846F1}">
-                <asvg:svgBlip xmlns:asvg="http://schemas.microsoft.com/office/drawing/2016/SVG/main" r:embed="rId3"/>
+                <asvg:svgBlip xmlns:asvg="http://schemas.microsoft.com/office/drawing/2016/SVG/main" xmlns="" r:embed="rId3"/>
               </a:ext>
             </a:extLst>
           </a:blip>
@@ -3276,7 +3278,7 @@
                 <a14:useLocalDpi xmlns:a14="http://schemas.microsoft.com/office/drawing/2010/main" val="0"/>
               </a:ext>
               <a:ext uri="{96DAC541-7B7A-43D3-8B79-37D633B846F1}">
-                <asvg:svgBlip xmlns:asvg="http://schemas.microsoft.com/office/drawing/2016/SVG/main" r:embed="rId5"/>
+                <asvg:svgBlip xmlns:asvg="http://schemas.microsoft.com/office/drawing/2016/SVG/main" xmlns="" r:embed="rId5"/>
               </a:ext>
             </a:extLst>
           </a:blip>
@@ -3394,7 +3396,7 @@
                 <a14:useLocalDpi xmlns:a14="http://schemas.microsoft.com/office/drawing/2010/main" val="0"/>
               </a:ext>
               <a:ext uri="{96DAC541-7B7A-43D3-8B79-37D633B846F1}">
-                <asvg:svgBlip xmlns:asvg="http://schemas.microsoft.com/office/drawing/2016/SVG/main" r:embed="rId3"/>
+                <asvg:svgBlip xmlns:asvg="http://schemas.microsoft.com/office/drawing/2016/SVG/main" xmlns="" r:embed="rId3"/>
               </a:ext>
             </a:extLst>
           </a:blip>
@@ -3824,7 +3826,7 @@
                 <a14:useLocalDpi xmlns:a14="http://schemas.microsoft.com/office/drawing/2010/main" val="0"/>
               </a:ext>
               <a:ext uri="{96DAC541-7B7A-43D3-8B79-37D633B846F1}">
-                <asvg:svgBlip xmlns:asvg="http://schemas.microsoft.com/office/drawing/2016/SVG/main" r:embed="rId3"/>
+                <asvg:svgBlip xmlns:asvg="http://schemas.microsoft.com/office/drawing/2016/SVG/main" xmlns="" r:embed="rId3"/>
               </a:ext>
             </a:extLst>
           </a:blip>
@@ -4235,7 +4237,7 @@
                 <a14:useLocalDpi xmlns:a14="http://schemas.microsoft.com/office/drawing/2010/main" val="0"/>
               </a:ext>
               <a:ext uri="{96DAC541-7B7A-43D3-8B79-37D633B846F1}">
-                <asvg:svgBlip xmlns:asvg="http://schemas.microsoft.com/office/drawing/2016/SVG/main" r:embed="rId3"/>
+                <asvg:svgBlip xmlns:asvg="http://schemas.microsoft.com/office/drawing/2016/SVG/main" xmlns="" r:embed="rId3"/>
               </a:ext>
             </a:extLst>
           </a:blip>
@@ -4571,7 +4573,7 @@
                 <a14:useLocalDpi xmlns:a14="http://schemas.microsoft.com/office/drawing/2010/main" val="0"/>
               </a:ext>
               <a:ext uri="{96DAC541-7B7A-43D3-8B79-37D633B846F1}">
-                <asvg:svgBlip xmlns:asvg="http://schemas.microsoft.com/office/drawing/2016/SVG/main" r:embed="rId3"/>
+                <asvg:svgBlip xmlns:asvg="http://schemas.microsoft.com/office/drawing/2016/SVG/main" xmlns="" r:embed="rId3"/>
               </a:ext>
             </a:extLst>
           </a:blip>
@@ -4796,7 +4798,7 @@
                 <a14:useLocalDpi xmlns:a14="http://schemas.microsoft.com/office/drawing/2010/main" val="0"/>
               </a:ext>
               <a:ext uri="{96DAC541-7B7A-43D3-8B79-37D633B846F1}">
-                <asvg:svgBlip xmlns:asvg="http://schemas.microsoft.com/office/drawing/2016/SVG/main" r:embed="rId3"/>
+                <asvg:svgBlip xmlns:asvg="http://schemas.microsoft.com/office/drawing/2016/SVG/main" xmlns="" r:embed="rId3"/>
               </a:ext>
             </a:extLst>
           </a:blip>
@@ -5196,7 +5198,7 @@
                 <a14:useLocalDpi xmlns:a14="http://schemas.microsoft.com/office/drawing/2010/main" val="0"/>
               </a:ext>
               <a:ext uri="{96DAC541-7B7A-43D3-8B79-37D633B846F1}">
-                <asvg:svgBlip xmlns:asvg="http://schemas.microsoft.com/office/drawing/2016/SVG/main" r:embed="rId3"/>
+                <asvg:svgBlip xmlns:asvg="http://schemas.microsoft.com/office/drawing/2016/SVG/main" xmlns="" r:embed="rId3"/>
               </a:ext>
             </a:extLst>
           </a:blip>
@@ -5464,7 +5466,7 @@
                 <a14:useLocalDpi xmlns:a14="http://schemas.microsoft.com/office/drawing/2010/main" val="0"/>
               </a:ext>
               <a:ext uri="{96DAC541-7B7A-43D3-8B79-37D633B846F1}">
-                <asvg:svgBlip xmlns:asvg="http://schemas.microsoft.com/office/drawing/2016/SVG/main" r:embed="rId3"/>
+                <asvg:svgBlip xmlns:asvg="http://schemas.microsoft.com/office/drawing/2016/SVG/main" xmlns="" r:embed="rId3"/>
               </a:ext>
             </a:extLst>
           </a:blip>
@@ -5902,7 +5904,7 @@
                 <a14:useLocalDpi xmlns:a14="http://schemas.microsoft.com/office/drawing/2010/main" val="0"/>
               </a:ext>
               <a:ext uri="{96DAC541-7B7A-43D3-8B79-37D633B846F1}">
-                <asvg:svgBlip xmlns:asvg="http://schemas.microsoft.com/office/drawing/2016/SVG/main" r:embed="rId3"/>
+                <asvg:svgBlip xmlns:asvg="http://schemas.microsoft.com/office/drawing/2016/SVG/main" xmlns="" r:embed="rId3"/>
               </a:ext>
             </a:extLst>
           </a:blip>
@@ -6313,7 +6315,7 @@
                 <a14:useLocalDpi xmlns:a14="http://schemas.microsoft.com/office/drawing/2010/main" val="0"/>
               </a:ext>
               <a:ext uri="{96DAC541-7B7A-43D3-8B79-37D633B846F1}">
-                <asvg:svgBlip xmlns:asvg="http://schemas.microsoft.com/office/drawing/2016/SVG/main" r:embed="rId3"/>
+                <asvg:svgBlip xmlns:asvg="http://schemas.microsoft.com/office/drawing/2016/SVG/main" xmlns="" r:embed="rId3"/>
               </a:ext>
             </a:extLst>
           </a:blip>
@@ -6682,7 +6684,7 @@
                 <a14:useLocalDpi xmlns:a14="http://schemas.microsoft.com/office/drawing/2010/main" val="0"/>
               </a:ext>
               <a:ext uri="{96DAC541-7B7A-43D3-8B79-37D633B846F1}">
-                <asvg:svgBlip xmlns:asvg="http://schemas.microsoft.com/office/drawing/2016/SVG/main" r:embed="rId4"/>
+                <asvg:svgBlip xmlns:asvg="http://schemas.microsoft.com/office/drawing/2016/SVG/main" xmlns="" r:embed="rId4"/>
               </a:ext>
             </a:extLst>
           </a:blip>
@@ -6803,7 +6805,7 @@
                 <a14:useLocalDpi xmlns:a14="http://schemas.microsoft.com/office/drawing/2010/main" val="0"/>
               </a:ext>
               <a:ext uri="{96DAC541-7B7A-43D3-8B79-37D633B846F1}">
-                <asvg:svgBlip xmlns:asvg="http://schemas.microsoft.com/office/drawing/2016/SVG/main" r:embed="rId3"/>
+                <asvg:svgBlip xmlns:asvg="http://schemas.microsoft.com/office/drawing/2016/SVG/main" xmlns="" r:embed="rId3"/>
               </a:ext>
             </a:extLst>
           </a:blip>
@@ -7028,7 +7030,7 @@
                 <a14:useLocalDpi xmlns:a14="http://schemas.microsoft.com/office/drawing/2010/main" val="0"/>
               </a:ext>
               <a:ext uri="{96DAC541-7B7A-43D3-8B79-37D633B846F1}">
-                <asvg:svgBlip xmlns:asvg="http://schemas.microsoft.com/office/drawing/2016/SVG/main" r:embed="rId3"/>
+                <asvg:svgBlip xmlns:asvg="http://schemas.microsoft.com/office/drawing/2016/SVG/main" xmlns="" r:embed="rId3"/>
               </a:ext>
             </a:extLst>
           </a:blip>
@@ -7428,7 +7430,7 @@
                 <a14:useLocalDpi xmlns:a14="http://schemas.microsoft.com/office/drawing/2010/main" val="0"/>
               </a:ext>
               <a:ext uri="{96DAC541-7B7A-43D3-8B79-37D633B846F1}">
-                <asvg:svgBlip xmlns:asvg="http://schemas.microsoft.com/office/drawing/2016/SVG/main" r:embed="rId3"/>
+                <asvg:svgBlip xmlns:asvg="http://schemas.microsoft.com/office/drawing/2016/SVG/main" xmlns="" r:embed="rId3"/>
               </a:ext>
             </a:extLst>
           </a:blip>
@@ -7705,7 +7707,7 @@
                 <a14:useLocalDpi xmlns:a14="http://schemas.microsoft.com/office/drawing/2010/main" val="0"/>
               </a:ext>
               <a:ext uri="{96DAC541-7B7A-43D3-8B79-37D633B846F1}">
-                <asvg:svgBlip xmlns:asvg="http://schemas.microsoft.com/office/drawing/2016/SVG/main" r:embed="rId3"/>
+                <asvg:svgBlip xmlns:asvg="http://schemas.microsoft.com/office/drawing/2016/SVG/main" xmlns="" r:embed="rId3"/>
               </a:ext>
             </a:extLst>
           </a:blip>
@@ -7832,7 +7834,7 @@
                 <a14:useLocalDpi xmlns:a14="http://schemas.microsoft.com/office/drawing/2010/main" val="0"/>
               </a:ext>
               <a:ext uri="{96DAC541-7B7A-43D3-8B79-37D633B846F1}">
-                <asvg:svgBlip xmlns:asvg="http://schemas.microsoft.com/office/drawing/2016/SVG/main" r:embed="rId3"/>
+                <asvg:svgBlip xmlns:asvg="http://schemas.microsoft.com/office/drawing/2016/SVG/main" xmlns="" r:embed="rId3"/>
               </a:ext>
             </a:extLst>
           </a:blip>
@@ -7959,7 +7961,7 @@
                 <a14:useLocalDpi xmlns:a14="http://schemas.microsoft.com/office/drawing/2010/main" val="0"/>
               </a:ext>
               <a:ext uri="{96DAC541-7B7A-43D3-8B79-37D633B846F1}">
-                <asvg:svgBlip xmlns:asvg="http://schemas.microsoft.com/office/drawing/2016/SVG/main" r:embed="rId3"/>
+                <asvg:svgBlip xmlns:asvg="http://schemas.microsoft.com/office/drawing/2016/SVG/main" xmlns="" r:embed="rId3"/>
               </a:ext>
             </a:extLst>
           </a:blip>
@@ -8086,7 +8088,7 @@
                 <a14:useLocalDpi xmlns:a14="http://schemas.microsoft.com/office/drawing/2010/main" val="0"/>
               </a:ext>
               <a:ext uri="{96DAC541-7B7A-43D3-8B79-37D633B846F1}">
-                <asvg:svgBlip xmlns:asvg="http://schemas.microsoft.com/office/drawing/2016/SVG/main" r:embed="rId3"/>
+                <asvg:svgBlip xmlns:asvg="http://schemas.microsoft.com/office/drawing/2016/SVG/main" xmlns="" r:embed="rId3"/>
               </a:ext>
             </a:extLst>
           </a:blip>
@@ -8213,7 +8215,7 @@
                 <a14:useLocalDpi xmlns:a14="http://schemas.microsoft.com/office/drawing/2010/main" val="0"/>
               </a:ext>
               <a:ext uri="{96DAC541-7B7A-43D3-8B79-37D633B846F1}">
-                <asvg:svgBlip xmlns:asvg="http://schemas.microsoft.com/office/drawing/2016/SVG/main" r:embed="rId3"/>
+                <asvg:svgBlip xmlns:asvg="http://schemas.microsoft.com/office/drawing/2016/SVG/main" xmlns="" r:embed="rId3"/>
               </a:ext>
             </a:extLst>
           </a:blip>
@@ -8340,7 +8342,7 @@
                 <a14:useLocalDpi xmlns:a14="http://schemas.microsoft.com/office/drawing/2010/main" val="0"/>
               </a:ext>
               <a:ext uri="{96DAC541-7B7A-43D3-8B79-37D633B846F1}">
-                <asvg:svgBlip xmlns:asvg="http://schemas.microsoft.com/office/drawing/2016/SVG/main" r:embed="rId3"/>
+                <asvg:svgBlip xmlns:asvg="http://schemas.microsoft.com/office/drawing/2016/SVG/main" xmlns="" r:embed="rId3"/>
               </a:ext>
             </a:extLst>
           </a:blip>
@@ -8467,7 +8469,7 @@
                 <a14:useLocalDpi xmlns:a14="http://schemas.microsoft.com/office/drawing/2010/main" val="0"/>
               </a:ext>
               <a:ext uri="{96DAC541-7B7A-43D3-8B79-37D633B846F1}">
-                <asvg:svgBlip xmlns:asvg="http://schemas.microsoft.com/office/drawing/2016/SVG/main" r:embed="rId3"/>
+                <asvg:svgBlip xmlns:asvg="http://schemas.microsoft.com/office/drawing/2016/SVG/main" xmlns="" r:embed="rId3"/>
               </a:ext>
             </a:extLst>
           </a:blip>
@@ -8621,7 +8623,7 @@
                 <a14:useLocalDpi xmlns:a14="http://schemas.microsoft.com/office/drawing/2010/main" val="0"/>
               </a:ext>
               <a:ext uri="{96DAC541-7B7A-43D3-8B79-37D633B846F1}">
-                <asvg:svgBlip xmlns:asvg="http://schemas.microsoft.com/office/drawing/2016/SVG/main" r:embed="rId4"/>
+                <asvg:svgBlip xmlns:asvg="http://schemas.microsoft.com/office/drawing/2016/SVG/main" xmlns="" r:embed="rId4"/>
               </a:ext>
             </a:extLst>
           </a:blip>
@@ -8748,7 +8750,7 @@
                 <a14:useLocalDpi xmlns:a14="http://schemas.microsoft.com/office/drawing/2010/main" val="0"/>
               </a:ext>
               <a:ext uri="{96DAC541-7B7A-43D3-8B79-37D633B846F1}">
-                <asvg:svgBlip xmlns:asvg="http://schemas.microsoft.com/office/drawing/2016/SVG/main" r:embed="rId3"/>
+                <asvg:svgBlip xmlns:asvg="http://schemas.microsoft.com/office/drawing/2016/SVG/main" xmlns="" r:embed="rId3"/>
               </a:ext>
             </a:extLst>
           </a:blip>
@@ -8875,7 +8877,7 @@
                 <a14:useLocalDpi xmlns:a14="http://schemas.microsoft.com/office/drawing/2010/main" val="0"/>
               </a:ext>
               <a:ext uri="{96DAC541-7B7A-43D3-8B79-37D633B846F1}">
-                <asvg:svgBlip xmlns:asvg="http://schemas.microsoft.com/office/drawing/2016/SVG/main" r:embed="rId3"/>
+                <asvg:svgBlip xmlns:asvg="http://schemas.microsoft.com/office/drawing/2016/SVG/main" xmlns="" r:embed="rId3"/>
               </a:ext>
             </a:extLst>
           </a:blip>
@@ -9002,7 +9004,7 @@
                 <a14:useLocalDpi xmlns:a14="http://schemas.microsoft.com/office/drawing/2010/main" val="0"/>
               </a:ext>
               <a:ext uri="{96DAC541-7B7A-43D3-8B79-37D633B846F1}">
-                <asvg:svgBlip xmlns:asvg="http://schemas.microsoft.com/office/drawing/2016/SVG/main" r:embed="rId3"/>
+                <asvg:svgBlip xmlns:asvg="http://schemas.microsoft.com/office/drawing/2016/SVG/main" xmlns="" r:embed="rId3"/>
               </a:ext>
             </a:extLst>
           </a:blip>
@@ -9024,6 +9026,260 @@
     <p:extLst>
       <p:ext uri="{BB962C8B-B14F-4D97-AF65-F5344CB8AC3E}">
         <p14:creationId xmlns:p14="http://schemas.microsoft.com/office/powerpoint/2010/main" val="4234558771"/>
+      </p:ext>
+    </p:extLst>
+  </p:cSld>
+  <p:clrMapOvr>
+    <a:masterClrMapping/>
+  </p:clrMapOvr>
+</p:sld>
+</file>
+
+<file path=ppt/slides/slide33.xml><?xml version="1.0" encoding="utf-8"?>
+<p:sld xmlns:a="http://schemas.openxmlformats.org/drawingml/2006/main" xmlns:r="http://schemas.openxmlformats.org/officeDocument/2006/relationships" xmlns:p="http://schemas.openxmlformats.org/presentationml/2006/main">
+  <p:cSld>
+    <p:spTree>
+      <p:nvGrpSpPr>
+        <p:cNvPr id="1" name=""/>
+        <p:cNvGrpSpPr/>
+        <p:nvPr/>
+      </p:nvGrpSpPr>
+      <p:grpSpPr>
+        <a:xfrm>
+          <a:off x="0" y="0"/>
+          <a:ext cx="0" cy="0"/>
+          <a:chOff x="0" y="0"/>
+          <a:chExt cx="0" cy="0"/>
+        </a:xfrm>
+      </p:grpSpPr>
+      <p:sp>
+        <p:nvSpPr>
+          <p:cNvPr id="4" name="Retângulo 3">
+            <a:extLst>
+              <a:ext uri="{FF2B5EF4-FFF2-40B4-BE49-F238E27FC236}">
+                <a16:creationId xmlns:a16="http://schemas.microsoft.com/office/drawing/2014/main" id="{73521BF0-0376-2073-7FDD-6DD8B0C9B5B6}"/>
+              </a:ext>
+            </a:extLst>
+          </p:cNvPr>
+          <p:cNvSpPr/>
+          <p:nvPr/>
+        </p:nvSpPr>
+        <p:spPr>
+          <a:xfrm>
+            <a:off x="0" y="1"/>
+            <a:ext cx="7199313" cy="7199312"/>
+          </a:xfrm>
+          <a:prstGeom prst="rect">
+            <a:avLst/>
+          </a:prstGeom>
+          <a:solidFill>
+            <a:srgbClr val="141B41"/>
+          </a:solidFill>
+          <a:ln>
+            <a:noFill/>
+          </a:ln>
+        </p:spPr>
+        <p:style>
+          <a:lnRef idx="2">
+            <a:schemeClr val="accent1">
+              <a:shade val="50000"/>
+            </a:schemeClr>
+          </a:lnRef>
+          <a:fillRef idx="1">
+            <a:schemeClr val="accent1"/>
+          </a:fillRef>
+          <a:effectRef idx="0">
+            <a:schemeClr val="accent1"/>
+          </a:effectRef>
+          <a:fontRef idx="minor">
+            <a:schemeClr val="lt1"/>
+          </a:fontRef>
+        </p:style>
+        <p:txBody>
+          <a:bodyPr rtlCol="0" anchor="ctr"/>
+          <a:lstStyle/>
+          <a:p>
+            <a:pPr algn="ctr"/>
+            <a:endParaRPr lang="pt-BR" b="1" dirty="0">
+              <a:solidFill>
+                <a:srgbClr val="CF1259"/>
+              </a:solidFill>
+              <a:latin typeface="Arial" panose="020B0604020202020204" pitchFamily="34" charset="0"/>
+              <a:cs typeface="Arial" panose="020B0604020202020204" pitchFamily="34" charset="0"/>
+            </a:endParaRPr>
+          </a:p>
+        </p:txBody>
+      </p:sp>
+      <p:pic>
+        <p:nvPicPr>
+          <p:cNvPr id="6" name="Gráfico 2" descr="Lápis com preenchimento sólido">
+            <a:extLst>
+              <a:ext uri="{FF2B5EF4-FFF2-40B4-BE49-F238E27FC236}">
+                <a16:creationId xmlns:a16="http://schemas.microsoft.com/office/drawing/2014/main" id="{00EBFE80-145C-01E1-D575-E58572DF08A7}"/>
+              </a:ext>
+            </a:extLst>
+          </p:cNvPr>
+          <p:cNvPicPr>
+            <a:picLocks noChangeAspect="1"/>
+          </p:cNvPicPr>
+          <p:nvPr/>
+        </p:nvPicPr>
+        <p:blipFill>
+          <a:blip r:embed="rId2">
+            <a:extLst>
+              <a:ext uri="{28A0092B-C50C-407E-A947-70E740481C1C}">
+                <a14:useLocalDpi xmlns:a14="http://schemas.microsoft.com/office/drawing/2010/main" val="0"/>
+              </a:ext>
+              <a:ext uri="{96DAC541-7B7A-43D3-8B79-37D633B846F1}">
+                <asvg:svgBlip xmlns:asvg="http://schemas.microsoft.com/office/drawing/2016/SVG/main" xmlns="" r:embed="rId4"/>
+              </a:ext>
+            </a:extLst>
+          </a:blip>
+          <a:stretch>
+            <a:fillRect/>
+          </a:stretch>
+        </p:blipFill>
+        <p:spPr>
+          <a:xfrm>
+            <a:off x="1049056" y="1049057"/>
+            <a:ext cx="5101200" cy="5101200"/>
+          </a:xfrm>
+          <a:prstGeom prst="rect">
+            <a:avLst/>
+          </a:prstGeom>
+        </p:spPr>
+      </p:pic>
+    </p:spTree>
+    <p:extLst>
+      <p:ext uri="{BB962C8B-B14F-4D97-AF65-F5344CB8AC3E}">
+        <p14:creationId xmlns:p14="http://schemas.microsoft.com/office/powerpoint/2010/main" val="2874891208"/>
+      </p:ext>
+    </p:extLst>
+  </p:cSld>
+  <p:clrMapOvr>
+    <a:masterClrMapping/>
+  </p:clrMapOvr>
+</p:sld>
+</file>
+
+<file path=ppt/slides/slide34.xml><?xml version="1.0" encoding="utf-8"?>
+<p:sld xmlns:a="http://schemas.openxmlformats.org/drawingml/2006/main" xmlns:r="http://schemas.openxmlformats.org/officeDocument/2006/relationships" xmlns:p="http://schemas.openxmlformats.org/presentationml/2006/main">
+  <p:cSld>
+    <p:spTree>
+      <p:nvGrpSpPr>
+        <p:cNvPr id="1" name=""/>
+        <p:cNvGrpSpPr/>
+        <p:nvPr/>
+      </p:nvGrpSpPr>
+      <p:grpSpPr>
+        <a:xfrm>
+          <a:off x="0" y="0"/>
+          <a:ext cx="0" cy="0"/>
+          <a:chOff x="0" y="0"/>
+          <a:chExt cx="0" cy="0"/>
+        </a:xfrm>
+      </p:grpSpPr>
+      <p:sp>
+        <p:nvSpPr>
+          <p:cNvPr id="4" name="Retângulo 3">
+            <a:extLst>
+              <a:ext uri="{FF2B5EF4-FFF2-40B4-BE49-F238E27FC236}">
+                <a16:creationId xmlns:a16="http://schemas.microsoft.com/office/drawing/2014/main" id="{73521BF0-0376-2073-7FDD-6DD8B0C9B5B6}"/>
+              </a:ext>
+            </a:extLst>
+          </p:cNvPr>
+          <p:cNvSpPr/>
+          <p:nvPr/>
+        </p:nvSpPr>
+        <p:spPr>
+          <a:xfrm>
+            <a:off x="0" y="1"/>
+            <a:ext cx="7199313" cy="7199312"/>
+          </a:xfrm>
+          <a:prstGeom prst="rect">
+            <a:avLst/>
+          </a:prstGeom>
+          <a:solidFill>
+            <a:srgbClr val="141B41"/>
+          </a:solidFill>
+          <a:ln>
+            <a:noFill/>
+          </a:ln>
+        </p:spPr>
+        <p:style>
+          <a:lnRef idx="2">
+            <a:schemeClr val="accent1">
+              <a:shade val="50000"/>
+            </a:schemeClr>
+          </a:lnRef>
+          <a:fillRef idx="1">
+            <a:schemeClr val="accent1"/>
+          </a:fillRef>
+          <a:effectRef idx="0">
+            <a:schemeClr val="accent1"/>
+          </a:effectRef>
+          <a:fontRef idx="minor">
+            <a:schemeClr val="lt1"/>
+          </a:fontRef>
+        </p:style>
+        <p:txBody>
+          <a:bodyPr rtlCol="0" anchor="ctr"/>
+          <a:lstStyle/>
+          <a:p>
+            <a:pPr algn="ctr"/>
+            <a:endParaRPr lang="pt-BR" b="1" dirty="0">
+              <a:solidFill>
+                <a:srgbClr val="CF1259"/>
+              </a:solidFill>
+              <a:latin typeface="Arial" panose="020B0604020202020204" pitchFamily="34" charset="0"/>
+              <a:cs typeface="Arial" panose="020B0604020202020204" pitchFamily="34" charset="0"/>
+            </a:endParaRPr>
+          </a:p>
+        </p:txBody>
+      </p:sp>
+      <p:pic>
+        <p:nvPicPr>
+          <p:cNvPr id="5" name="Gráfico 2" descr="Lápis com preenchimento sólido">
+            <a:extLst>
+              <a:ext uri="{FF2B5EF4-FFF2-40B4-BE49-F238E27FC236}">
+                <a16:creationId xmlns:a16="http://schemas.microsoft.com/office/drawing/2014/main" id="{00EBFE80-145C-01E1-D575-E58572DF08A7}"/>
+              </a:ext>
+            </a:extLst>
+          </p:cNvPr>
+          <p:cNvPicPr>
+            <a:picLocks noChangeAspect="1"/>
+          </p:cNvPicPr>
+          <p:nvPr/>
+        </p:nvPicPr>
+        <p:blipFill>
+          <a:blip r:embed="rId2">
+            <a:extLst>
+              <a:ext uri="{28A0092B-C50C-407E-A947-70E740481C1C}">
+                <a14:useLocalDpi xmlns:a14="http://schemas.microsoft.com/office/drawing/2010/main" val="0"/>
+              </a:ext>
+              <a:ext uri="{96DAC541-7B7A-43D3-8B79-37D633B846F1}">
+                <asvg:svgBlip xmlns:asvg="http://schemas.microsoft.com/office/drawing/2016/SVG/main" xmlns="" r:embed="rId4"/>
+              </a:ext>
+            </a:extLst>
+          </a:blip>
+          <a:stretch>
+            <a:fillRect/>
+          </a:stretch>
+        </p:blipFill>
+        <p:spPr>
+          <a:xfrm>
+            <a:off x="1049056" y="1049057"/>
+            <a:ext cx="5101200" cy="5101200"/>
+          </a:xfrm>
+          <a:prstGeom prst="rect">
+            <a:avLst/>
+          </a:prstGeom>
+        </p:spPr>
+      </p:pic>
+    </p:spTree>
+    <p:extLst>
+      <p:ext uri="{BB962C8B-B14F-4D97-AF65-F5344CB8AC3E}">
+        <p14:creationId xmlns:p14="http://schemas.microsoft.com/office/powerpoint/2010/main" val="231048391"/>
       </p:ext>
     </p:extLst>
   </p:cSld>
@@ -9156,7 +9412,7 @@
                 <a14:useLocalDpi xmlns:a14="http://schemas.microsoft.com/office/drawing/2010/main" val="0"/>
               </a:ext>
               <a:ext uri="{96DAC541-7B7A-43D3-8B79-37D633B846F1}">
-                <asvg:svgBlip xmlns:asvg="http://schemas.microsoft.com/office/drawing/2016/SVG/main" r:embed="rId4"/>
+                <asvg:svgBlip xmlns:asvg="http://schemas.microsoft.com/office/drawing/2016/SVG/main" xmlns="" r:embed="rId4"/>
               </a:ext>
             </a:extLst>
           </a:blip>
@@ -9274,7 +9530,7 @@
                 <a14:useLocalDpi xmlns:a14="http://schemas.microsoft.com/office/drawing/2010/main" val="0"/>
               </a:ext>
               <a:ext uri="{96DAC541-7B7A-43D3-8B79-37D633B846F1}">
-                <asvg:svgBlip xmlns:asvg="http://schemas.microsoft.com/office/drawing/2016/SVG/main" r:embed="rId3"/>
+                <asvg:svgBlip xmlns:asvg="http://schemas.microsoft.com/office/drawing/2016/SVG/main" xmlns="" r:embed="rId3"/>
               </a:ext>
             </a:extLst>
           </a:blip>
@@ -9313,7 +9569,7 @@
                 <a14:useLocalDpi xmlns:a14="http://schemas.microsoft.com/office/drawing/2010/main" val="0"/>
               </a:ext>
               <a:ext uri="{96DAC541-7B7A-43D3-8B79-37D633B846F1}">
-                <asvg:svgBlip xmlns:asvg="http://schemas.microsoft.com/office/drawing/2016/SVG/main" r:embed="rId5"/>
+                <asvg:svgBlip xmlns:asvg="http://schemas.microsoft.com/office/drawing/2016/SVG/main" xmlns="" r:embed="rId5"/>
               </a:ext>
             </a:extLst>
           </a:blip>
@@ -9431,7 +9687,7 @@
                 <a14:useLocalDpi xmlns:a14="http://schemas.microsoft.com/office/drawing/2010/main" val="0"/>
               </a:ext>
               <a:ext uri="{96DAC541-7B7A-43D3-8B79-37D633B846F1}">
-                <asvg:svgBlip xmlns:asvg="http://schemas.microsoft.com/office/drawing/2016/SVG/main" r:embed="rId3"/>
+                <asvg:svgBlip xmlns:asvg="http://schemas.microsoft.com/office/drawing/2016/SVG/main" xmlns="" r:embed="rId3"/>
               </a:ext>
             </a:extLst>
           </a:blip>
@@ -9621,7 +9877,7 @@
                 <a14:useLocalDpi xmlns:a14="http://schemas.microsoft.com/office/drawing/2010/main" val="0"/>
               </a:ext>
               <a:ext uri="{96DAC541-7B7A-43D3-8B79-37D633B846F1}">
-                <asvg:svgBlip xmlns:asvg="http://schemas.microsoft.com/office/drawing/2016/SVG/main" r:embed="rId4"/>
+                <asvg:svgBlip xmlns:asvg="http://schemas.microsoft.com/office/drawing/2016/SVG/main" xmlns="" r:embed="rId4"/>
               </a:ext>
             </a:extLst>
           </a:blip>
@@ -9811,7 +10067,7 @@
                 <a14:useLocalDpi xmlns:a14="http://schemas.microsoft.com/office/drawing/2010/main" val="0"/>
               </a:ext>
               <a:ext uri="{96DAC541-7B7A-43D3-8B79-37D633B846F1}">
-                <asvg:svgBlip xmlns:asvg="http://schemas.microsoft.com/office/drawing/2016/SVG/main" r:embed="rId4"/>
+                <asvg:svgBlip xmlns:asvg="http://schemas.microsoft.com/office/drawing/2016/SVG/main" xmlns="" r:embed="rId4"/>
               </a:ext>
             </a:extLst>
           </a:blip>
@@ -10001,7 +10257,7 @@
                 <a14:useLocalDpi xmlns:a14="http://schemas.microsoft.com/office/drawing/2010/main" val="0"/>
               </a:ext>
               <a:ext uri="{96DAC541-7B7A-43D3-8B79-37D633B846F1}">
-                <asvg:svgBlip xmlns:asvg="http://schemas.microsoft.com/office/drawing/2016/SVG/main" r:embed="rId4"/>
+                <asvg:svgBlip xmlns:asvg="http://schemas.microsoft.com/office/drawing/2016/SVG/main" xmlns="" r:embed="rId4"/>
               </a:ext>
             </a:extLst>
           </a:blip>

</xml_diff>

<commit_message>
Criando Form de Inspeção Preventiva
</commit_message>
<xml_diff>
--- a/Icons/icons.pptx
+++ b/Icons/icons.pptx
@@ -39,6 +39,10 @@
     <p:sldId id="300" r:id="rId33"/>
     <p:sldId id="301" r:id="rId34"/>
     <p:sldId id="302" r:id="rId35"/>
+    <p:sldId id="303" r:id="rId36"/>
+    <p:sldId id="304" r:id="rId37"/>
+    <p:sldId id="305" r:id="rId38"/>
+    <p:sldId id="306" r:id="rId39"/>
   </p:sldIdLst>
   <p:sldSz cx="7199313" cy="7199313"/>
   <p:notesSz cx="6858000" cy="9144000"/>
@@ -287,7 +291,7 @@
           <a:p>
             <a:fld id="{1EBE8C36-EE12-445F-BC15-76F5298A89EB}" type="datetimeFigureOut">
               <a:rPr lang="pt-BR" smtClean="0"/>
-              <a:t>29/03/2023</a:t>
+              <a:t>07/04/2023</a:t>
             </a:fld>
             <a:endParaRPr lang="pt-BR"/>
           </a:p>
@@ -457,7 +461,7 @@
           <a:p>
             <a:fld id="{1EBE8C36-EE12-445F-BC15-76F5298A89EB}" type="datetimeFigureOut">
               <a:rPr lang="pt-BR" smtClean="0"/>
-              <a:t>29/03/2023</a:t>
+              <a:t>07/04/2023</a:t>
             </a:fld>
             <a:endParaRPr lang="pt-BR"/>
           </a:p>
@@ -637,7 +641,7 @@
           <a:p>
             <a:fld id="{1EBE8C36-EE12-445F-BC15-76F5298A89EB}" type="datetimeFigureOut">
               <a:rPr lang="pt-BR" smtClean="0"/>
-              <a:t>29/03/2023</a:t>
+              <a:t>07/04/2023</a:t>
             </a:fld>
             <a:endParaRPr lang="pt-BR"/>
           </a:p>
@@ -807,7 +811,7 @@
           <a:p>
             <a:fld id="{1EBE8C36-EE12-445F-BC15-76F5298A89EB}" type="datetimeFigureOut">
               <a:rPr lang="pt-BR" smtClean="0"/>
-              <a:t>29/03/2023</a:t>
+              <a:t>07/04/2023</a:t>
             </a:fld>
             <a:endParaRPr lang="pt-BR"/>
           </a:p>
@@ -1051,7 +1055,7 @@
           <a:p>
             <a:fld id="{1EBE8C36-EE12-445F-BC15-76F5298A89EB}" type="datetimeFigureOut">
               <a:rPr lang="pt-BR" smtClean="0"/>
-              <a:t>29/03/2023</a:t>
+              <a:t>07/04/2023</a:t>
             </a:fld>
             <a:endParaRPr lang="pt-BR"/>
           </a:p>
@@ -1283,7 +1287,7 @@
           <a:p>
             <a:fld id="{1EBE8C36-EE12-445F-BC15-76F5298A89EB}" type="datetimeFigureOut">
               <a:rPr lang="pt-BR" smtClean="0"/>
-              <a:t>29/03/2023</a:t>
+              <a:t>07/04/2023</a:t>
             </a:fld>
             <a:endParaRPr lang="pt-BR"/>
           </a:p>
@@ -1650,7 +1654,7 @@
           <a:p>
             <a:fld id="{1EBE8C36-EE12-445F-BC15-76F5298A89EB}" type="datetimeFigureOut">
               <a:rPr lang="pt-BR" smtClean="0"/>
-              <a:t>29/03/2023</a:t>
+              <a:t>07/04/2023</a:t>
             </a:fld>
             <a:endParaRPr lang="pt-BR"/>
           </a:p>
@@ -1768,7 +1772,7 @@
           <a:p>
             <a:fld id="{1EBE8C36-EE12-445F-BC15-76F5298A89EB}" type="datetimeFigureOut">
               <a:rPr lang="pt-BR" smtClean="0"/>
-              <a:t>29/03/2023</a:t>
+              <a:t>07/04/2023</a:t>
             </a:fld>
             <a:endParaRPr lang="pt-BR"/>
           </a:p>
@@ -1863,7 +1867,7 @@
           <a:p>
             <a:fld id="{1EBE8C36-EE12-445F-BC15-76F5298A89EB}" type="datetimeFigureOut">
               <a:rPr lang="pt-BR" smtClean="0"/>
-              <a:t>29/03/2023</a:t>
+              <a:t>07/04/2023</a:t>
             </a:fld>
             <a:endParaRPr lang="pt-BR"/>
           </a:p>
@@ -2140,7 +2144,7 @@
           <a:p>
             <a:fld id="{1EBE8C36-EE12-445F-BC15-76F5298A89EB}" type="datetimeFigureOut">
               <a:rPr lang="pt-BR" smtClean="0"/>
-              <a:t>29/03/2023</a:t>
+              <a:t>07/04/2023</a:t>
             </a:fld>
             <a:endParaRPr lang="pt-BR"/>
           </a:p>
@@ -2397,7 +2401,7 @@
           <a:p>
             <a:fld id="{1EBE8C36-EE12-445F-BC15-76F5298A89EB}" type="datetimeFigureOut">
               <a:rPr lang="pt-BR" smtClean="0"/>
-              <a:t>29/03/2023</a:t>
+              <a:t>07/04/2023</a:t>
             </a:fld>
             <a:endParaRPr lang="pt-BR"/>
           </a:p>
@@ -2610,7 +2614,7 @@
           <a:p>
             <a:fld id="{1EBE8C36-EE12-445F-BC15-76F5298A89EB}" type="datetimeFigureOut">
               <a:rPr lang="pt-BR" smtClean="0"/>
-              <a:t>29/03/2023</a:t>
+              <a:t>07/04/2023</a:t>
             </a:fld>
             <a:endParaRPr lang="pt-BR"/>
           </a:p>
@@ -3085,7 +3089,7 @@
                 <a14:useLocalDpi xmlns:a14="http://schemas.microsoft.com/office/drawing/2010/main" val="0"/>
               </a:ext>
               <a:ext uri="{96DAC541-7B7A-43D3-8B79-37D633B846F1}">
-                <asvg:svgBlip xmlns:asvg="http://schemas.microsoft.com/office/drawing/2016/SVG/main" xmlns="" r:embed="rId3"/>
+                <asvg:svgBlip xmlns:asvg="http://schemas.microsoft.com/office/drawing/2016/SVG/main" r:embed="rId3"/>
               </a:ext>
             </a:extLst>
           </a:blip>
@@ -3239,7 +3243,7 @@
                 <a14:useLocalDpi xmlns:a14="http://schemas.microsoft.com/office/drawing/2010/main" val="0"/>
               </a:ext>
               <a:ext uri="{96DAC541-7B7A-43D3-8B79-37D633B846F1}">
-                <asvg:svgBlip xmlns:asvg="http://schemas.microsoft.com/office/drawing/2016/SVG/main" xmlns="" r:embed="rId3"/>
+                <asvg:svgBlip xmlns:asvg="http://schemas.microsoft.com/office/drawing/2016/SVG/main" r:embed="rId3"/>
               </a:ext>
             </a:extLst>
           </a:blip>
@@ -3278,7 +3282,7 @@
                 <a14:useLocalDpi xmlns:a14="http://schemas.microsoft.com/office/drawing/2010/main" val="0"/>
               </a:ext>
               <a:ext uri="{96DAC541-7B7A-43D3-8B79-37D633B846F1}">
-                <asvg:svgBlip xmlns:asvg="http://schemas.microsoft.com/office/drawing/2016/SVG/main" xmlns="" r:embed="rId5"/>
+                <asvg:svgBlip xmlns:asvg="http://schemas.microsoft.com/office/drawing/2016/SVG/main" r:embed="rId5"/>
               </a:ext>
             </a:extLst>
           </a:blip>
@@ -3396,7 +3400,7 @@
                 <a14:useLocalDpi xmlns:a14="http://schemas.microsoft.com/office/drawing/2010/main" val="0"/>
               </a:ext>
               <a:ext uri="{96DAC541-7B7A-43D3-8B79-37D633B846F1}">
-                <asvg:svgBlip xmlns:asvg="http://schemas.microsoft.com/office/drawing/2016/SVG/main" xmlns="" r:embed="rId3"/>
+                <asvg:svgBlip xmlns:asvg="http://schemas.microsoft.com/office/drawing/2016/SVG/main" r:embed="rId3"/>
               </a:ext>
             </a:extLst>
           </a:blip>
@@ -3826,7 +3830,7 @@
                 <a14:useLocalDpi xmlns:a14="http://schemas.microsoft.com/office/drawing/2010/main" val="0"/>
               </a:ext>
               <a:ext uri="{96DAC541-7B7A-43D3-8B79-37D633B846F1}">
-                <asvg:svgBlip xmlns:asvg="http://schemas.microsoft.com/office/drawing/2016/SVG/main" xmlns="" r:embed="rId3"/>
+                <asvg:svgBlip xmlns:asvg="http://schemas.microsoft.com/office/drawing/2016/SVG/main" r:embed="rId3"/>
               </a:ext>
             </a:extLst>
           </a:blip>
@@ -4237,7 +4241,7 @@
                 <a14:useLocalDpi xmlns:a14="http://schemas.microsoft.com/office/drawing/2010/main" val="0"/>
               </a:ext>
               <a:ext uri="{96DAC541-7B7A-43D3-8B79-37D633B846F1}">
-                <asvg:svgBlip xmlns:asvg="http://schemas.microsoft.com/office/drawing/2016/SVG/main" xmlns="" r:embed="rId3"/>
+                <asvg:svgBlip xmlns:asvg="http://schemas.microsoft.com/office/drawing/2016/SVG/main" r:embed="rId3"/>
               </a:ext>
             </a:extLst>
           </a:blip>
@@ -4573,7 +4577,7 @@
                 <a14:useLocalDpi xmlns:a14="http://schemas.microsoft.com/office/drawing/2010/main" val="0"/>
               </a:ext>
               <a:ext uri="{96DAC541-7B7A-43D3-8B79-37D633B846F1}">
-                <asvg:svgBlip xmlns:asvg="http://schemas.microsoft.com/office/drawing/2016/SVG/main" xmlns="" r:embed="rId3"/>
+                <asvg:svgBlip xmlns:asvg="http://schemas.microsoft.com/office/drawing/2016/SVG/main" r:embed="rId3"/>
               </a:ext>
             </a:extLst>
           </a:blip>
@@ -4798,7 +4802,7 @@
                 <a14:useLocalDpi xmlns:a14="http://schemas.microsoft.com/office/drawing/2010/main" val="0"/>
               </a:ext>
               <a:ext uri="{96DAC541-7B7A-43D3-8B79-37D633B846F1}">
-                <asvg:svgBlip xmlns:asvg="http://schemas.microsoft.com/office/drawing/2016/SVG/main" xmlns="" r:embed="rId3"/>
+                <asvg:svgBlip xmlns:asvg="http://schemas.microsoft.com/office/drawing/2016/SVG/main" r:embed="rId3"/>
               </a:ext>
             </a:extLst>
           </a:blip>
@@ -5198,7 +5202,7 @@
                 <a14:useLocalDpi xmlns:a14="http://schemas.microsoft.com/office/drawing/2010/main" val="0"/>
               </a:ext>
               <a:ext uri="{96DAC541-7B7A-43D3-8B79-37D633B846F1}">
-                <asvg:svgBlip xmlns:asvg="http://schemas.microsoft.com/office/drawing/2016/SVG/main" xmlns="" r:embed="rId3"/>
+                <asvg:svgBlip xmlns:asvg="http://schemas.microsoft.com/office/drawing/2016/SVG/main" r:embed="rId3"/>
               </a:ext>
             </a:extLst>
           </a:blip>
@@ -5466,7 +5470,7 @@
                 <a14:useLocalDpi xmlns:a14="http://schemas.microsoft.com/office/drawing/2010/main" val="0"/>
               </a:ext>
               <a:ext uri="{96DAC541-7B7A-43D3-8B79-37D633B846F1}">
-                <asvg:svgBlip xmlns:asvg="http://schemas.microsoft.com/office/drawing/2016/SVG/main" xmlns="" r:embed="rId3"/>
+                <asvg:svgBlip xmlns:asvg="http://schemas.microsoft.com/office/drawing/2016/SVG/main" r:embed="rId3"/>
               </a:ext>
             </a:extLst>
           </a:blip>
@@ -5904,7 +5908,7 @@
                 <a14:useLocalDpi xmlns:a14="http://schemas.microsoft.com/office/drawing/2010/main" val="0"/>
               </a:ext>
               <a:ext uri="{96DAC541-7B7A-43D3-8B79-37D633B846F1}">
-                <asvg:svgBlip xmlns:asvg="http://schemas.microsoft.com/office/drawing/2016/SVG/main" xmlns="" r:embed="rId3"/>
+                <asvg:svgBlip xmlns:asvg="http://schemas.microsoft.com/office/drawing/2016/SVG/main" r:embed="rId3"/>
               </a:ext>
             </a:extLst>
           </a:blip>
@@ -6315,7 +6319,7 @@
                 <a14:useLocalDpi xmlns:a14="http://schemas.microsoft.com/office/drawing/2010/main" val="0"/>
               </a:ext>
               <a:ext uri="{96DAC541-7B7A-43D3-8B79-37D633B846F1}">
-                <asvg:svgBlip xmlns:asvg="http://schemas.microsoft.com/office/drawing/2016/SVG/main" xmlns="" r:embed="rId3"/>
+                <asvg:svgBlip xmlns:asvg="http://schemas.microsoft.com/office/drawing/2016/SVG/main" r:embed="rId3"/>
               </a:ext>
             </a:extLst>
           </a:blip>
@@ -6684,7 +6688,7 @@
                 <a14:useLocalDpi xmlns:a14="http://schemas.microsoft.com/office/drawing/2010/main" val="0"/>
               </a:ext>
               <a:ext uri="{96DAC541-7B7A-43D3-8B79-37D633B846F1}">
-                <asvg:svgBlip xmlns:asvg="http://schemas.microsoft.com/office/drawing/2016/SVG/main" xmlns="" r:embed="rId4"/>
+                <asvg:svgBlip xmlns:asvg="http://schemas.microsoft.com/office/drawing/2016/SVG/main" r:embed="rId4"/>
               </a:ext>
             </a:extLst>
           </a:blip>
@@ -6805,7 +6809,7 @@
                 <a14:useLocalDpi xmlns:a14="http://schemas.microsoft.com/office/drawing/2010/main" val="0"/>
               </a:ext>
               <a:ext uri="{96DAC541-7B7A-43D3-8B79-37D633B846F1}">
-                <asvg:svgBlip xmlns:asvg="http://schemas.microsoft.com/office/drawing/2016/SVG/main" xmlns="" r:embed="rId3"/>
+                <asvg:svgBlip xmlns:asvg="http://schemas.microsoft.com/office/drawing/2016/SVG/main" r:embed="rId3"/>
               </a:ext>
             </a:extLst>
           </a:blip>
@@ -7030,7 +7034,7 @@
                 <a14:useLocalDpi xmlns:a14="http://schemas.microsoft.com/office/drawing/2010/main" val="0"/>
               </a:ext>
               <a:ext uri="{96DAC541-7B7A-43D3-8B79-37D633B846F1}">
-                <asvg:svgBlip xmlns:asvg="http://schemas.microsoft.com/office/drawing/2016/SVG/main" xmlns="" r:embed="rId3"/>
+                <asvg:svgBlip xmlns:asvg="http://schemas.microsoft.com/office/drawing/2016/SVG/main" r:embed="rId3"/>
               </a:ext>
             </a:extLst>
           </a:blip>
@@ -7430,7 +7434,7 @@
                 <a14:useLocalDpi xmlns:a14="http://schemas.microsoft.com/office/drawing/2010/main" val="0"/>
               </a:ext>
               <a:ext uri="{96DAC541-7B7A-43D3-8B79-37D633B846F1}">
-                <asvg:svgBlip xmlns:asvg="http://schemas.microsoft.com/office/drawing/2016/SVG/main" xmlns="" r:embed="rId3"/>
+                <asvg:svgBlip xmlns:asvg="http://schemas.microsoft.com/office/drawing/2016/SVG/main" r:embed="rId3"/>
               </a:ext>
             </a:extLst>
           </a:blip>
@@ -7707,7 +7711,7 @@
                 <a14:useLocalDpi xmlns:a14="http://schemas.microsoft.com/office/drawing/2010/main" val="0"/>
               </a:ext>
               <a:ext uri="{96DAC541-7B7A-43D3-8B79-37D633B846F1}">
-                <asvg:svgBlip xmlns:asvg="http://schemas.microsoft.com/office/drawing/2016/SVG/main" xmlns="" r:embed="rId3"/>
+                <asvg:svgBlip xmlns:asvg="http://schemas.microsoft.com/office/drawing/2016/SVG/main" r:embed="rId3"/>
               </a:ext>
             </a:extLst>
           </a:blip>
@@ -7834,7 +7838,7 @@
                 <a14:useLocalDpi xmlns:a14="http://schemas.microsoft.com/office/drawing/2010/main" val="0"/>
               </a:ext>
               <a:ext uri="{96DAC541-7B7A-43D3-8B79-37D633B846F1}">
-                <asvg:svgBlip xmlns:asvg="http://schemas.microsoft.com/office/drawing/2016/SVG/main" xmlns="" r:embed="rId3"/>
+                <asvg:svgBlip xmlns:asvg="http://schemas.microsoft.com/office/drawing/2016/SVG/main" r:embed="rId3"/>
               </a:ext>
             </a:extLst>
           </a:blip>
@@ -7961,7 +7965,7 @@
                 <a14:useLocalDpi xmlns:a14="http://schemas.microsoft.com/office/drawing/2010/main" val="0"/>
               </a:ext>
               <a:ext uri="{96DAC541-7B7A-43D3-8B79-37D633B846F1}">
-                <asvg:svgBlip xmlns:asvg="http://schemas.microsoft.com/office/drawing/2016/SVG/main" xmlns="" r:embed="rId3"/>
+                <asvg:svgBlip xmlns:asvg="http://schemas.microsoft.com/office/drawing/2016/SVG/main" r:embed="rId3"/>
               </a:ext>
             </a:extLst>
           </a:blip>
@@ -8088,7 +8092,7 @@
                 <a14:useLocalDpi xmlns:a14="http://schemas.microsoft.com/office/drawing/2010/main" val="0"/>
               </a:ext>
               <a:ext uri="{96DAC541-7B7A-43D3-8B79-37D633B846F1}">
-                <asvg:svgBlip xmlns:asvg="http://schemas.microsoft.com/office/drawing/2016/SVG/main" xmlns="" r:embed="rId3"/>
+                <asvg:svgBlip xmlns:asvg="http://schemas.microsoft.com/office/drawing/2016/SVG/main" r:embed="rId3"/>
               </a:ext>
             </a:extLst>
           </a:blip>
@@ -8215,7 +8219,7 @@
                 <a14:useLocalDpi xmlns:a14="http://schemas.microsoft.com/office/drawing/2010/main" val="0"/>
               </a:ext>
               <a:ext uri="{96DAC541-7B7A-43D3-8B79-37D633B846F1}">
-                <asvg:svgBlip xmlns:asvg="http://schemas.microsoft.com/office/drawing/2016/SVG/main" xmlns="" r:embed="rId3"/>
+                <asvg:svgBlip xmlns:asvg="http://schemas.microsoft.com/office/drawing/2016/SVG/main" r:embed="rId3"/>
               </a:ext>
             </a:extLst>
           </a:blip>
@@ -8342,7 +8346,7 @@
                 <a14:useLocalDpi xmlns:a14="http://schemas.microsoft.com/office/drawing/2010/main" val="0"/>
               </a:ext>
               <a:ext uri="{96DAC541-7B7A-43D3-8B79-37D633B846F1}">
-                <asvg:svgBlip xmlns:asvg="http://schemas.microsoft.com/office/drawing/2016/SVG/main" xmlns="" r:embed="rId3"/>
+                <asvg:svgBlip xmlns:asvg="http://schemas.microsoft.com/office/drawing/2016/SVG/main" r:embed="rId3"/>
               </a:ext>
             </a:extLst>
           </a:blip>
@@ -8469,7 +8473,7 @@
                 <a14:useLocalDpi xmlns:a14="http://schemas.microsoft.com/office/drawing/2010/main" val="0"/>
               </a:ext>
               <a:ext uri="{96DAC541-7B7A-43D3-8B79-37D633B846F1}">
-                <asvg:svgBlip xmlns:asvg="http://schemas.microsoft.com/office/drawing/2016/SVG/main" xmlns="" r:embed="rId3"/>
+                <asvg:svgBlip xmlns:asvg="http://schemas.microsoft.com/office/drawing/2016/SVG/main" r:embed="rId3"/>
               </a:ext>
             </a:extLst>
           </a:blip>
@@ -8623,7 +8627,7 @@
                 <a14:useLocalDpi xmlns:a14="http://schemas.microsoft.com/office/drawing/2010/main" val="0"/>
               </a:ext>
               <a:ext uri="{96DAC541-7B7A-43D3-8B79-37D633B846F1}">
-                <asvg:svgBlip xmlns:asvg="http://schemas.microsoft.com/office/drawing/2016/SVG/main" xmlns="" r:embed="rId4"/>
+                <asvg:svgBlip xmlns:asvg="http://schemas.microsoft.com/office/drawing/2016/SVG/main" r:embed="rId4"/>
               </a:ext>
             </a:extLst>
           </a:blip>
@@ -8750,7 +8754,7 @@
                 <a14:useLocalDpi xmlns:a14="http://schemas.microsoft.com/office/drawing/2010/main" val="0"/>
               </a:ext>
               <a:ext uri="{96DAC541-7B7A-43D3-8B79-37D633B846F1}">
-                <asvg:svgBlip xmlns:asvg="http://schemas.microsoft.com/office/drawing/2016/SVG/main" xmlns="" r:embed="rId3"/>
+                <asvg:svgBlip xmlns:asvg="http://schemas.microsoft.com/office/drawing/2016/SVG/main" r:embed="rId3"/>
               </a:ext>
             </a:extLst>
           </a:blip>
@@ -8877,7 +8881,7 @@
                 <a14:useLocalDpi xmlns:a14="http://schemas.microsoft.com/office/drawing/2010/main" val="0"/>
               </a:ext>
               <a:ext uri="{96DAC541-7B7A-43D3-8B79-37D633B846F1}">
-                <asvg:svgBlip xmlns:asvg="http://schemas.microsoft.com/office/drawing/2016/SVG/main" xmlns="" r:embed="rId3"/>
+                <asvg:svgBlip xmlns:asvg="http://schemas.microsoft.com/office/drawing/2016/SVG/main" r:embed="rId3"/>
               </a:ext>
             </a:extLst>
           </a:blip>
@@ -9004,7 +9008,7 @@
                 <a14:useLocalDpi xmlns:a14="http://schemas.microsoft.com/office/drawing/2010/main" val="0"/>
               </a:ext>
               <a:ext uri="{96DAC541-7B7A-43D3-8B79-37D633B846F1}">
-                <asvg:svgBlip xmlns:asvg="http://schemas.microsoft.com/office/drawing/2016/SVG/main" xmlns="" r:embed="rId3"/>
+                <asvg:svgBlip xmlns:asvg="http://schemas.microsoft.com/office/drawing/2016/SVG/main" r:embed="rId3"/>
               </a:ext>
             </a:extLst>
           </a:blip>
@@ -9131,7 +9135,7 @@
                 <a14:useLocalDpi xmlns:a14="http://schemas.microsoft.com/office/drawing/2010/main" val="0"/>
               </a:ext>
               <a:ext uri="{96DAC541-7B7A-43D3-8B79-37D633B846F1}">
-                <asvg:svgBlip xmlns:asvg="http://schemas.microsoft.com/office/drawing/2016/SVG/main" xmlns="" r:embed="rId4"/>
+                <asvg:svgBlip xmlns:asvg="http://schemas.microsoft.com/office/drawing/2016/SVG/main" r:embed="rId3"/>
               </a:ext>
             </a:extLst>
           </a:blip>
@@ -9258,7 +9262,7 @@
                 <a14:useLocalDpi xmlns:a14="http://schemas.microsoft.com/office/drawing/2010/main" val="0"/>
               </a:ext>
               <a:ext uri="{96DAC541-7B7A-43D3-8B79-37D633B846F1}">
-                <asvg:svgBlip xmlns:asvg="http://schemas.microsoft.com/office/drawing/2016/SVG/main" xmlns="" r:embed="rId4"/>
+                <asvg:svgBlip xmlns:asvg="http://schemas.microsoft.com/office/drawing/2016/SVG/main" r:embed="rId3"/>
               </a:ext>
             </a:extLst>
           </a:blip>
@@ -9280,6 +9284,634 @@
     <p:extLst>
       <p:ext uri="{BB962C8B-B14F-4D97-AF65-F5344CB8AC3E}">
         <p14:creationId xmlns:p14="http://schemas.microsoft.com/office/powerpoint/2010/main" val="231048391"/>
+      </p:ext>
+    </p:extLst>
+  </p:cSld>
+  <p:clrMapOvr>
+    <a:masterClrMapping/>
+  </p:clrMapOvr>
+</p:sld>
+</file>
+
+<file path=ppt/slides/slide35.xml><?xml version="1.0" encoding="utf-8"?>
+<p:sld xmlns:a="http://schemas.openxmlformats.org/drawingml/2006/main" xmlns:r="http://schemas.openxmlformats.org/officeDocument/2006/relationships" xmlns:p="http://schemas.openxmlformats.org/presentationml/2006/main">
+  <p:cSld>
+    <p:spTree>
+      <p:nvGrpSpPr>
+        <p:cNvPr id="1" name=""/>
+        <p:cNvGrpSpPr/>
+        <p:nvPr/>
+      </p:nvGrpSpPr>
+      <p:grpSpPr>
+        <a:xfrm>
+          <a:off x="0" y="0"/>
+          <a:ext cx="0" cy="0"/>
+          <a:chOff x="0" y="0"/>
+          <a:chExt cx="0" cy="0"/>
+        </a:xfrm>
+      </p:grpSpPr>
+      <p:sp>
+        <p:nvSpPr>
+          <p:cNvPr id="4" name="Retângulo 3">
+            <a:extLst>
+              <a:ext uri="{FF2B5EF4-FFF2-40B4-BE49-F238E27FC236}">
+                <a16:creationId xmlns:a16="http://schemas.microsoft.com/office/drawing/2014/main" id="{73521BF0-0376-2073-7FDD-6DD8B0C9B5B6}"/>
+              </a:ext>
+            </a:extLst>
+          </p:cNvPr>
+          <p:cNvSpPr/>
+          <p:nvPr/>
+        </p:nvSpPr>
+        <p:spPr>
+          <a:xfrm>
+            <a:off x="0" y="1"/>
+            <a:ext cx="7199313" cy="7199312"/>
+          </a:xfrm>
+          <a:prstGeom prst="rect">
+            <a:avLst/>
+          </a:prstGeom>
+          <a:solidFill>
+            <a:srgbClr val="0095BA"/>
+          </a:solidFill>
+        </p:spPr>
+        <p:style>
+          <a:lnRef idx="2">
+            <a:schemeClr val="accent1">
+              <a:shade val="50000"/>
+            </a:schemeClr>
+          </a:lnRef>
+          <a:fillRef idx="1">
+            <a:schemeClr val="accent1"/>
+          </a:fillRef>
+          <a:effectRef idx="0">
+            <a:schemeClr val="accent1"/>
+          </a:effectRef>
+          <a:fontRef idx="minor">
+            <a:schemeClr val="lt1"/>
+          </a:fontRef>
+        </p:style>
+        <p:txBody>
+          <a:bodyPr rtlCol="0" anchor="ctr"/>
+          <a:lstStyle/>
+          <a:p>
+            <a:pPr algn="ctr"/>
+            <a:endParaRPr lang="pt-BR" dirty="0"/>
+          </a:p>
+        </p:txBody>
+      </p:sp>
+      <p:pic>
+        <p:nvPicPr>
+          <p:cNvPr id="5" name="Gráfico 4" descr="Ferramentas com preenchimento sólido">
+            <a:extLst>
+              <a:ext uri="{FF2B5EF4-FFF2-40B4-BE49-F238E27FC236}">
+                <a16:creationId xmlns:a16="http://schemas.microsoft.com/office/drawing/2014/main" id="{DC5FD06C-EB37-D1F6-6078-CA9922C7A68A}"/>
+              </a:ext>
+            </a:extLst>
+          </p:cNvPr>
+          <p:cNvPicPr>
+            <a:picLocks noChangeAspect="1"/>
+          </p:cNvPicPr>
+          <p:nvPr/>
+        </p:nvPicPr>
+        <p:blipFill>
+          <a:blip r:embed="rId2">
+            <a:extLst>
+              <a:ext uri="{28A0092B-C50C-407E-A947-70E740481C1C}">
+                <a14:useLocalDpi xmlns:a14="http://schemas.microsoft.com/office/drawing/2010/main" val="0"/>
+              </a:ext>
+              <a:ext uri="{96DAC541-7B7A-43D3-8B79-37D633B846F1}">
+                <asvg:svgBlip xmlns:asvg="http://schemas.microsoft.com/office/drawing/2016/SVG/main" r:embed="rId3"/>
+              </a:ext>
+            </a:extLst>
+          </a:blip>
+          <a:stretch>
+            <a:fillRect/>
+          </a:stretch>
+        </p:blipFill>
+        <p:spPr>
+          <a:xfrm>
+            <a:off x="440819" y="329981"/>
+            <a:ext cx="4878000" cy="4878000"/>
+          </a:xfrm>
+          <a:prstGeom prst="rect">
+            <a:avLst/>
+          </a:prstGeom>
+        </p:spPr>
+      </p:pic>
+      <p:pic>
+        <p:nvPicPr>
+          <p:cNvPr id="6" name="Gráfico 5" descr="Adicionar com preenchimento sólido">
+            <a:extLst>
+              <a:ext uri="{FF2B5EF4-FFF2-40B4-BE49-F238E27FC236}">
+                <a16:creationId xmlns:a16="http://schemas.microsoft.com/office/drawing/2014/main" id="{2AE6A2C2-7CE4-3AD9-889B-76656BE5E377}"/>
+              </a:ext>
+            </a:extLst>
+          </p:cNvPr>
+          <p:cNvPicPr>
+            <a:picLocks noChangeAspect="1"/>
+          </p:cNvPicPr>
+          <p:nvPr/>
+        </p:nvPicPr>
+        <p:blipFill>
+          <a:blip r:embed="rId4">
+            <a:extLst>
+              <a:ext uri="{28A0092B-C50C-407E-A947-70E740481C1C}">
+                <a14:useLocalDpi xmlns:a14="http://schemas.microsoft.com/office/drawing/2010/main" val="0"/>
+              </a:ext>
+              <a:ext uri="{96DAC541-7B7A-43D3-8B79-37D633B846F1}">
+                <asvg:svgBlip xmlns:asvg="http://schemas.microsoft.com/office/drawing/2016/SVG/main" r:embed="rId5"/>
+              </a:ext>
+            </a:extLst>
+          </a:blip>
+          <a:stretch>
+            <a:fillRect/>
+          </a:stretch>
+        </p:blipFill>
+        <p:spPr>
+          <a:xfrm>
+            <a:off x="4977535" y="4977534"/>
+            <a:ext cx="2221778" cy="2221778"/>
+          </a:xfrm>
+          <a:prstGeom prst="rect">
+            <a:avLst/>
+          </a:prstGeom>
+        </p:spPr>
+      </p:pic>
+    </p:spTree>
+    <p:extLst>
+      <p:ext uri="{BB962C8B-B14F-4D97-AF65-F5344CB8AC3E}">
+        <p14:creationId xmlns:p14="http://schemas.microsoft.com/office/powerpoint/2010/main" val="2383279579"/>
+      </p:ext>
+    </p:extLst>
+  </p:cSld>
+  <p:clrMapOvr>
+    <a:masterClrMapping/>
+  </p:clrMapOvr>
+</p:sld>
+</file>
+
+<file path=ppt/slides/slide36.xml><?xml version="1.0" encoding="utf-8"?>
+<p:sld xmlns:a="http://schemas.openxmlformats.org/drawingml/2006/main" xmlns:r="http://schemas.openxmlformats.org/officeDocument/2006/relationships" xmlns:p="http://schemas.openxmlformats.org/presentationml/2006/main">
+  <p:cSld>
+    <p:spTree>
+      <p:nvGrpSpPr>
+        <p:cNvPr id="1" name=""/>
+        <p:cNvGrpSpPr/>
+        <p:nvPr/>
+      </p:nvGrpSpPr>
+      <p:grpSpPr>
+        <a:xfrm>
+          <a:off x="0" y="0"/>
+          <a:ext cx="0" cy="0"/>
+          <a:chOff x="0" y="0"/>
+          <a:chExt cx="0" cy="0"/>
+        </a:xfrm>
+      </p:grpSpPr>
+      <p:sp>
+        <p:nvSpPr>
+          <p:cNvPr id="4" name="Retângulo 3">
+            <a:extLst>
+              <a:ext uri="{FF2B5EF4-FFF2-40B4-BE49-F238E27FC236}">
+                <a16:creationId xmlns:a16="http://schemas.microsoft.com/office/drawing/2014/main" id="{73521BF0-0376-2073-7FDD-6DD8B0C9B5B6}"/>
+              </a:ext>
+            </a:extLst>
+          </p:cNvPr>
+          <p:cNvSpPr/>
+          <p:nvPr/>
+        </p:nvSpPr>
+        <p:spPr>
+          <a:xfrm>
+            <a:off x="0" y="1"/>
+            <a:ext cx="7199313" cy="7199312"/>
+          </a:xfrm>
+          <a:prstGeom prst="rect">
+            <a:avLst/>
+          </a:prstGeom>
+          <a:solidFill>
+            <a:srgbClr val="0095BA"/>
+          </a:solidFill>
+        </p:spPr>
+        <p:style>
+          <a:lnRef idx="2">
+            <a:schemeClr val="accent1">
+              <a:shade val="50000"/>
+            </a:schemeClr>
+          </a:lnRef>
+          <a:fillRef idx="1">
+            <a:schemeClr val="accent1"/>
+          </a:fillRef>
+          <a:effectRef idx="0">
+            <a:schemeClr val="accent1"/>
+          </a:effectRef>
+          <a:fontRef idx="minor">
+            <a:schemeClr val="lt1"/>
+          </a:fontRef>
+        </p:style>
+        <p:txBody>
+          <a:bodyPr rtlCol="0" anchor="ctr"/>
+          <a:lstStyle/>
+          <a:p>
+            <a:pPr algn="ctr"/>
+            <a:endParaRPr lang="pt-BR" dirty="0"/>
+          </a:p>
+        </p:txBody>
+      </p:sp>
+      <p:pic>
+        <p:nvPicPr>
+          <p:cNvPr id="5" name="Gráfico 4" descr="Ferramentas com preenchimento sólido">
+            <a:extLst>
+              <a:ext uri="{FF2B5EF4-FFF2-40B4-BE49-F238E27FC236}">
+                <a16:creationId xmlns:a16="http://schemas.microsoft.com/office/drawing/2014/main" id="{DC5FD06C-EB37-D1F6-6078-CA9922C7A68A}"/>
+              </a:ext>
+            </a:extLst>
+          </p:cNvPr>
+          <p:cNvPicPr>
+            <a:picLocks noChangeAspect="1"/>
+          </p:cNvPicPr>
+          <p:nvPr/>
+        </p:nvPicPr>
+        <p:blipFill>
+          <a:blip r:embed="rId2">
+            <a:extLst>
+              <a:ext uri="{28A0092B-C50C-407E-A947-70E740481C1C}">
+                <a14:useLocalDpi xmlns:a14="http://schemas.microsoft.com/office/drawing/2010/main" val="0"/>
+              </a:ext>
+              <a:ext uri="{96DAC541-7B7A-43D3-8B79-37D633B846F1}">
+                <asvg:svgBlip xmlns:asvg="http://schemas.microsoft.com/office/drawing/2016/SVG/main" r:embed="rId3"/>
+              </a:ext>
+            </a:extLst>
+          </a:blip>
+          <a:stretch>
+            <a:fillRect/>
+          </a:stretch>
+        </p:blipFill>
+        <p:spPr>
+          <a:xfrm>
+            <a:off x="440819" y="329981"/>
+            <a:ext cx="4878000" cy="4878000"/>
+          </a:xfrm>
+          <a:prstGeom prst="rect">
+            <a:avLst/>
+          </a:prstGeom>
+        </p:spPr>
+      </p:pic>
+      <p:pic>
+        <p:nvPicPr>
+          <p:cNvPr id="6" name="Gráfico 5" descr="Adicionar com preenchimento sólido">
+            <a:extLst>
+              <a:ext uri="{FF2B5EF4-FFF2-40B4-BE49-F238E27FC236}">
+                <a16:creationId xmlns:a16="http://schemas.microsoft.com/office/drawing/2014/main" id="{2AE6A2C2-7CE4-3AD9-889B-76656BE5E377}"/>
+              </a:ext>
+            </a:extLst>
+          </p:cNvPr>
+          <p:cNvPicPr>
+            <a:picLocks noChangeAspect="1"/>
+          </p:cNvPicPr>
+          <p:nvPr/>
+        </p:nvPicPr>
+        <p:blipFill>
+          <a:blip r:embed="rId4">
+            <a:extLst>
+              <a:ext uri="{28A0092B-C50C-407E-A947-70E740481C1C}">
+                <a14:useLocalDpi xmlns:a14="http://schemas.microsoft.com/office/drawing/2010/main" val="0"/>
+              </a:ext>
+              <a:ext uri="{96DAC541-7B7A-43D3-8B79-37D633B846F1}">
+                <asvg:svgBlip xmlns:asvg="http://schemas.microsoft.com/office/drawing/2016/SVG/main" r:embed="rId5"/>
+              </a:ext>
+            </a:extLst>
+          </a:blip>
+          <a:stretch>
+            <a:fillRect/>
+          </a:stretch>
+        </p:blipFill>
+        <p:spPr>
+          <a:xfrm>
+            <a:off x="4977535" y="4977534"/>
+            <a:ext cx="2221778" cy="2221778"/>
+          </a:xfrm>
+          <a:prstGeom prst="rect">
+            <a:avLst/>
+          </a:prstGeom>
+        </p:spPr>
+      </p:pic>
+    </p:spTree>
+    <p:extLst>
+      <p:ext uri="{BB962C8B-B14F-4D97-AF65-F5344CB8AC3E}">
+        <p14:creationId xmlns:p14="http://schemas.microsoft.com/office/powerpoint/2010/main" val="791459719"/>
+      </p:ext>
+    </p:extLst>
+  </p:cSld>
+  <p:clrMapOvr>
+    <a:masterClrMapping/>
+  </p:clrMapOvr>
+</p:sld>
+</file>
+
+<file path=ppt/slides/slide37.xml><?xml version="1.0" encoding="utf-8"?>
+<p:sld xmlns:a="http://schemas.openxmlformats.org/drawingml/2006/main" xmlns:r="http://schemas.openxmlformats.org/officeDocument/2006/relationships" xmlns:p="http://schemas.openxmlformats.org/presentationml/2006/main">
+  <p:cSld>
+    <p:spTree>
+      <p:nvGrpSpPr>
+        <p:cNvPr id="1" name=""/>
+        <p:cNvGrpSpPr/>
+        <p:nvPr/>
+      </p:nvGrpSpPr>
+      <p:grpSpPr>
+        <a:xfrm>
+          <a:off x="0" y="0"/>
+          <a:ext cx="0" cy="0"/>
+          <a:chOff x="0" y="0"/>
+          <a:chExt cx="0" cy="0"/>
+        </a:xfrm>
+      </p:grpSpPr>
+      <p:sp>
+        <p:nvSpPr>
+          <p:cNvPr id="4" name="Retângulo 3">
+            <a:extLst>
+              <a:ext uri="{FF2B5EF4-FFF2-40B4-BE49-F238E27FC236}">
+                <a16:creationId xmlns:a16="http://schemas.microsoft.com/office/drawing/2014/main" id="{73521BF0-0376-2073-7FDD-6DD8B0C9B5B6}"/>
+              </a:ext>
+            </a:extLst>
+          </p:cNvPr>
+          <p:cNvSpPr/>
+          <p:nvPr/>
+        </p:nvSpPr>
+        <p:spPr>
+          <a:xfrm>
+            <a:off x="0" y="1"/>
+            <a:ext cx="7199313" cy="7199312"/>
+          </a:xfrm>
+          <a:prstGeom prst="rect">
+            <a:avLst/>
+          </a:prstGeom>
+          <a:solidFill>
+            <a:srgbClr val="0095BA"/>
+          </a:solidFill>
+        </p:spPr>
+        <p:style>
+          <a:lnRef idx="2">
+            <a:schemeClr val="accent1">
+              <a:shade val="50000"/>
+            </a:schemeClr>
+          </a:lnRef>
+          <a:fillRef idx="1">
+            <a:schemeClr val="accent1"/>
+          </a:fillRef>
+          <a:effectRef idx="0">
+            <a:schemeClr val="accent1"/>
+          </a:effectRef>
+          <a:fontRef idx="minor">
+            <a:schemeClr val="lt1"/>
+          </a:fontRef>
+        </p:style>
+        <p:txBody>
+          <a:bodyPr rtlCol="0" anchor="ctr"/>
+          <a:lstStyle/>
+          <a:p>
+            <a:pPr algn="ctr"/>
+            <a:endParaRPr lang="pt-BR" dirty="0"/>
+          </a:p>
+        </p:txBody>
+      </p:sp>
+      <p:pic>
+        <p:nvPicPr>
+          <p:cNvPr id="5" name="Gráfico 4" descr="Ferramentas com preenchimento sólido">
+            <a:extLst>
+              <a:ext uri="{FF2B5EF4-FFF2-40B4-BE49-F238E27FC236}">
+                <a16:creationId xmlns:a16="http://schemas.microsoft.com/office/drawing/2014/main" id="{DC5FD06C-EB37-D1F6-6078-CA9922C7A68A}"/>
+              </a:ext>
+            </a:extLst>
+          </p:cNvPr>
+          <p:cNvPicPr>
+            <a:picLocks noChangeAspect="1"/>
+          </p:cNvPicPr>
+          <p:nvPr/>
+        </p:nvPicPr>
+        <p:blipFill>
+          <a:blip r:embed="rId2">
+            <a:extLst>
+              <a:ext uri="{28A0092B-C50C-407E-A947-70E740481C1C}">
+                <a14:useLocalDpi xmlns:a14="http://schemas.microsoft.com/office/drawing/2010/main" val="0"/>
+              </a:ext>
+              <a:ext uri="{96DAC541-7B7A-43D3-8B79-37D633B846F1}">
+                <asvg:svgBlip xmlns:asvg="http://schemas.microsoft.com/office/drawing/2016/SVG/main" r:embed="rId3"/>
+              </a:ext>
+            </a:extLst>
+          </a:blip>
+          <a:stretch>
+            <a:fillRect/>
+          </a:stretch>
+        </p:blipFill>
+        <p:spPr>
+          <a:xfrm>
+            <a:off x="440819" y="329981"/>
+            <a:ext cx="4878000" cy="4878000"/>
+          </a:xfrm>
+          <a:prstGeom prst="rect">
+            <a:avLst/>
+          </a:prstGeom>
+        </p:spPr>
+      </p:pic>
+      <p:pic>
+        <p:nvPicPr>
+          <p:cNvPr id="2" name="Gráfico 1" descr="Lupa com preenchimento sólido">
+            <a:extLst>
+              <a:ext uri="{FF2B5EF4-FFF2-40B4-BE49-F238E27FC236}">
+                <a16:creationId xmlns:a16="http://schemas.microsoft.com/office/drawing/2014/main" id="{BA687954-49E2-91C6-2C6D-FB090C847FF9}"/>
+              </a:ext>
+            </a:extLst>
+          </p:cNvPr>
+          <p:cNvPicPr>
+            <a:picLocks noChangeAspect="1"/>
+          </p:cNvPicPr>
+          <p:nvPr/>
+        </p:nvPicPr>
+        <p:blipFill>
+          <a:blip r:embed="rId4">
+            <a:extLst>
+              <a:ext uri="{28A0092B-C50C-407E-A947-70E740481C1C}">
+                <a14:useLocalDpi xmlns:a14="http://schemas.microsoft.com/office/drawing/2010/main" val="0"/>
+              </a:ext>
+              <a:ext uri="{96DAC541-7B7A-43D3-8B79-37D633B846F1}">
+                <asvg:svgBlip xmlns:asvg="http://schemas.microsoft.com/office/drawing/2016/SVG/main" r:embed="rId5"/>
+              </a:ext>
+            </a:extLst>
+          </a:blip>
+          <a:stretch>
+            <a:fillRect/>
+          </a:stretch>
+        </p:blipFill>
+        <p:spPr>
+          <a:xfrm>
+            <a:off x="4978113" y="4978113"/>
+            <a:ext cx="2221200" cy="2221200"/>
+          </a:xfrm>
+          <a:prstGeom prst="rect">
+            <a:avLst/>
+          </a:prstGeom>
+        </p:spPr>
+      </p:pic>
+    </p:spTree>
+    <p:extLst>
+      <p:ext uri="{BB962C8B-B14F-4D97-AF65-F5344CB8AC3E}">
+        <p14:creationId xmlns:p14="http://schemas.microsoft.com/office/powerpoint/2010/main" val="200000520"/>
+      </p:ext>
+    </p:extLst>
+  </p:cSld>
+  <p:clrMapOvr>
+    <a:masterClrMapping/>
+  </p:clrMapOvr>
+</p:sld>
+</file>
+
+<file path=ppt/slides/slide38.xml><?xml version="1.0" encoding="utf-8"?>
+<p:sld xmlns:a="http://schemas.openxmlformats.org/drawingml/2006/main" xmlns:r="http://schemas.openxmlformats.org/officeDocument/2006/relationships" xmlns:p="http://schemas.openxmlformats.org/presentationml/2006/main">
+  <p:cSld>
+    <p:spTree>
+      <p:nvGrpSpPr>
+        <p:cNvPr id="1" name=""/>
+        <p:cNvGrpSpPr/>
+        <p:nvPr/>
+      </p:nvGrpSpPr>
+      <p:grpSpPr>
+        <a:xfrm>
+          <a:off x="0" y="0"/>
+          <a:ext cx="0" cy="0"/>
+          <a:chOff x="0" y="0"/>
+          <a:chExt cx="0" cy="0"/>
+        </a:xfrm>
+      </p:grpSpPr>
+      <p:sp>
+        <p:nvSpPr>
+          <p:cNvPr id="4" name="Retângulo 3">
+            <a:extLst>
+              <a:ext uri="{FF2B5EF4-FFF2-40B4-BE49-F238E27FC236}">
+                <a16:creationId xmlns:a16="http://schemas.microsoft.com/office/drawing/2014/main" id="{73521BF0-0376-2073-7FDD-6DD8B0C9B5B6}"/>
+              </a:ext>
+            </a:extLst>
+          </p:cNvPr>
+          <p:cNvSpPr/>
+          <p:nvPr/>
+        </p:nvSpPr>
+        <p:spPr>
+          <a:xfrm>
+            <a:off x="0" y="1"/>
+            <a:ext cx="7199313" cy="7199312"/>
+          </a:xfrm>
+          <a:prstGeom prst="rect">
+            <a:avLst/>
+          </a:prstGeom>
+          <a:solidFill>
+            <a:srgbClr val="0095BA"/>
+          </a:solidFill>
+        </p:spPr>
+        <p:style>
+          <a:lnRef idx="2">
+            <a:schemeClr val="accent1">
+              <a:shade val="50000"/>
+            </a:schemeClr>
+          </a:lnRef>
+          <a:fillRef idx="1">
+            <a:schemeClr val="accent1"/>
+          </a:fillRef>
+          <a:effectRef idx="0">
+            <a:schemeClr val="accent1"/>
+          </a:effectRef>
+          <a:fontRef idx="minor">
+            <a:schemeClr val="lt1"/>
+          </a:fontRef>
+        </p:style>
+        <p:txBody>
+          <a:bodyPr rtlCol="0" anchor="ctr"/>
+          <a:lstStyle/>
+          <a:p>
+            <a:pPr algn="ctr"/>
+            <a:endParaRPr lang="pt-BR" dirty="0"/>
+          </a:p>
+        </p:txBody>
+      </p:sp>
+      <p:pic>
+        <p:nvPicPr>
+          <p:cNvPr id="5" name="Gráfico 4" descr="Ferramentas com preenchimento sólido">
+            <a:extLst>
+              <a:ext uri="{FF2B5EF4-FFF2-40B4-BE49-F238E27FC236}">
+                <a16:creationId xmlns:a16="http://schemas.microsoft.com/office/drawing/2014/main" id="{DC5FD06C-EB37-D1F6-6078-CA9922C7A68A}"/>
+              </a:ext>
+            </a:extLst>
+          </p:cNvPr>
+          <p:cNvPicPr>
+            <a:picLocks noChangeAspect="1"/>
+          </p:cNvPicPr>
+          <p:nvPr/>
+        </p:nvPicPr>
+        <p:blipFill>
+          <a:blip r:embed="rId2">
+            <a:extLst>
+              <a:ext uri="{28A0092B-C50C-407E-A947-70E740481C1C}">
+                <a14:useLocalDpi xmlns:a14="http://schemas.microsoft.com/office/drawing/2010/main" val="0"/>
+              </a:ext>
+              <a:ext uri="{96DAC541-7B7A-43D3-8B79-37D633B846F1}">
+                <asvg:svgBlip xmlns:asvg="http://schemas.microsoft.com/office/drawing/2016/SVG/main" r:embed="rId3"/>
+              </a:ext>
+            </a:extLst>
+          </a:blip>
+          <a:stretch>
+            <a:fillRect/>
+          </a:stretch>
+        </p:blipFill>
+        <p:spPr>
+          <a:xfrm>
+            <a:off x="440819" y="329981"/>
+            <a:ext cx="4878000" cy="4878000"/>
+          </a:xfrm>
+          <a:prstGeom prst="rect">
+            <a:avLst/>
+          </a:prstGeom>
+        </p:spPr>
+      </p:pic>
+      <p:pic>
+        <p:nvPicPr>
+          <p:cNvPr id="2" name="Gráfico 1" descr="Lupa com preenchimento sólido">
+            <a:extLst>
+              <a:ext uri="{FF2B5EF4-FFF2-40B4-BE49-F238E27FC236}">
+                <a16:creationId xmlns:a16="http://schemas.microsoft.com/office/drawing/2014/main" id="{4A6C355A-66C7-DA74-3CB1-85CB695A8914}"/>
+              </a:ext>
+            </a:extLst>
+          </p:cNvPr>
+          <p:cNvPicPr>
+            <a:picLocks noChangeAspect="1"/>
+          </p:cNvPicPr>
+          <p:nvPr/>
+        </p:nvPicPr>
+        <p:blipFill>
+          <a:blip r:embed="rId4">
+            <a:extLst>
+              <a:ext uri="{28A0092B-C50C-407E-A947-70E740481C1C}">
+                <a14:useLocalDpi xmlns:a14="http://schemas.microsoft.com/office/drawing/2010/main" val="0"/>
+              </a:ext>
+              <a:ext uri="{96DAC541-7B7A-43D3-8B79-37D633B846F1}">
+                <asvg:svgBlip xmlns:asvg="http://schemas.microsoft.com/office/drawing/2016/SVG/main" r:embed="rId5"/>
+              </a:ext>
+            </a:extLst>
+          </a:blip>
+          <a:stretch>
+            <a:fillRect/>
+          </a:stretch>
+        </p:blipFill>
+        <p:spPr>
+          <a:xfrm>
+            <a:off x="4978113" y="4978113"/>
+            <a:ext cx="2221200" cy="2221200"/>
+          </a:xfrm>
+          <a:prstGeom prst="rect">
+            <a:avLst/>
+          </a:prstGeom>
+        </p:spPr>
+      </p:pic>
+    </p:spTree>
+    <p:extLst>
+      <p:ext uri="{BB962C8B-B14F-4D97-AF65-F5344CB8AC3E}">
+        <p14:creationId xmlns:p14="http://schemas.microsoft.com/office/powerpoint/2010/main" val="2432195345"/>
       </p:ext>
     </p:extLst>
   </p:cSld>
@@ -9412,7 +10044,7 @@
                 <a14:useLocalDpi xmlns:a14="http://schemas.microsoft.com/office/drawing/2010/main" val="0"/>
               </a:ext>
               <a:ext uri="{96DAC541-7B7A-43D3-8B79-37D633B846F1}">
-                <asvg:svgBlip xmlns:asvg="http://schemas.microsoft.com/office/drawing/2016/SVG/main" xmlns="" r:embed="rId4"/>
+                <asvg:svgBlip xmlns:asvg="http://schemas.microsoft.com/office/drawing/2016/SVG/main" r:embed="rId4"/>
               </a:ext>
             </a:extLst>
           </a:blip>
@@ -9530,7 +10162,7 @@
                 <a14:useLocalDpi xmlns:a14="http://schemas.microsoft.com/office/drawing/2010/main" val="0"/>
               </a:ext>
               <a:ext uri="{96DAC541-7B7A-43D3-8B79-37D633B846F1}">
-                <asvg:svgBlip xmlns:asvg="http://schemas.microsoft.com/office/drawing/2016/SVG/main" xmlns="" r:embed="rId3"/>
+                <asvg:svgBlip xmlns:asvg="http://schemas.microsoft.com/office/drawing/2016/SVG/main" r:embed="rId3"/>
               </a:ext>
             </a:extLst>
           </a:blip>
@@ -9569,7 +10201,7 @@
                 <a14:useLocalDpi xmlns:a14="http://schemas.microsoft.com/office/drawing/2010/main" val="0"/>
               </a:ext>
               <a:ext uri="{96DAC541-7B7A-43D3-8B79-37D633B846F1}">
-                <asvg:svgBlip xmlns:asvg="http://schemas.microsoft.com/office/drawing/2016/SVG/main" xmlns="" r:embed="rId5"/>
+                <asvg:svgBlip xmlns:asvg="http://schemas.microsoft.com/office/drawing/2016/SVG/main" r:embed="rId5"/>
               </a:ext>
             </a:extLst>
           </a:blip>
@@ -9687,7 +10319,7 @@
                 <a14:useLocalDpi xmlns:a14="http://schemas.microsoft.com/office/drawing/2010/main" val="0"/>
               </a:ext>
               <a:ext uri="{96DAC541-7B7A-43D3-8B79-37D633B846F1}">
-                <asvg:svgBlip xmlns:asvg="http://schemas.microsoft.com/office/drawing/2016/SVG/main" xmlns="" r:embed="rId3"/>
+                <asvg:svgBlip xmlns:asvg="http://schemas.microsoft.com/office/drawing/2016/SVG/main" r:embed="rId3"/>
               </a:ext>
             </a:extLst>
           </a:blip>
@@ -9877,7 +10509,7 @@
                 <a14:useLocalDpi xmlns:a14="http://schemas.microsoft.com/office/drawing/2010/main" val="0"/>
               </a:ext>
               <a:ext uri="{96DAC541-7B7A-43D3-8B79-37D633B846F1}">
-                <asvg:svgBlip xmlns:asvg="http://schemas.microsoft.com/office/drawing/2016/SVG/main" xmlns="" r:embed="rId4"/>
+                <asvg:svgBlip xmlns:asvg="http://schemas.microsoft.com/office/drawing/2016/SVG/main" r:embed="rId4"/>
               </a:ext>
             </a:extLst>
           </a:blip>
@@ -10067,7 +10699,7 @@
                 <a14:useLocalDpi xmlns:a14="http://schemas.microsoft.com/office/drawing/2010/main" val="0"/>
               </a:ext>
               <a:ext uri="{96DAC541-7B7A-43D3-8B79-37D633B846F1}">
-                <asvg:svgBlip xmlns:asvg="http://schemas.microsoft.com/office/drawing/2016/SVG/main" xmlns="" r:embed="rId4"/>
+                <asvg:svgBlip xmlns:asvg="http://schemas.microsoft.com/office/drawing/2016/SVG/main" r:embed="rId4"/>
               </a:ext>
             </a:extLst>
           </a:blip>
@@ -10257,7 +10889,7 @@
                 <a14:useLocalDpi xmlns:a14="http://schemas.microsoft.com/office/drawing/2010/main" val="0"/>
               </a:ext>
               <a:ext uri="{96DAC541-7B7A-43D3-8B79-37D633B846F1}">
-                <asvg:svgBlip xmlns:asvg="http://schemas.microsoft.com/office/drawing/2016/SVG/main" xmlns="" r:embed="rId4"/>
+                <asvg:svgBlip xmlns:asvg="http://schemas.microsoft.com/office/drawing/2016/SVG/main" r:embed="rId4"/>
               </a:ext>
             </a:extLst>
           </a:blip>

</xml_diff>

<commit_message>
Finalizado as edições e exclusões de equipamentos e Consulta e criação de inspeções preventivas.
</commit_message>
<xml_diff>
--- a/Icons/icons.pptx
+++ b/Icons/icons.pptx
@@ -43,6 +43,8 @@
     <p:sldId id="304" r:id="rId37"/>
     <p:sldId id="305" r:id="rId38"/>
     <p:sldId id="306" r:id="rId39"/>
+    <p:sldId id="307" r:id="rId40"/>
+    <p:sldId id="308" r:id="rId41"/>
   </p:sldIdLst>
   <p:sldSz cx="7199313" cy="7199313"/>
   <p:notesSz cx="6858000" cy="9144000"/>
@@ -291,7 +293,7 @@
           <a:p>
             <a:fld id="{1EBE8C36-EE12-445F-BC15-76F5298A89EB}" type="datetimeFigureOut">
               <a:rPr lang="pt-BR" smtClean="0"/>
-              <a:t>07/04/2023</a:t>
+              <a:t>08/04/2023</a:t>
             </a:fld>
             <a:endParaRPr lang="pt-BR"/>
           </a:p>
@@ -461,7 +463,7 @@
           <a:p>
             <a:fld id="{1EBE8C36-EE12-445F-BC15-76F5298A89EB}" type="datetimeFigureOut">
               <a:rPr lang="pt-BR" smtClean="0"/>
-              <a:t>07/04/2023</a:t>
+              <a:t>08/04/2023</a:t>
             </a:fld>
             <a:endParaRPr lang="pt-BR"/>
           </a:p>
@@ -641,7 +643,7 @@
           <a:p>
             <a:fld id="{1EBE8C36-EE12-445F-BC15-76F5298A89EB}" type="datetimeFigureOut">
               <a:rPr lang="pt-BR" smtClean="0"/>
-              <a:t>07/04/2023</a:t>
+              <a:t>08/04/2023</a:t>
             </a:fld>
             <a:endParaRPr lang="pt-BR"/>
           </a:p>
@@ -811,7 +813,7 @@
           <a:p>
             <a:fld id="{1EBE8C36-EE12-445F-BC15-76F5298A89EB}" type="datetimeFigureOut">
               <a:rPr lang="pt-BR" smtClean="0"/>
-              <a:t>07/04/2023</a:t>
+              <a:t>08/04/2023</a:t>
             </a:fld>
             <a:endParaRPr lang="pt-BR"/>
           </a:p>
@@ -1055,7 +1057,7 @@
           <a:p>
             <a:fld id="{1EBE8C36-EE12-445F-BC15-76F5298A89EB}" type="datetimeFigureOut">
               <a:rPr lang="pt-BR" smtClean="0"/>
-              <a:t>07/04/2023</a:t>
+              <a:t>08/04/2023</a:t>
             </a:fld>
             <a:endParaRPr lang="pt-BR"/>
           </a:p>
@@ -1287,7 +1289,7 @@
           <a:p>
             <a:fld id="{1EBE8C36-EE12-445F-BC15-76F5298A89EB}" type="datetimeFigureOut">
               <a:rPr lang="pt-BR" smtClean="0"/>
-              <a:t>07/04/2023</a:t>
+              <a:t>08/04/2023</a:t>
             </a:fld>
             <a:endParaRPr lang="pt-BR"/>
           </a:p>
@@ -1654,7 +1656,7 @@
           <a:p>
             <a:fld id="{1EBE8C36-EE12-445F-BC15-76F5298A89EB}" type="datetimeFigureOut">
               <a:rPr lang="pt-BR" smtClean="0"/>
-              <a:t>07/04/2023</a:t>
+              <a:t>08/04/2023</a:t>
             </a:fld>
             <a:endParaRPr lang="pt-BR"/>
           </a:p>
@@ -1772,7 +1774,7 @@
           <a:p>
             <a:fld id="{1EBE8C36-EE12-445F-BC15-76F5298A89EB}" type="datetimeFigureOut">
               <a:rPr lang="pt-BR" smtClean="0"/>
-              <a:t>07/04/2023</a:t>
+              <a:t>08/04/2023</a:t>
             </a:fld>
             <a:endParaRPr lang="pt-BR"/>
           </a:p>
@@ -1867,7 +1869,7 @@
           <a:p>
             <a:fld id="{1EBE8C36-EE12-445F-BC15-76F5298A89EB}" type="datetimeFigureOut">
               <a:rPr lang="pt-BR" smtClean="0"/>
-              <a:t>07/04/2023</a:t>
+              <a:t>08/04/2023</a:t>
             </a:fld>
             <a:endParaRPr lang="pt-BR"/>
           </a:p>
@@ -2144,7 +2146,7 @@
           <a:p>
             <a:fld id="{1EBE8C36-EE12-445F-BC15-76F5298A89EB}" type="datetimeFigureOut">
               <a:rPr lang="pt-BR" smtClean="0"/>
-              <a:t>07/04/2023</a:t>
+              <a:t>08/04/2023</a:t>
             </a:fld>
             <a:endParaRPr lang="pt-BR"/>
           </a:p>
@@ -2401,7 +2403,7 @@
           <a:p>
             <a:fld id="{1EBE8C36-EE12-445F-BC15-76F5298A89EB}" type="datetimeFigureOut">
               <a:rPr lang="pt-BR" smtClean="0"/>
-              <a:t>07/04/2023</a:t>
+              <a:t>08/04/2023</a:t>
             </a:fld>
             <a:endParaRPr lang="pt-BR"/>
           </a:p>
@@ -2614,7 +2616,7 @@
           <a:p>
             <a:fld id="{1EBE8C36-EE12-445F-BC15-76F5298A89EB}" type="datetimeFigureOut">
               <a:rPr lang="pt-BR" smtClean="0"/>
-              <a:t>07/04/2023</a:t>
+              <a:t>08/04/2023</a:t>
             </a:fld>
             <a:endParaRPr lang="pt-BR"/>
           </a:p>
@@ -9921,6 +9923,124 @@
 </p:sld>
 </file>
 
+<file path=ppt/slides/slide39.xml><?xml version="1.0" encoding="utf-8"?>
+<p:sld xmlns:a="http://schemas.openxmlformats.org/drawingml/2006/main" xmlns:r="http://schemas.openxmlformats.org/officeDocument/2006/relationships" xmlns:p="http://schemas.openxmlformats.org/presentationml/2006/main">
+  <p:cSld>
+    <p:spTree>
+      <p:nvGrpSpPr>
+        <p:cNvPr id="1" name=""/>
+        <p:cNvGrpSpPr/>
+        <p:nvPr/>
+      </p:nvGrpSpPr>
+      <p:grpSpPr>
+        <a:xfrm>
+          <a:off x="0" y="0"/>
+          <a:ext cx="0" cy="0"/>
+          <a:chOff x="0" y="0"/>
+          <a:chExt cx="0" cy="0"/>
+        </a:xfrm>
+      </p:grpSpPr>
+      <p:sp>
+        <p:nvSpPr>
+          <p:cNvPr id="4" name="Retângulo 3">
+            <a:extLst>
+              <a:ext uri="{FF2B5EF4-FFF2-40B4-BE49-F238E27FC236}">
+                <a16:creationId xmlns:a16="http://schemas.microsoft.com/office/drawing/2014/main" id="{73521BF0-0376-2073-7FDD-6DD8B0C9B5B6}"/>
+              </a:ext>
+            </a:extLst>
+          </p:cNvPr>
+          <p:cNvSpPr/>
+          <p:nvPr/>
+        </p:nvSpPr>
+        <p:spPr>
+          <a:xfrm>
+            <a:off x="0" y="1"/>
+            <a:ext cx="7199313" cy="7199312"/>
+          </a:xfrm>
+          <a:prstGeom prst="rect">
+            <a:avLst/>
+          </a:prstGeom>
+          <a:solidFill>
+            <a:srgbClr val="141B41"/>
+          </a:solidFill>
+        </p:spPr>
+        <p:style>
+          <a:lnRef idx="2">
+            <a:schemeClr val="accent1">
+              <a:shade val="50000"/>
+            </a:schemeClr>
+          </a:lnRef>
+          <a:fillRef idx="1">
+            <a:schemeClr val="accent1"/>
+          </a:fillRef>
+          <a:effectRef idx="0">
+            <a:schemeClr val="accent1"/>
+          </a:effectRef>
+          <a:fontRef idx="minor">
+            <a:schemeClr val="lt1"/>
+          </a:fontRef>
+        </p:style>
+        <p:txBody>
+          <a:bodyPr rtlCol="0" anchor="ctr"/>
+          <a:lstStyle/>
+          <a:p>
+            <a:pPr algn="ctr"/>
+            <a:endParaRPr lang="pt-BR" dirty="0"/>
+          </a:p>
+        </p:txBody>
+      </p:sp>
+      <p:pic>
+        <p:nvPicPr>
+          <p:cNvPr id="5" name="Gráfico 4" descr="Ferramentas com preenchimento sólido">
+            <a:extLst>
+              <a:ext uri="{FF2B5EF4-FFF2-40B4-BE49-F238E27FC236}">
+                <a16:creationId xmlns:a16="http://schemas.microsoft.com/office/drawing/2014/main" id="{DC5FD06C-EB37-D1F6-6078-CA9922C7A68A}"/>
+              </a:ext>
+            </a:extLst>
+          </p:cNvPr>
+          <p:cNvPicPr>
+            <a:picLocks noChangeAspect="1"/>
+          </p:cNvPicPr>
+          <p:nvPr/>
+        </p:nvPicPr>
+        <p:blipFill>
+          <a:blip r:embed="rId2">
+            <a:extLst>
+              <a:ext uri="{28A0092B-C50C-407E-A947-70E740481C1C}">
+                <a14:useLocalDpi xmlns:a14="http://schemas.microsoft.com/office/drawing/2010/main" val="0"/>
+              </a:ext>
+              <a:ext uri="{96DAC541-7B7A-43D3-8B79-37D633B846F1}">
+                <asvg:svgBlip xmlns:asvg="http://schemas.microsoft.com/office/drawing/2016/SVG/main" r:embed="rId3"/>
+              </a:ext>
+            </a:extLst>
+          </a:blip>
+          <a:stretch>
+            <a:fillRect/>
+          </a:stretch>
+        </p:blipFill>
+        <p:spPr>
+          <a:xfrm>
+            <a:off x="1049056" y="1049056"/>
+            <a:ext cx="5101200" cy="5101200"/>
+          </a:xfrm>
+          <a:prstGeom prst="rect">
+            <a:avLst/>
+          </a:prstGeom>
+        </p:spPr>
+      </p:pic>
+    </p:spTree>
+    <p:extLst>
+      <p:ext uri="{BB962C8B-B14F-4D97-AF65-F5344CB8AC3E}">
+        <p14:creationId xmlns:p14="http://schemas.microsoft.com/office/powerpoint/2010/main" val="2608605379"/>
+      </p:ext>
+    </p:extLst>
+  </p:cSld>
+  <p:clrMapOvr>
+    <a:masterClrMapping/>
+  </p:clrMapOvr>
+</p:sld>
+</file>
+
 <file path=ppt/slides/slide4.xml><?xml version="1.0" encoding="utf-8"?>
 <p:sld xmlns:a="http://schemas.openxmlformats.org/drawingml/2006/main" xmlns:r="http://schemas.openxmlformats.org/officeDocument/2006/relationships" xmlns:p="http://schemas.openxmlformats.org/presentationml/2006/main">
   <p:cSld>
@@ -10066,6 +10186,124 @@
     <p:extLst>
       <p:ext uri="{BB962C8B-B14F-4D97-AF65-F5344CB8AC3E}">
         <p14:creationId xmlns:p14="http://schemas.microsoft.com/office/powerpoint/2010/main" val="1564521623"/>
+      </p:ext>
+    </p:extLst>
+  </p:cSld>
+  <p:clrMapOvr>
+    <a:masterClrMapping/>
+  </p:clrMapOvr>
+</p:sld>
+</file>
+
+<file path=ppt/slides/slide40.xml><?xml version="1.0" encoding="utf-8"?>
+<p:sld xmlns:a="http://schemas.openxmlformats.org/drawingml/2006/main" xmlns:r="http://schemas.openxmlformats.org/officeDocument/2006/relationships" xmlns:p="http://schemas.openxmlformats.org/presentationml/2006/main">
+  <p:cSld>
+    <p:spTree>
+      <p:nvGrpSpPr>
+        <p:cNvPr id="1" name=""/>
+        <p:cNvGrpSpPr/>
+        <p:nvPr/>
+      </p:nvGrpSpPr>
+      <p:grpSpPr>
+        <a:xfrm>
+          <a:off x="0" y="0"/>
+          <a:ext cx="0" cy="0"/>
+          <a:chOff x="0" y="0"/>
+          <a:chExt cx="0" cy="0"/>
+        </a:xfrm>
+      </p:grpSpPr>
+      <p:sp>
+        <p:nvSpPr>
+          <p:cNvPr id="4" name="Retângulo 3">
+            <a:extLst>
+              <a:ext uri="{FF2B5EF4-FFF2-40B4-BE49-F238E27FC236}">
+                <a16:creationId xmlns:a16="http://schemas.microsoft.com/office/drawing/2014/main" id="{73521BF0-0376-2073-7FDD-6DD8B0C9B5B6}"/>
+              </a:ext>
+            </a:extLst>
+          </p:cNvPr>
+          <p:cNvSpPr/>
+          <p:nvPr/>
+        </p:nvSpPr>
+        <p:spPr>
+          <a:xfrm>
+            <a:off x="0" y="1"/>
+            <a:ext cx="7199313" cy="7199312"/>
+          </a:xfrm>
+          <a:prstGeom prst="rect">
+            <a:avLst/>
+          </a:prstGeom>
+          <a:solidFill>
+            <a:srgbClr val="141B41"/>
+          </a:solidFill>
+        </p:spPr>
+        <p:style>
+          <a:lnRef idx="2">
+            <a:schemeClr val="accent1">
+              <a:shade val="50000"/>
+            </a:schemeClr>
+          </a:lnRef>
+          <a:fillRef idx="1">
+            <a:schemeClr val="accent1"/>
+          </a:fillRef>
+          <a:effectRef idx="0">
+            <a:schemeClr val="accent1"/>
+          </a:effectRef>
+          <a:fontRef idx="minor">
+            <a:schemeClr val="lt1"/>
+          </a:fontRef>
+        </p:style>
+        <p:txBody>
+          <a:bodyPr rtlCol="0" anchor="ctr"/>
+          <a:lstStyle/>
+          <a:p>
+            <a:pPr algn="ctr"/>
+            <a:endParaRPr lang="pt-BR" dirty="0"/>
+          </a:p>
+        </p:txBody>
+      </p:sp>
+      <p:pic>
+        <p:nvPicPr>
+          <p:cNvPr id="5" name="Gráfico 4" descr="Ferramentas com preenchimento sólido">
+            <a:extLst>
+              <a:ext uri="{FF2B5EF4-FFF2-40B4-BE49-F238E27FC236}">
+                <a16:creationId xmlns:a16="http://schemas.microsoft.com/office/drawing/2014/main" id="{DC5FD06C-EB37-D1F6-6078-CA9922C7A68A}"/>
+              </a:ext>
+            </a:extLst>
+          </p:cNvPr>
+          <p:cNvPicPr>
+            <a:picLocks noChangeAspect="1"/>
+          </p:cNvPicPr>
+          <p:nvPr/>
+        </p:nvPicPr>
+        <p:blipFill>
+          <a:blip r:embed="rId2">
+            <a:extLst>
+              <a:ext uri="{28A0092B-C50C-407E-A947-70E740481C1C}">
+                <a14:useLocalDpi xmlns:a14="http://schemas.microsoft.com/office/drawing/2010/main" val="0"/>
+              </a:ext>
+              <a:ext uri="{96DAC541-7B7A-43D3-8B79-37D633B846F1}">
+                <asvg:svgBlip xmlns:asvg="http://schemas.microsoft.com/office/drawing/2016/SVG/main" r:embed="rId3"/>
+              </a:ext>
+            </a:extLst>
+          </a:blip>
+          <a:stretch>
+            <a:fillRect/>
+          </a:stretch>
+        </p:blipFill>
+        <p:spPr>
+          <a:xfrm>
+            <a:off x="1049056" y="1049056"/>
+            <a:ext cx="5101200" cy="5101200"/>
+          </a:xfrm>
+          <a:prstGeom prst="rect">
+            <a:avLst/>
+          </a:prstGeom>
+        </p:spPr>
+      </p:pic>
+    </p:spTree>
+    <p:extLst>
+      <p:ext uri="{BB962C8B-B14F-4D97-AF65-F5344CB8AC3E}">
+        <p14:creationId xmlns:p14="http://schemas.microsoft.com/office/powerpoint/2010/main" val="997614615"/>
       </p:ext>
     </p:extLst>
   </p:cSld>

</xml_diff>

<commit_message>
Ajustando Sistema para trabalhar com as planilhas 'inativas'.
</commit_message>
<xml_diff>
--- a/Icons/icons.pptx
+++ b/Icons/icons.pptx
@@ -45,6 +45,8 @@
     <p:sldId id="306" r:id="rId39"/>
     <p:sldId id="307" r:id="rId40"/>
     <p:sldId id="308" r:id="rId41"/>
+    <p:sldId id="309" r:id="rId42"/>
+    <p:sldId id="310" r:id="rId43"/>
   </p:sldIdLst>
   <p:sldSz cx="7199313" cy="7199313"/>
   <p:notesSz cx="6858000" cy="9144000"/>
@@ -10313,6 +10315,224 @@
 </p:sld>
 </file>
 
+<file path=ppt/slides/slide41.xml><?xml version="1.0" encoding="utf-8"?>
+<p:sld xmlns:a="http://schemas.openxmlformats.org/drawingml/2006/main" xmlns:r="http://schemas.openxmlformats.org/officeDocument/2006/relationships" xmlns:p="http://schemas.openxmlformats.org/presentationml/2006/main">
+  <p:cSld>
+    <p:spTree>
+      <p:nvGrpSpPr>
+        <p:cNvPr id="1" name=""/>
+        <p:cNvGrpSpPr/>
+        <p:nvPr/>
+      </p:nvGrpSpPr>
+      <p:grpSpPr>
+        <a:xfrm>
+          <a:off x="0" y="0"/>
+          <a:ext cx="0" cy="0"/>
+          <a:chOff x="0" y="0"/>
+          <a:chExt cx="0" cy="0"/>
+        </a:xfrm>
+      </p:grpSpPr>
+      <p:sp>
+        <p:nvSpPr>
+          <p:cNvPr id="4" name="Retângulo 3">
+            <a:extLst>
+              <a:ext uri="{FF2B5EF4-FFF2-40B4-BE49-F238E27FC236}">
+                <a16:creationId xmlns:a16="http://schemas.microsoft.com/office/drawing/2014/main" id="{73521BF0-0376-2073-7FDD-6DD8B0C9B5B6}"/>
+              </a:ext>
+            </a:extLst>
+          </p:cNvPr>
+          <p:cNvSpPr/>
+          <p:nvPr/>
+        </p:nvSpPr>
+        <p:spPr>
+          <a:xfrm>
+            <a:off x="0" y="1"/>
+            <a:ext cx="7199313" cy="7199312"/>
+          </a:xfrm>
+          <a:prstGeom prst="rect">
+            <a:avLst/>
+          </a:prstGeom>
+          <a:solidFill>
+            <a:srgbClr val="141B41"/>
+          </a:solidFill>
+        </p:spPr>
+        <p:style>
+          <a:lnRef idx="2">
+            <a:schemeClr val="accent1">
+              <a:shade val="50000"/>
+            </a:schemeClr>
+          </a:lnRef>
+          <a:fillRef idx="1">
+            <a:schemeClr val="accent1"/>
+          </a:fillRef>
+          <a:effectRef idx="0">
+            <a:schemeClr val="accent1"/>
+          </a:effectRef>
+          <a:fontRef idx="minor">
+            <a:schemeClr val="lt1"/>
+          </a:fontRef>
+        </p:style>
+        <p:txBody>
+          <a:bodyPr rtlCol="0" anchor="ctr"/>
+          <a:lstStyle/>
+          <a:p>
+            <a:pPr algn="ctr"/>
+            <a:endParaRPr lang="pt-BR" dirty="0"/>
+          </a:p>
+        </p:txBody>
+      </p:sp>
+      <p:pic>
+        <p:nvPicPr>
+          <p:cNvPr id="3" name="Imagem 2">
+            <a:extLst>
+              <a:ext uri="{FF2B5EF4-FFF2-40B4-BE49-F238E27FC236}">
+                <a16:creationId xmlns:a16="http://schemas.microsoft.com/office/drawing/2014/main" id="{CBF8413E-AAB9-0CB8-2123-3DA0FEAFF686}"/>
+              </a:ext>
+            </a:extLst>
+          </p:cNvPr>
+          <p:cNvPicPr>
+            <a:picLocks noChangeAspect="1"/>
+          </p:cNvPicPr>
+          <p:nvPr/>
+        </p:nvPicPr>
+        <p:blipFill>
+          <a:blip r:embed="rId2"/>
+          <a:stretch>
+            <a:fillRect/>
+          </a:stretch>
+        </p:blipFill>
+        <p:spPr>
+          <a:xfrm>
+            <a:off x="13357" y="0"/>
+            <a:ext cx="7185956" cy="7199313"/>
+          </a:xfrm>
+          <a:prstGeom prst="rect">
+            <a:avLst/>
+          </a:prstGeom>
+        </p:spPr>
+      </p:pic>
+    </p:spTree>
+    <p:extLst>
+      <p:ext uri="{BB962C8B-B14F-4D97-AF65-F5344CB8AC3E}">
+        <p14:creationId xmlns:p14="http://schemas.microsoft.com/office/powerpoint/2010/main" val="2943697908"/>
+      </p:ext>
+    </p:extLst>
+  </p:cSld>
+  <p:clrMapOvr>
+    <a:masterClrMapping/>
+  </p:clrMapOvr>
+</p:sld>
+</file>
+
+<file path=ppt/slides/slide42.xml><?xml version="1.0" encoding="utf-8"?>
+<p:sld xmlns:a="http://schemas.openxmlformats.org/drawingml/2006/main" xmlns:r="http://schemas.openxmlformats.org/officeDocument/2006/relationships" xmlns:p="http://schemas.openxmlformats.org/presentationml/2006/main">
+  <p:cSld>
+    <p:spTree>
+      <p:nvGrpSpPr>
+        <p:cNvPr id="1" name=""/>
+        <p:cNvGrpSpPr/>
+        <p:nvPr/>
+      </p:nvGrpSpPr>
+      <p:grpSpPr>
+        <a:xfrm>
+          <a:off x="0" y="0"/>
+          <a:ext cx="0" cy="0"/>
+          <a:chOff x="0" y="0"/>
+          <a:chExt cx="0" cy="0"/>
+        </a:xfrm>
+      </p:grpSpPr>
+      <p:sp>
+        <p:nvSpPr>
+          <p:cNvPr id="4" name="Retângulo 3">
+            <a:extLst>
+              <a:ext uri="{FF2B5EF4-FFF2-40B4-BE49-F238E27FC236}">
+                <a16:creationId xmlns:a16="http://schemas.microsoft.com/office/drawing/2014/main" id="{73521BF0-0376-2073-7FDD-6DD8B0C9B5B6}"/>
+              </a:ext>
+            </a:extLst>
+          </p:cNvPr>
+          <p:cNvSpPr/>
+          <p:nvPr/>
+        </p:nvSpPr>
+        <p:spPr>
+          <a:xfrm>
+            <a:off x="0" y="1"/>
+            <a:ext cx="7199313" cy="7199312"/>
+          </a:xfrm>
+          <a:prstGeom prst="rect">
+            <a:avLst/>
+          </a:prstGeom>
+          <a:solidFill>
+            <a:srgbClr val="141B41"/>
+          </a:solidFill>
+        </p:spPr>
+        <p:style>
+          <a:lnRef idx="2">
+            <a:schemeClr val="accent1">
+              <a:shade val="50000"/>
+            </a:schemeClr>
+          </a:lnRef>
+          <a:fillRef idx="1">
+            <a:schemeClr val="accent1"/>
+          </a:fillRef>
+          <a:effectRef idx="0">
+            <a:schemeClr val="accent1"/>
+          </a:effectRef>
+          <a:fontRef idx="minor">
+            <a:schemeClr val="lt1"/>
+          </a:fontRef>
+        </p:style>
+        <p:txBody>
+          <a:bodyPr rtlCol="0" anchor="ctr"/>
+          <a:lstStyle/>
+          <a:p>
+            <a:pPr algn="ctr"/>
+            <a:endParaRPr lang="pt-BR" dirty="0"/>
+          </a:p>
+        </p:txBody>
+      </p:sp>
+      <p:pic>
+        <p:nvPicPr>
+          <p:cNvPr id="7" name="Imagem 6">
+            <a:extLst>
+              <a:ext uri="{FF2B5EF4-FFF2-40B4-BE49-F238E27FC236}">
+                <a16:creationId xmlns:a16="http://schemas.microsoft.com/office/drawing/2014/main" id="{10285049-AE60-38A9-D44F-0547959B951F}"/>
+              </a:ext>
+            </a:extLst>
+          </p:cNvPr>
+          <p:cNvPicPr>
+            <a:picLocks noChangeAspect="1"/>
+          </p:cNvPicPr>
+          <p:nvPr/>
+        </p:nvPicPr>
+        <p:blipFill>
+          <a:blip r:embed="rId2"/>
+          <a:stretch>
+            <a:fillRect/>
+          </a:stretch>
+        </p:blipFill>
+        <p:spPr>
+          <a:xfrm>
+            <a:off x="0" y="0"/>
+            <a:ext cx="7199311" cy="7199311"/>
+          </a:xfrm>
+          <a:prstGeom prst="rect">
+            <a:avLst/>
+          </a:prstGeom>
+        </p:spPr>
+      </p:pic>
+    </p:spTree>
+    <p:extLst>
+      <p:ext uri="{BB962C8B-B14F-4D97-AF65-F5344CB8AC3E}">
+        <p14:creationId xmlns:p14="http://schemas.microsoft.com/office/powerpoint/2010/main" val="4168035138"/>
+      </p:ext>
+    </p:extLst>
+  </p:cSld>
+  <p:clrMapOvr>
+    <a:masterClrMapping/>
+  </p:clrMapOvr>
+</p:sld>
+</file>
+
 <file path=ppt/slides/slide5.xml><?xml version="1.0" encoding="utf-8"?>
 <p:sld xmlns:a="http://schemas.openxmlformats.org/drawingml/2006/main" xmlns:r="http://schemas.openxmlformats.org/officeDocument/2006/relationships" xmlns:p="http://schemas.openxmlformats.org/presentationml/2006/main">
   <p:cSld>

</xml_diff>

<commit_message>
Ajustando excessões de inexistência de equipamentos e configurando painel de créditos do HomeForm
</commit_message>
<xml_diff>
--- a/Icons/icons.pptx
+++ b/Icons/icons.pptx
@@ -46,7 +46,11 @@
     <p:sldId id="307" r:id="rId40"/>
     <p:sldId id="308" r:id="rId41"/>
     <p:sldId id="309" r:id="rId42"/>
-    <p:sldId id="310" r:id="rId43"/>
+    <p:sldId id="313" r:id="rId43"/>
+    <p:sldId id="314" r:id="rId44"/>
+    <p:sldId id="310" r:id="rId45"/>
+    <p:sldId id="311" r:id="rId46"/>
+    <p:sldId id="312" r:id="rId47"/>
   </p:sldIdLst>
   <p:sldSz cx="7199313" cy="7199313"/>
   <p:notesSz cx="6858000" cy="9144000"/>
@@ -295,7 +299,7 @@
           <a:p>
             <a:fld id="{1EBE8C36-EE12-445F-BC15-76F5298A89EB}" type="datetimeFigureOut">
               <a:rPr lang="pt-BR" smtClean="0"/>
-              <a:t>08/04/2023</a:t>
+              <a:t>09/04/2023</a:t>
             </a:fld>
             <a:endParaRPr lang="pt-BR"/>
           </a:p>
@@ -465,7 +469,7 @@
           <a:p>
             <a:fld id="{1EBE8C36-EE12-445F-BC15-76F5298A89EB}" type="datetimeFigureOut">
               <a:rPr lang="pt-BR" smtClean="0"/>
-              <a:t>08/04/2023</a:t>
+              <a:t>09/04/2023</a:t>
             </a:fld>
             <a:endParaRPr lang="pt-BR"/>
           </a:p>
@@ -645,7 +649,7 @@
           <a:p>
             <a:fld id="{1EBE8C36-EE12-445F-BC15-76F5298A89EB}" type="datetimeFigureOut">
               <a:rPr lang="pt-BR" smtClean="0"/>
-              <a:t>08/04/2023</a:t>
+              <a:t>09/04/2023</a:t>
             </a:fld>
             <a:endParaRPr lang="pt-BR"/>
           </a:p>
@@ -815,7 +819,7 @@
           <a:p>
             <a:fld id="{1EBE8C36-EE12-445F-BC15-76F5298A89EB}" type="datetimeFigureOut">
               <a:rPr lang="pt-BR" smtClean="0"/>
-              <a:t>08/04/2023</a:t>
+              <a:t>09/04/2023</a:t>
             </a:fld>
             <a:endParaRPr lang="pt-BR"/>
           </a:p>
@@ -1059,7 +1063,7 @@
           <a:p>
             <a:fld id="{1EBE8C36-EE12-445F-BC15-76F5298A89EB}" type="datetimeFigureOut">
               <a:rPr lang="pt-BR" smtClean="0"/>
-              <a:t>08/04/2023</a:t>
+              <a:t>09/04/2023</a:t>
             </a:fld>
             <a:endParaRPr lang="pt-BR"/>
           </a:p>
@@ -1291,7 +1295,7 @@
           <a:p>
             <a:fld id="{1EBE8C36-EE12-445F-BC15-76F5298A89EB}" type="datetimeFigureOut">
               <a:rPr lang="pt-BR" smtClean="0"/>
-              <a:t>08/04/2023</a:t>
+              <a:t>09/04/2023</a:t>
             </a:fld>
             <a:endParaRPr lang="pt-BR"/>
           </a:p>
@@ -1658,7 +1662,7 @@
           <a:p>
             <a:fld id="{1EBE8C36-EE12-445F-BC15-76F5298A89EB}" type="datetimeFigureOut">
               <a:rPr lang="pt-BR" smtClean="0"/>
-              <a:t>08/04/2023</a:t>
+              <a:t>09/04/2023</a:t>
             </a:fld>
             <a:endParaRPr lang="pt-BR"/>
           </a:p>
@@ -1776,7 +1780,7 @@
           <a:p>
             <a:fld id="{1EBE8C36-EE12-445F-BC15-76F5298A89EB}" type="datetimeFigureOut">
               <a:rPr lang="pt-BR" smtClean="0"/>
-              <a:t>08/04/2023</a:t>
+              <a:t>09/04/2023</a:t>
             </a:fld>
             <a:endParaRPr lang="pt-BR"/>
           </a:p>
@@ -1871,7 +1875,7 @@
           <a:p>
             <a:fld id="{1EBE8C36-EE12-445F-BC15-76F5298A89EB}" type="datetimeFigureOut">
               <a:rPr lang="pt-BR" smtClean="0"/>
-              <a:t>08/04/2023</a:t>
+              <a:t>09/04/2023</a:t>
             </a:fld>
             <a:endParaRPr lang="pt-BR"/>
           </a:p>
@@ -2148,7 +2152,7 @@
           <a:p>
             <a:fld id="{1EBE8C36-EE12-445F-BC15-76F5298A89EB}" type="datetimeFigureOut">
               <a:rPr lang="pt-BR" smtClean="0"/>
-              <a:t>08/04/2023</a:t>
+              <a:t>09/04/2023</a:t>
             </a:fld>
             <a:endParaRPr lang="pt-BR"/>
           </a:p>
@@ -2405,7 +2409,7 @@
           <a:p>
             <a:fld id="{1EBE8C36-EE12-445F-BC15-76F5298A89EB}" type="datetimeFigureOut">
               <a:rPr lang="pt-BR" smtClean="0"/>
-              <a:t>08/04/2023</a:t>
+              <a:t>09/04/2023</a:t>
             </a:fld>
             <a:endParaRPr lang="pt-BR"/>
           </a:p>
@@ -2618,7 +2622,7 @@
           <a:p>
             <a:fld id="{1EBE8C36-EE12-445F-BC15-76F5298A89EB}" type="datetimeFigureOut">
               <a:rPr lang="pt-BR" smtClean="0"/>
-              <a:t>08/04/2023</a:t>
+              <a:t>09/04/2023</a:t>
             </a:fld>
             <a:endParaRPr lang="pt-BR"/>
           </a:p>
@@ -10495,7 +10499,7 @@
           <p:cNvPr id="7" name="Imagem 6">
             <a:extLst>
               <a:ext uri="{FF2B5EF4-FFF2-40B4-BE49-F238E27FC236}">
-                <a16:creationId xmlns:a16="http://schemas.microsoft.com/office/drawing/2014/main" id="{10285049-AE60-38A9-D44F-0547959B951F}"/>
+                <a16:creationId xmlns:a16="http://schemas.microsoft.com/office/drawing/2014/main" id="{CDDB1744-E312-FCF2-6EB9-354974533EED}"/>
               </a:ext>
             </a:extLst>
           </p:cNvPr>
@@ -10513,6 +10517,224 @@
         <p:spPr>
           <a:xfrm>
             <a:off x="0" y="0"/>
+            <a:ext cx="7199312" cy="7199312"/>
+          </a:xfrm>
+          <a:prstGeom prst="rect">
+            <a:avLst/>
+          </a:prstGeom>
+        </p:spPr>
+      </p:pic>
+    </p:spTree>
+    <p:extLst>
+      <p:ext uri="{BB962C8B-B14F-4D97-AF65-F5344CB8AC3E}">
+        <p14:creationId xmlns:p14="http://schemas.microsoft.com/office/powerpoint/2010/main" val="267825945"/>
+      </p:ext>
+    </p:extLst>
+  </p:cSld>
+  <p:clrMapOvr>
+    <a:masterClrMapping/>
+  </p:clrMapOvr>
+</p:sld>
+</file>
+
+<file path=ppt/slides/slide43.xml><?xml version="1.0" encoding="utf-8"?>
+<p:sld xmlns:a="http://schemas.openxmlformats.org/drawingml/2006/main" xmlns:r="http://schemas.openxmlformats.org/officeDocument/2006/relationships" xmlns:p="http://schemas.openxmlformats.org/presentationml/2006/main">
+  <p:cSld>
+    <p:spTree>
+      <p:nvGrpSpPr>
+        <p:cNvPr id="1" name=""/>
+        <p:cNvGrpSpPr/>
+        <p:nvPr/>
+      </p:nvGrpSpPr>
+      <p:grpSpPr>
+        <a:xfrm>
+          <a:off x="0" y="0"/>
+          <a:ext cx="0" cy="0"/>
+          <a:chOff x="0" y="0"/>
+          <a:chExt cx="0" cy="0"/>
+        </a:xfrm>
+      </p:grpSpPr>
+      <p:sp>
+        <p:nvSpPr>
+          <p:cNvPr id="4" name="Retângulo 3">
+            <a:extLst>
+              <a:ext uri="{FF2B5EF4-FFF2-40B4-BE49-F238E27FC236}">
+                <a16:creationId xmlns:a16="http://schemas.microsoft.com/office/drawing/2014/main" id="{73521BF0-0376-2073-7FDD-6DD8B0C9B5B6}"/>
+              </a:ext>
+            </a:extLst>
+          </p:cNvPr>
+          <p:cNvSpPr/>
+          <p:nvPr/>
+        </p:nvSpPr>
+        <p:spPr>
+          <a:xfrm>
+            <a:off x="0" y="1"/>
+            <a:ext cx="7199313" cy="7199312"/>
+          </a:xfrm>
+          <a:prstGeom prst="rect">
+            <a:avLst/>
+          </a:prstGeom>
+          <a:solidFill>
+            <a:srgbClr val="141B41"/>
+          </a:solidFill>
+        </p:spPr>
+        <p:style>
+          <a:lnRef idx="2">
+            <a:schemeClr val="accent1">
+              <a:shade val="50000"/>
+            </a:schemeClr>
+          </a:lnRef>
+          <a:fillRef idx="1">
+            <a:schemeClr val="accent1"/>
+          </a:fillRef>
+          <a:effectRef idx="0">
+            <a:schemeClr val="accent1"/>
+          </a:effectRef>
+          <a:fontRef idx="minor">
+            <a:schemeClr val="lt1"/>
+          </a:fontRef>
+        </p:style>
+        <p:txBody>
+          <a:bodyPr rtlCol="0" anchor="ctr"/>
+          <a:lstStyle/>
+          <a:p>
+            <a:pPr algn="ctr"/>
+            <a:endParaRPr lang="pt-BR" dirty="0"/>
+          </a:p>
+        </p:txBody>
+      </p:sp>
+      <p:pic>
+        <p:nvPicPr>
+          <p:cNvPr id="5" name="Imagem 4">
+            <a:extLst>
+              <a:ext uri="{FF2B5EF4-FFF2-40B4-BE49-F238E27FC236}">
+                <a16:creationId xmlns:a16="http://schemas.microsoft.com/office/drawing/2014/main" id="{2AAA5FD4-8906-B7C9-E2C7-B665DD3A9D4D}"/>
+              </a:ext>
+            </a:extLst>
+          </p:cNvPr>
+          <p:cNvPicPr>
+            <a:picLocks noChangeAspect="1"/>
+          </p:cNvPicPr>
+          <p:nvPr/>
+        </p:nvPicPr>
+        <p:blipFill>
+          <a:blip r:embed="rId2"/>
+          <a:stretch>
+            <a:fillRect/>
+          </a:stretch>
+        </p:blipFill>
+        <p:spPr>
+          <a:xfrm>
+            <a:off x="0" y="0"/>
+            <a:ext cx="7199313" cy="7199313"/>
+          </a:xfrm>
+          <a:prstGeom prst="rect">
+            <a:avLst/>
+          </a:prstGeom>
+        </p:spPr>
+      </p:pic>
+    </p:spTree>
+    <p:extLst>
+      <p:ext uri="{BB962C8B-B14F-4D97-AF65-F5344CB8AC3E}">
+        <p14:creationId xmlns:p14="http://schemas.microsoft.com/office/powerpoint/2010/main" val="3474069478"/>
+      </p:ext>
+    </p:extLst>
+  </p:cSld>
+  <p:clrMapOvr>
+    <a:masterClrMapping/>
+  </p:clrMapOvr>
+</p:sld>
+</file>
+
+<file path=ppt/slides/slide44.xml><?xml version="1.0" encoding="utf-8"?>
+<p:sld xmlns:a="http://schemas.openxmlformats.org/drawingml/2006/main" xmlns:r="http://schemas.openxmlformats.org/officeDocument/2006/relationships" xmlns:p="http://schemas.openxmlformats.org/presentationml/2006/main">
+  <p:cSld>
+    <p:spTree>
+      <p:nvGrpSpPr>
+        <p:cNvPr id="1" name=""/>
+        <p:cNvGrpSpPr/>
+        <p:nvPr/>
+      </p:nvGrpSpPr>
+      <p:grpSpPr>
+        <a:xfrm>
+          <a:off x="0" y="0"/>
+          <a:ext cx="0" cy="0"/>
+          <a:chOff x="0" y="0"/>
+          <a:chExt cx="0" cy="0"/>
+        </a:xfrm>
+      </p:grpSpPr>
+      <p:sp>
+        <p:nvSpPr>
+          <p:cNvPr id="4" name="Retângulo 3">
+            <a:extLst>
+              <a:ext uri="{FF2B5EF4-FFF2-40B4-BE49-F238E27FC236}">
+                <a16:creationId xmlns:a16="http://schemas.microsoft.com/office/drawing/2014/main" id="{73521BF0-0376-2073-7FDD-6DD8B0C9B5B6}"/>
+              </a:ext>
+            </a:extLst>
+          </p:cNvPr>
+          <p:cNvSpPr/>
+          <p:nvPr/>
+        </p:nvSpPr>
+        <p:spPr>
+          <a:xfrm>
+            <a:off x="0" y="1"/>
+            <a:ext cx="7199313" cy="7199312"/>
+          </a:xfrm>
+          <a:prstGeom prst="rect">
+            <a:avLst/>
+          </a:prstGeom>
+          <a:solidFill>
+            <a:srgbClr val="141B41"/>
+          </a:solidFill>
+        </p:spPr>
+        <p:style>
+          <a:lnRef idx="2">
+            <a:schemeClr val="accent1">
+              <a:shade val="50000"/>
+            </a:schemeClr>
+          </a:lnRef>
+          <a:fillRef idx="1">
+            <a:schemeClr val="accent1"/>
+          </a:fillRef>
+          <a:effectRef idx="0">
+            <a:schemeClr val="accent1"/>
+          </a:effectRef>
+          <a:fontRef idx="minor">
+            <a:schemeClr val="lt1"/>
+          </a:fontRef>
+        </p:style>
+        <p:txBody>
+          <a:bodyPr rtlCol="0" anchor="ctr"/>
+          <a:lstStyle/>
+          <a:p>
+            <a:pPr algn="ctr"/>
+            <a:endParaRPr lang="pt-BR" dirty="0"/>
+          </a:p>
+        </p:txBody>
+      </p:sp>
+      <p:pic>
+        <p:nvPicPr>
+          <p:cNvPr id="7" name="Imagem 6">
+            <a:extLst>
+              <a:ext uri="{FF2B5EF4-FFF2-40B4-BE49-F238E27FC236}">
+                <a16:creationId xmlns:a16="http://schemas.microsoft.com/office/drawing/2014/main" id="{10285049-AE60-38A9-D44F-0547959B951F}"/>
+              </a:ext>
+            </a:extLst>
+          </p:cNvPr>
+          <p:cNvPicPr>
+            <a:picLocks noChangeAspect="1"/>
+          </p:cNvPicPr>
+          <p:nvPr/>
+        </p:nvPicPr>
+        <p:blipFill>
+          <a:blip r:embed="rId2"/>
+          <a:stretch>
+            <a:fillRect/>
+          </a:stretch>
+        </p:blipFill>
+        <p:spPr>
+          <a:xfrm>
+            <a:off x="0" y="0"/>
             <a:ext cx="7199311" cy="7199311"/>
           </a:xfrm>
           <a:prstGeom prst="rect">
@@ -10524,6 +10746,246 @@
     <p:extLst>
       <p:ext uri="{BB962C8B-B14F-4D97-AF65-F5344CB8AC3E}">
         <p14:creationId xmlns:p14="http://schemas.microsoft.com/office/powerpoint/2010/main" val="4168035138"/>
+      </p:ext>
+    </p:extLst>
+  </p:cSld>
+  <p:clrMapOvr>
+    <a:masterClrMapping/>
+  </p:clrMapOvr>
+</p:sld>
+</file>
+
+<file path=ppt/slides/slide45.xml><?xml version="1.0" encoding="utf-8"?>
+<p:sld xmlns:a="http://schemas.openxmlformats.org/drawingml/2006/main" xmlns:r="http://schemas.openxmlformats.org/officeDocument/2006/relationships" xmlns:p="http://schemas.openxmlformats.org/presentationml/2006/main">
+  <p:cSld>
+    <p:spTree>
+      <p:nvGrpSpPr>
+        <p:cNvPr id="1" name=""/>
+        <p:cNvGrpSpPr/>
+        <p:nvPr/>
+      </p:nvGrpSpPr>
+      <p:grpSpPr>
+        <a:xfrm>
+          <a:off x="0" y="0"/>
+          <a:ext cx="0" cy="0"/>
+          <a:chOff x="0" y="0"/>
+          <a:chExt cx="0" cy="0"/>
+        </a:xfrm>
+      </p:grpSpPr>
+      <p:sp>
+        <p:nvSpPr>
+          <p:cNvPr id="4" name="Retângulo 3">
+            <a:extLst>
+              <a:ext uri="{FF2B5EF4-FFF2-40B4-BE49-F238E27FC236}">
+                <a16:creationId xmlns:a16="http://schemas.microsoft.com/office/drawing/2014/main" id="{73521BF0-0376-2073-7FDD-6DD8B0C9B5B6}"/>
+              </a:ext>
+            </a:extLst>
+          </p:cNvPr>
+          <p:cNvSpPr/>
+          <p:nvPr/>
+        </p:nvSpPr>
+        <p:spPr>
+          <a:xfrm>
+            <a:off x="0" y="1"/>
+            <a:ext cx="7199313" cy="7199312"/>
+          </a:xfrm>
+          <a:prstGeom prst="rect">
+            <a:avLst/>
+          </a:prstGeom>
+          <a:solidFill>
+            <a:schemeClr val="bg1"/>
+          </a:solidFill>
+          <a:ln>
+            <a:solidFill>
+              <a:schemeClr val="bg1"/>
+            </a:solidFill>
+          </a:ln>
+        </p:spPr>
+        <p:style>
+          <a:lnRef idx="2">
+            <a:schemeClr val="accent1">
+              <a:shade val="50000"/>
+            </a:schemeClr>
+          </a:lnRef>
+          <a:fillRef idx="1">
+            <a:schemeClr val="accent1"/>
+          </a:fillRef>
+          <a:effectRef idx="0">
+            <a:schemeClr val="accent1"/>
+          </a:effectRef>
+          <a:fontRef idx="minor">
+            <a:schemeClr val="lt1"/>
+          </a:fontRef>
+        </p:style>
+        <p:txBody>
+          <a:bodyPr rtlCol="0" anchor="ctr"/>
+          <a:lstStyle/>
+          <a:p>
+            <a:pPr algn="ctr"/>
+            <a:endParaRPr lang="pt-BR" dirty="0"/>
+          </a:p>
+        </p:txBody>
+      </p:sp>
+      <p:pic>
+        <p:nvPicPr>
+          <p:cNvPr id="3" name="Imagem 2" descr="Forma&#10;&#10;Descrição gerada automaticamente com confiança baixa">
+            <a:extLst>
+              <a:ext uri="{FF2B5EF4-FFF2-40B4-BE49-F238E27FC236}">
+                <a16:creationId xmlns:a16="http://schemas.microsoft.com/office/drawing/2014/main" id="{76A9C118-2DB4-36BC-A14B-5FE291EA5F8A}"/>
+              </a:ext>
+            </a:extLst>
+          </p:cNvPr>
+          <p:cNvPicPr>
+            <a:picLocks noChangeAspect="1"/>
+          </p:cNvPicPr>
+          <p:nvPr/>
+        </p:nvPicPr>
+        <p:blipFill>
+          <a:blip r:embed="rId2">
+            <a:extLst>
+              <a:ext uri="{28A0092B-C50C-407E-A947-70E740481C1C}">
+                <a14:useLocalDpi xmlns:a14="http://schemas.microsoft.com/office/drawing/2010/main" val="0"/>
+              </a:ext>
+            </a:extLst>
+          </a:blip>
+          <a:stretch>
+            <a:fillRect/>
+          </a:stretch>
+        </p:blipFill>
+        <p:spPr>
+          <a:xfrm>
+            <a:off x="0" y="0"/>
+            <a:ext cx="7199313" cy="7199313"/>
+          </a:xfrm>
+          <a:prstGeom prst="rect">
+            <a:avLst/>
+          </a:prstGeom>
+        </p:spPr>
+      </p:pic>
+    </p:spTree>
+    <p:extLst>
+      <p:ext uri="{BB962C8B-B14F-4D97-AF65-F5344CB8AC3E}">
+        <p14:creationId xmlns:p14="http://schemas.microsoft.com/office/powerpoint/2010/main" val="3501831937"/>
+      </p:ext>
+    </p:extLst>
+  </p:cSld>
+  <p:clrMapOvr>
+    <a:masterClrMapping/>
+  </p:clrMapOvr>
+</p:sld>
+</file>
+
+<file path=ppt/slides/slide46.xml><?xml version="1.0" encoding="utf-8"?>
+<p:sld xmlns:a="http://schemas.openxmlformats.org/drawingml/2006/main" xmlns:r="http://schemas.openxmlformats.org/officeDocument/2006/relationships" xmlns:p="http://schemas.openxmlformats.org/presentationml/2006/main">
+  <p:cSld>
+    <p:spTree>
+      <p:nvGrpSpPr>
+        <p:cNvPr id="1" name=""/>
+        <p:cNvGrpSpPr/>
+        <p:nvPr/>
+      </p:nvGrpSpPr>
+      <p:grpSpPr>
+        <a:xfrm>
+          <a:off x="0" y="0"/>
+          <a:ext cx="0" cy="0"/>
+          <a:chOff x="0" y="0"/>
+          <a:chExt cx="0" cy="0"/>
+        </a:xfrm>
+      </p:grpSpPr>
+      <p:sp>
+        <p:nvSpPr>
+          <p:cNvPr id="4" name="Retângulo 3">
+            <a:extLst>
+              <a:ext uri="{FF2B5EF4-FFF2-40B4-BE49-F238E27FC236}">
+                <a16:creationId xmlns:a16="http://schemas.microsoft.com/office/drawing/2014/main" id="{73521BF0-0376-2073-7FDD-6DD8B0C9B5B6}"/>
+              </a:ext>
+            </a:extLst>
+          </p:cNvPr>
+          <p:cNvSpPr/>
+          <p:nvPr/>
+        </p:nvSpPr>
+        <p:spPr>
+          <a:xfrm>
+            <a:off x="0" y="1"/>
+            <a:ext cx="7199313" cy="7199312"/>
+          </a:xfrm>
+          <a:prstGeom prst="rect">
+            <a:avLst/>
+          </a:prstGeom>
+          <a:solidFill>
+            <a:schemeClr val="bg1"/>
+          </a:solidFill>
+          <a:ln>
+            <a:solidFill>
+              <a:schemeClr val="bg1"/>
+            </a:solidFill>
+          </a:ln>
+        </p:spPr>
+        <p:style>
+          <a:lnRef idx="2">
+            <a:schemeClr val="accent1">
+              <a:shade val="50000"/>
+            </a:schemeClr>
+          </a:lnRef>
+          <a:fillRef idx="1">
+            <a:schemeClr val="accent1"/>
+          </a:fillRef>
+          <a:effectRef idx="0">
+            <a:schemeClr val="accent1"/>
+          </a:effectRef>
+          <a:fontRef idx="minor">
+            <a:schemeClr val="lt1"/>
+          </a:fontRef>
+        </p:style>
+        <p:txBody>
+          <a:bodyPr rtlCol="0" anchor="ctr"/>
+          <a:lstStyle/>
+          <a:p>
+            <a:pPr algn="ctr"/>
+            <a:endParaRPr lang="pt-BR" dirty="0"/>
+          </a:p>
+        </p:txBody>
+      </p:sp>
+      <p:pic>
+        <p:nvPicPr>
+          <p:cNvPr id="5" name="Imagem 4" descr="Ícone&#10;&#10;Descrição gerada automaticamente">
+            <a:extLst>
+              <a:ext uri="{FF2B5EF4-FFF2-40B4-BE49-F238E27FC236}">
+                <a16:creationId xmlns:a16="http://schemas.microsoft.com/office/drawing/2014/main" id="{2E1B3015-B97B-77FB-783A-BA142314CA98}"/>
+              </a:ext>
+            </a:extLst>
+          </p:cNvPr>
+          <p:cNvPicPr>
+            <a:picLocks noChangeAspect="1"/>
+          </p:cNvPicPr>
+          <p:nvPr/>
+        </p:nvPicPr>
+        <p:blipFill>
+          <a:blip r:embed="rId2">
+            <a:extLst>
+              <a:ext uri="{28A0092B-C50C-407E-A947-70E740481C1C}">
+                <a14:useLocalDpi xmlns:a14="http://schemas.microsoft.com/office/drawing/2010/main" val="0"/>
+              </a:ext>
+            </a:extLst>
+          </a:blip>
+          <a:stretch>
+            <a:fillRect/>
+          </a:stretch>
+        </p:blipFill>
+        <p:spPr>
+          <a:xfrm>
+            <a:off x="0" y="0"/>
+            <a:ext cx="7199312" cy="7199312"/>
+          </a:xfrm>
+          <a:prstGeom prst="rect">
+            <a:avLst/>
+          </a:prstGeom>
+        </p:spPr>
+      </p:pic>
+    </p:spTree>
+    <p:extLst>
+      <p:ext uri="{BB962C8B-B14F-4D97-AF65-F5344CB8AC3E}">
+        <p14:creationId xmlns:p14="http://schemas.microsoft.com/office/powerpoint/2010/main" val="1110081158"/>
       </p:ext>
     </p:extLst>
   </p:cSld>

</xml_diff>

<commit_message>
Configurando painel de créditos do HomeForm. Perfil: Lucas Fabiano e Thalita.
</commit_message>
<xml_diff>
--- a/Icons/icons.pptx
+++ b/Icons/icons.pptx
@@ -48,9 +48,11 @@
     <p:sldId id="309" r:id="rId42"/>
     <p:sldId id="313" r:id="rId43"/>
     <p:sldId id="314" r:id="rId44"/>
-    <p:sldId id="310" r:id="rId45"/>
-    <p:sldId id="311" r:id="rId46"/>
-    <p:sldId id="312" r:id="rId47"/>
+    <p:sldId id="315" r:id="rId45"/>
+    <p:sldId id="316" r:id="rId46"/>
+    <p:sldId id="310" r:id="rId47"/>
+    <p:sldId id="311" r:id="rId48"/>
+    <p:sldId id="312" r:id="rId49"/>
   </p:sldIdLst>
   <p:sldSz cx="7199313" cy="7199313"/>
   <p:notesSz cx="6858000" cy="9144000"/>
@@ -10714,10 +10716,10 @@
       </p:sp>
       <p:pic>
         <p:nvPicPr>
-          <p:cNvPr id="7" name="Imagem 6">
-            <a:extLst>
-              <a:ext uri="{FF2B5EF4-FFF2-40B4-BE49-F238E27FC236}">
-                <a16:creationId xmlns:a16="http://schemas.microsoft.com/office/drawing/2014/main" id="{10285049-AE60-38A9-D44F-0547959B951F}"/>
+          <p:cNvPr id="3" name="Imagem 2">
+            <a:extLst>
+              <a:ext uri="{FF2B5EF4-FFF2-40B4-BE49-F238E27FC236}">
+                <a16:creationId xmlns:a16="http://schemas.microsoft.com/office/drawing/2014/main" id="{AE90E61B-CCBB-521E-9863-A3A142307214}"/>
               </a:ext>
             </a:extLst>
           </p:cNvPr>
@@ -10735,7 +10737,7 @@
         <p:spPr>
           <a:xfrm>
             <a:off x="0" y="0"/>
-            <a:ext cx="7199311" cy="7199311"/>
+            <a:ext cx="7199313" cy="7199313"/>
           </a:xfrm>
           <a:prstGeom prst="rect">
             <a:avLst/>
@@ -10745,7 +10747,7 @@
     </p:spTree>
     <p:extLst>
       <p:ext uri="{BB962C8B-B14F-4D97-AF65-F5344CB8AC3E}">
-        <p14:creationId xmlns:p14="http://schemas.microsoft.com/office/powerpoint/2010/main" val="4168035138"/>
+        <p14:creationId xmlns:p14="http://schemas.microsoft.com/office/powerpoint/2010/main" val="2695327835"/>
       </p:ext>
     </p:extLst>
   </p:cSld>
@@ -10793,6 +10795,224 @@
             <a:avLst/>
           </a:prstGeom>
           <a:solidFill>
+            <a:srgbClr val="141B41"/>
+          </a:solidFill>
+        </p:spPr>
+        <p:style>
+          <a:lnRef idx="2">
+            <a:schemeClr val="accent1">
+              <a:shade val="50000"/>
+            </a:schemeClr>
+          </a:lnRef>
+          <a:fillRef idx="1">
+            <a:schemeClr val="accent1"/>
+          </a:fillRef>
+          <a:effectRef idx="0">
+            <a:schemeClr val="accent1"/>
+          </a:effectRef>
+          <a:fontRef idx="minor">
+            <a:schemeClr val="lt1"/>
+          </a:fontRef>
+        </p:style>
+        <p:txBody>
+          <a:bodyPr rtlCol="0" anchor="ctr"/>
+          <a:lstStyle/>
+          <a:p>
+            <a:pPr algn="ctr"/>
+            <a:endParaRPr lang="pt-BR" dirty="0"/>
+          </a:p>
+        </p:txBody>
+      </p:sp>
+      <p:pic>
+        <p:nvPicPr>
+          <p:cNvPr id="3" name="Imagem 2">
+            <a:extLst>
+              <a:ext uri="{FF2B5EF4-FFF2-40B4-BE49-F238E27FC236}">
+                <a16:creationId xmlns:a16="http://schemas.microsoft.com/office/drawing/2014/main" id="{EB4FAEBE-E9BF-FE2D-B542-0F3B352FE38C}"/>
+              </a:ext>
+            </a:extLst>
+          </p:cNvPr>
+          <p:cNvPicPr>
+            <a:picLocks noChangeAspect="1"/>
+          </p:cNvPicPr>
+          <p:nvPr/>
+        </p:nvPicPr>
+        <p:blipFill>
+          <a:blip r:embed="rId2"/>
+          <a:stretch>
+            <a:fillRect/>
+          </a:stretch>
+        </p:blipFill>
+        <p:spPr>
+          <a:xfrm>
+            <a:off x="0" y="0"/>
+            <a:ext cx="7199313" cy="7199313"/>
+          </a:xfrm>
+          <a:prstGeom prst="rect">
+            <a:avLst/>
+          </a:prstGeom>
+        </p:spPr>
+      </p:pic>
+    </p:spTree>
+    <p:extLst>
+      <p:ext uri="{BB962C8B-B14F-4D97-AF65-F5344CB8AC3E}">
+        <p14:creationId xmlns:p14="http://schemas.microsoft.com/office/powerpoint/2010/main" val="3739390008"/>
+      </p:ext>
+    </p:extLst>
+  </p:cSld>
+  <p:clrMapOvr>
+    <a:masterClrMapping/>
+  </p:clrMapOvr>
+</p:sld>
+</file>
+
+<file path=ppt/slides/slide46.xml><?xml version="1.0" encoding="utf-8"?>
+<p:sld xmlns:a="http://schemas.openxmlformats.org/drawingml/2006/main" xmlns:r="http://schemas.openxmlformats.org/officeDocument/2006/relationships" xmlns:p="http://schemas.openxmlformats.org/presentationml/2006/main">
+  <p:cSld>
+    <p:spTree>
+      <p:nvGrpSpPr>
+        <p:cNvPr id="1" name=""/>
+        <p:cNvGrpSpPr/>
+        <p:nvPr/>
+      </p:nvGrpSpPr>
+      <p:grpSpPr>
+        <a:xfrm>
+          <a:off x="0" y="0"/>
+          <a:ext cx="0" cy="0"/>
+          <a:chOff x="0" y="0"/>
+          <a:chExt cx="0" cy="0"/>
+        </a:xfrm>
+      </p:grpSpPr>
+      <p:sp>
+        <p:nvSpPr>
+          <p:cNvPr id="4" name="Retângulo 3">
+            <a:extLst>
+              <a:ext uri="{FF2B5EF4-FFF2-40B4-BE49-F238E27FC236}">
+                <a16:creationId xmlns:a16="http://schemas.microsoft.com/office/drawing/2014/main" id="{73521BF0-0376-2073-7FDD-6DD8B0C9B5B6}"/>
+              </a:ext>
+            </a:extLst>
+          </p:cNvPr>
+          <p:cNvSpPr/>
+          <p:nvPr/>
+        </p:nvSpPr>
+        <p:spPr>
+          <a:xfrm>
+            <a:off x="0" y="1"/>
+            <a:ext cx="7199313" cy="7199312"/>
+          </a:xfrm>
+          <a:prstGeom prst="rect">
+            <a:avLst/>
+          </a:prstGeom>
+          <a:solidFill>
+            <a:srgbClr val="141B41"/>
+          </a:solidFill>
+        </p:spPr>
+        <p:style>
+          <a:lnRef idx="2">
+            <a:schemeClr val="accent1">
+              <a:shade val="50000"/>
+            </a:schemeClr>
+          </a:lnRef>
+          <a:fillRef idx="1">
+            <a:schemeClr val="accent1"/>
+          </a:fillRef>
+          <a:effectRef idx="0">
+            <a:schemeClr val="accent1"/>
+          </a:effectRef>
+          <a:fontRef idx="minor">
+            <a:schemeClr val="lt1"/>
+          </a:fontRef>
+        </p:style>
+        <p:txBody>
+          <a:bodyPr rtlCol="0" anchor="ctr"/>
+          <a:lstStyle/>
+          <a:p>
+            <a:pPr algn="ctr"/>
+            <a:endParaRPr lang="pt-BR" dirty="0"/>
+          </a:p>
+        </p:txBody>
+      </p:sp>
+      <p:pic>
+        <p:nvPicPr>
+          <p:cNvPr id="7" name="Imagem 6">
+            <a:extLst>
+              <a:ext uri="{FF2B5EF4-FFF2-40B4-BE49-F238E27FC236}">
+                <a16:creationId xmlns:a16="http://schemas.microsoft.com/office/drawing/2014/main" id="{10285049-AE60-38A9-D44F-0547959B951F}"/>
+              </a:ext>
+            </a:extLst>
+          </p:cNvPr>
+          <p:cNvPicPr>
+            <a:picLocks noChangeAspect="1"/>
+          </p:cNvPicPr>
+          <p:nvPr/>
+        </p:nvPicPr>
+        <p:blipFill>
+          <a:blip r:embed="rId2"/>
+          <a:stretch>
+            <a:fillRect/>
+          </a:stretch>
+        </p:blipFill>
+        <p:spPr>
+          <a:xfrm>
+            <a:off x="0" y="0"/>
+            <a:ext cx="7199311" cy="7199311"/>
+          </a:xfrm>
+          <a:prstGeom prst="rect">
+            <a:avLst/>
+          </a:prstGeom>
+        </p:spPr>
+      </p:pic>
+    </p:spTree>
+    <p:extLst>
+      <p:ext uri="{BB962C8B-B14F-4D97-AF65-F5344CB8AC3E}">
+        <p14:creationId xmlns:p14="http://schemas.microsoft.com/office/powerpoint/2010/main" val="4168035138"/>
+      </p:ext>
+    </p:extLst>
+  </p:cSld>
+  <p:clrMapOvr>
+    <a:masterClrMapping/>
+  </p:clrMapOvr>
+</p:sld>
+</file>
+
+<file path=ppt/slides/slide47.xml><?xml version="1.0" encoding="utf-8"?>
+<p:sld xmlns:a="http://schemas.openxmlformats.org/drawingml/2006/main" xmlns:r="http://schemas.openxmlformats.org/officeDocument/2006/relationships" xmlns:p="http://schemas.openxmlformats.org/presentationml/2006/main">
+  <p:cSld>
+    <p:spTree>
+      <p:nvGrpSpPr>
+        <p:cNvPr id="1" name=""/>
+        <p:cNvGrpSpPr/>
+        <p:nvPr/>
+      </p:nvGrpSpPr>
+      <p:grpSpPr>
+        <a:xfrm>
+          <a:off x="0" y="0"/>
+          <a:ext cx="0" cy="0"/>
+          <a:chOff x="0" y="0"/>
+          <a:chExt cx="0" cy="0"/>
+        </a:xfrm>
+      </p:grpSpPr>
+      <p:sp>
+        <p:nvSpPr>
+          <p:cNvPr id="4" name="Retângulo 3">
+            <a:extLst>
+              <a:ext uri="{FF2B5EF4-FFF2-40B4-BE49-F238E27FC236}">
+                <a16:creationId xmlns:a16="http://schemas.microsoft.com/office/drawing/2014/main" id="{73521BF0-0376-2073-7FDD-6DD8B0C9B5B6}"/>
+              </a:ext>
+            </a:extLst>
+          </p:cNvPr>
+          <p:cNvSpPr/>
+          <p:nvPr/>
+        </p:nvSpPr>
+        <p:spPr>
+          <a:xfrm>
+            <a:off x="0" y="1"/>
+            <a:ext cx="7199313" cy="7199312"/>
+          </a:xfrm>
+          <a:prstGeom prst="rect">
+            <a:avLst/>
+          </a:prstGeom>
+          <a:solidFill>
             <a:schemeClr val="bg1"/>
           </a:solidFill>
           <a:ln>
@@ -10875,7 +11095,7 @@
 </p:sld>
 </file>
 
-<file path=ppt/slides/slide46.xml><?xml version="1.0" encoding="utf-8"?>
+<file path=ppt/slides/slide48.xml><?xml version="1.0" encoding="utf-8"?>
 <p:sld xmlns:a="http://schemas.openxmlformats.org/drawingml/2006/main" xmlns:r="http://schemas.openxmlformats.org/officeDocument/2006/relationships" xmlns:p="http://schemas.openxmlformats.org/presentationml/2006/main">
   <p:cSld>
     <p:spTree>

</xml_diff>